<commit_message>
update the read me introduction section.
</commit_message>
<xml_diff>
--- a/doc/designDoc.pptx
+++ b/doc/designDoc.pptx
@@ -5,11 +5,12 @@
     <p:sldMasterId id="2147483648" r:id="rId1"/>
   </p:sldMasterIdLst>
   <p:notesMasterIdLst>
-    <p:notesMasterId r:id="rId4"/>
+    <p:notesMasterId r:id="rId5"/>
   </p:notesMasterIdLst>
   <p:sldIdLst>
     <p:sldId id="256" r:id="rId2"/>
-    <p:sldId id="261" r:id="rId3"/>
+    <p:sldId id="262" r:id="rId3"/>
+    <p:sldId id="261" r:id="rId4"/>
   </p:sldIdLst>
   <p:sldSz cx="12192000" cy="6858000"/>
   <p:notesSz cx="6858000" cy="9144000"/>
@@ -108,6 +109,11 @@
       </a:defRPr>
     </a:lvl9pPr>
   </p:defaultTextStyle>
+  <p:extLst>
+    <p:ext uri="{EFAFB233-063F-42B5-8137-9DF3F51BA10A}">
+      <p15:sldGuideLst xmlns:p15="http://schemas.microsoft.com/office/powerpoint/2012/main"/>
+    </p:ext>
+  </p:extLst>
 </p:presentation>
 </file>
 
@@ -193,7 +199,7 @@
           <a:p>
             <a:fld id="{33409446-689F-46FF-9FB7-77BF708581DE}" type="datetimeFigureOut">
               <a:rPr lang="en-SG" smtClean="0"/>
-              <a:t>8/3/2024</a:t>
+              <a:t>9/3/2024</a:t>
             </a:fld>
             <a:endParaRPr lang="en-SG"/>
           </a:p>
@@ -600,6 +606,90 @@
             <a:spLocks noGrp="1"/>
           </p:cNvSpPr>
           <p:nvPr>
+            <p:ph type="sldNum" sz="quarter" idx="5"/>
+          </p:nvPr>
+        </p:nvSpPr>
+        <p:spPr/>
+        <p:txBody>
+          <a:bodyPr/>
+          <a:lstStyle/>
+          <a:p>
+            <a:fld id="{279C1F23-1A65-4BFF-9AFE-E2EF36DC507F}" type="slidenum">
+              <a:rPr lang="en-SG" smtClean="0"/>
+              <a:t>2</a:t>
+            </a:fld>
+            <a:endParaRPr lang="en-SG"/>
+          </a:p>
+        </p:txBody>
+      </p:sp>
+    </p:spTree>
+    <p:extLst>
+      <p:ext uri="{BB962C8B-B14F-4D97-AF65-F5344CB8AC3E}">
+        <p14:creationId xmlns:p14="http://schemas.microsoft.com/office/powerpoint/2010/main" val="1957129397"/>
+      </p:ext>
+    </p:extLst>
+  </p:cSld>
+  <p:clrMapOvr>
+    <a:masterClrMapping/>
+  </p:clrMapOvr>
+</p:notes>
+</file>
+
+<file path=ppt/notesSlides/notesSlide3.xml><?xml version="1.0" encoding="utf-8"?>
+<p:notes xmlns:a="http://schemas.openxmlformats.org/drawingml/2006/main" xmlns:r="http://schemas.openxmlformats.org/officeDocument/2006/relationships" xmlns:p="http://schemas.openxmlformats.org/presentationml/2006/main">
+  <p:cSld>
+    <p:spTree>
+      <p:nvGrpSpPr>
+        <p:cNvPr id="1" name=""/>
+        <p:cNvGrpSpPr/>
+        <p:nvPr/>
+      </p:nvGrpSpPr>
+      <p:grpSpPr>
+        <a:xfrm>
+          <a:off x="0" y="0"/>
+          <a:ext cx="0" cy="0"/>
+          <a:chOff x="0" y="0"/>
+          <a:chExt cx="0" cy="0"/>
+        </a:xfrm>
+      </p:grpSpPr>
+      <p:sp>
+        <p:nvSpPr>
+          <p:cNvPr id="2" name="Slide Image Placeholder 1"/>
+          <p:cNvSpPr>
+            <a:spLocks noGrp="1" noRot="1" noChangeAspect="1"/>
+          </p:cNvSpPr>
+          <p:nvPr>
+            <p:ph type="sldImg"/>
+          </p:nvPr>
+        </p:nvSpPr>
+        <p:spPr/>
+      </p:sp>
+      <p:sp>
+        <p:nvSpPr>
+          <p:cNvPr id="3" name="Notes Placeholder 2"/>
+          <p:cNvSpPr>
+            <a:spLocks noGrp="1"/>
+          </p:cNvSpPr>
+          <p:nvPr>
+            <p:ph type="body" idx="1"/>
+          </p:nvPr>
+        </p:nvSpPr>
+        <p:spPr/>
+        <p:txBody>
+          <a:bodyPr/>
+          <a:lstStyle/>
+          <a:p>
+            <a:endParaRPr lang="en-SG" dirty="0"/>
+          </a:p>
+        </p:txBody>
+      </p:sp>
+      <p:sp>
+        <p:nvSpPr>
+          <p:cNvPr id="4" name="Slide Number Placeholder 3"/>
+          <p:cNvSpPr>
+            <a:spLocks noGrp="1"/>
+          </p:cNvSpPr>
+          <p:nvPr>
             <p:ph type="sldNum" sz="quarter" idx="10"/>
           </p:nvPr>
         </p:nvSpPr>
@@ -610,7 +700,7 @@
           <a:p>
             <a:fld id="{620E605A-E658-4718-A0B0-0E0D18691EE8}" type="slidenum">
               <a:rPr lang="en-SG" smtClean="0"/>
-              <a:t>2</a:t>
+              <a:t>3</a:t>
             </a:fld>
             <a:endParaRPr lang="en-SG"/>
           </a:p>
@@ -778,7 +868,7 @@
           <a:p>
             <a:fld id="{B3F8E07C-796C-4AF5-99C4-45330ADE35B1}" type="datetimeFigureOut">
               <a:rPr lang="en-SG" smtClean="0"/>
-              <a:t>8/3/2024</a:t>
+              <a:t>9/3/2024</a:t>
             </a:fld>
             <a:endParaRPr lang="en-SG"/>
           </a:p>
@@ -978,7 +1068,7 @@
           <a:p>
             <a:fld id="{B3F8E07C-796C-4AF5-99C4-45330ADE35B1}" type="datetimeFigureOut">
               <a:rPr lang="en-SG" smtClean="0"/>
-              <a:t>8/3/2024</a:t>
+              <a:t>9/3/2024</a:t>
             </a:fld>
             <a:endParaRPr lang="en-SG"/>
           </a:p>
@@ -1188,7 +1278,7 @@
           <a:p>
             <a:fld id="{B3F8E07C-796C-4AF5-99C4-45330ADE35B1}" type="datetimeFigureOut">
               <a:rPr lang="en-SG" smtClean="0"/>
-              <a:t>8/3/2024</a:t>
+              <a:t>9/3/2024</a:t>
             </a:fld>
             <a:endParaRPr lang="en-SG"/>
           </a:p>
@@ -1388,7 +1478,7 @@
           <a:p>
             <a:fld id="{B3F8E07C-796C-4AF5-99C4-45330ADE35B1}" type="datetimeFigureOut">
               <a:rPr lang="en-SG" smtClean="0"/>
-              <a:t>8/3/2024</a:t>
+              <a:t>9/3/2024</a:t>
             </a:fld>
             <a:endParaRPr lang="en-SG"/>
           </a:p>
@@ -1664,7 +1754,7 @@
           <a:p>
             <a:fld id="{B3F8E07C-796C-4AF5-99C4-45330ADE35B1}" type="datetimeFigureOut">
               <a:rPr lang="en-SG" smtClean="0"/>
-              <a:t>8/3/2024</a:t>
+              <a:t>9/3/2024</a:t>
             </a:fld>
             <a:endParaRPr lang="en-SG"/>
           </a:p>
@@ -1932,7 +2022,7 @@
           <a:p>
             <a:fld id="{B3F8E07C-796C-4AF5-99C4-45330ADE35B1}" type="datetimeFigureOut">
               <a:rPr lang="en-SG" smtClean="0"/>
-              <a:t>8/3/2024</a:t>
+              <a:t>9/3/2024</a:t>
             </a:fld>
             <a:endParaRPr lang="en-SG"/>
           </a:p>
@@ -2347,7 +2437,7 @@
           <a:p>
             <a:fld id="{B3F8E07C-796C-4AF5-99C4-45330ADE35B1}" type="datetimeFigureOut">
               <a:rPr lang="en-SG" smtClean="0"/>
-              <a:t>8/3/2024</a:t>
+              <a:t>9/3/2024</a:t>
             </a:fld>
             <a:endParaRPr lang="en-SG"/>
           </a:p>
@@ -2489,7 +2579,7 @@
           <a:p>
             <a:fld id="{B3F8E07C-796C-4AF5-99C4-45330ADE35B1}" type="datetimeFigureOut">
               <a:rPr lang="en-SG" smtClean="0"/>
-              <a:t>8/3/2024</a:t>
+              <a:t>9/3/2024</a:t>
             </a:fld>
             <a:endParaRPr lang="en-SG"/>
           </a:p>
@@ -2602,7 +2692,7 @@
           <a:p>
             <a:fld id="{B3F8E07C-796C-4AF5-99C4-45330ADE35B1}" type="datetimeFigureOut">
               <a:rPr lang="en-SG" smtClean="0"/>
-              <a:t>8/3/2024</a:t>
+              <a:t>9/3/2024</a:t>
             </a:fld>
             <a:endParaRPr lang="en-SG"/>
           </a:p>
@@ -2915,7 +3005,7 @@
           <a:p>
             <a:fld id="{B3F8E07C-796C-4AF5-99C4-45330ADE35B1}" type="datetimeFigureOut">
               <a:rPr lang="en-SG" smtClean="0"/>
-              <a:t>8/3/2024</a:t>
+              <a:t>9/3/2024</a:t>
             </a:fld>
             <a:endParaRPr lang="en-SG"/>
           </a:p>
@@ -3204,7 +3294,7 @@
           <a:p>
             <a:fld id="{B3F8E07C-796C-4AF5-99C4-45330ADE35B1}" type="datetimeFigureOut">
               <a:rPr lang="en-SG" smtClean="0"/>
-              <a:t>8/3/2024</a:t>
+              <a:t>9/3/2024</a:t>
             </a:fld>
             <a:endParaRPr lang="en-SG"/>
           </a:p>
@@ -3447,7 +3537,7 @@
           <a:p>
             <a:fld id="{B3F8E07C-796C-4AF5-99C4-45330ADE35B1}" type="datetimeFigureOut">
               <a:rPr lang="en-SG" smtClean="0"/>
-              <a:t>8/3/2024</a:t>
+              <a:t>9/3/2024</a:t>
             </a:fld>
             <a:endParaRPr lang="en-SG"/>
           </a:p>
@@ -6498,6 +6588,2322 @@
 </file>
 
 <file path=ppt/slides/slide2.xml><?xml version="1.0" encoding="utf-8"?>
+<p:sld xmlns:a="http://schemas.openxmlformats.org/drawingml/2006/main" xmlns:r="http://schemas.openxmlformats.org/officeDocument/2006/relationships" xmlns:p="http://schemas.openxmlformats.org/presentationml/2006/main">
+  <p:cSld>
+    <p:spTree>
+      <p:nvGrpSpPr>
+        <p:cNvPr id="1" name=""/>
+        <p:cNvGrpSpPr/>
+        <p:nvPr/>
+      </p:nvGrpSpPr>
+      <p:grpSpPr>
+        <a:xfrm>
+          <a:off x="0" y="0"/>
+          <a:ext cx="0" cy="0"/>
+          <a:chOff x="0" y="0"/>
+          <a:chExt cx="0" cy="0"/>
+        </a:xfrm>
+      </p:grpSpPr>
+      <p:sp>
+        <p:nvSpPr>
+          <p:cNvPr id="11" name="Rectangle 10">
+            <a:extLst>
+              <a:ext uri="{FF2B5EF4-FFF2-40B4-BE49-F238E27FC236}">
+                <a16:creationId xmlns:a16="http://schemas.microsoft.com/office/drawing/2014/main" id="{A1D7B413-A024-8E45-D03D-1D0032BB4267}"/>
+              </a:ext>
+            </a:extLst>
+          </p:cNvPr>
+          <p:cNvSpPr/>
+          <p:nvPr/>
+        </p:nvSpPr>
+        <p:spPr>
+          <a:xfrm>
+            <a:off x="1996739" y="3044952"/>
+            <a:ext cx="1241992" cy="1133856"/>
+          </a:xfrm>
+          <a:prstGeom prst="rect">
+            <a:avLst/>
+          </a:prstGeom>
+          <a:solidFill>
+            <a:schemeClr val="accent4">
+              <a:lumMod val="20000"/>
+              <a:lumOff val="80000"/>
+            </a:schemeClr>
+          </a:solidFill>
+        </p:spPr>
+        <p:style>
+          <a:lnRef idx="2">
+            <a:schemeClr val="accent1">
+              <a:shade val="15000"/>
+            </a:schemeClr>
+          </a:lnRef>
+          <a:fillRef idx="1">
+            <a:schemeClr val="accent1"/>
+          </a:fillRef>
+          <a:effectRef idx="0">
+            <a:schemeClr val="accent1"/>
+          </a:effectRef>
+          <a:fontRef idx="minor">
+            <a:schemeClr val="lt1"/>
+          </a:fontRef>
+        </p:style>
+        <p:txBody>
+          <a:bodyPr rtlCol="0" anchor="ctr"/>
+          <a:lstStyle/>
+          <a:p>
+            <a:pPr algn="ctr"/>
+            <a:endParaRPr lang="en-SG" dirty="0"/>
+          </a:p>
+        </p:txBody>
+      </p:sp>
+      <p:sp>
+        <p:nvSpPr>
+          <p:cNvPr id="23" name="Rectangle 22">
+            <a:extLst>
+              <a:ext uri="{FF2B5EF4-FFF2-40B4-BE49-F238E27FC236}">
+                <a16:creationId xmlns:a16="http://schemas.microsoft.com/office/drawing/2014/main" id="{F90241D7-AB83-D101-B85E-6C2C95E6AEA7}"/>
+              </a:ext>
+            </a:extLst>
+          </p:cNvPr>
+          <p:cNvSpPr/>
+          <p:nvPr/>
+        </p:nvSpPr>
+        <p:spPr>
+          <a:xfrm>
+            <a:off x="1916174" y="3629488"/>
+            <a:ext cx="2921002" cy="511799"/>
+          </a:xfrm>
+          <a:prstGeom prst="rect">
+            <a:avLst/>
+          </a:prstGeom>
+          <a:noFill/>
+          <a:ln w="19050">
+            <a:solidFill>
+              <a:schemeClr val="tx1"/>
+            </a:solidFill>
+            <a:prstDash val="sysDot"/>
+          </a:ln>
+        </p:spPr>
+        <p:style>
+          <a:lnRef idx="2">
+            <a:schemeClr val="accent1">
+              <a:shade val="15000"/>
+            </a:schemeClr>
+          </a:lnRef>
+          <a:fillRef idx="1">
+            <a:schemeClr val="accent1"/>
+          </a:fillRef>
+          <a:effectRef idx="0">
+            <a:schemeClr val="accent1"/>
+          </a:effectRef>
+          <a:fontRef idx="minor">
+            <a:schemeClr val="lt1"/>
+          </a:fontRef>
+        </p:style>
+        <p:txBody>
+          <a:bodyPr rtlCol="0" anchor="ctr"/>
+          <a:lstStyle/>
+          <a:p>
+            <a:pPr algn="ctr"/>
+            <a:endParaRPr lang="en-SG" dirty="0">
+              <a:ln>
+                <a:solidFill>
+                  <a:schemeClr val="tx1"/>
+                </a:solidFill>
+                <a:prstDash val="sysDash"/>
+              </a:ln>
+            </a:endParaRPr>
+          </a:p>
+        </p:txBody>
+      </p:sp>
+      <p:sp>
+        <p:nvSpPr>
+          <p:cNvPr id="4" name="Rectangle 3">
+            <a:extLst>
+              <a:ext uri="{FF2B5EF4-FFF2-40B4-BE49-F238E27FC236}">
+                <a16:creationId xmlns:a16="http://schemas.microsoft.com/office/drawing/2014/main" id="{80435B2E-68E2-5EC7-BCFE-E59773715AF4}"/>
+              </a:ext>
+            </a:extLst>
+          </p:cNvPr>
+          <p:cNvSpPr/>
+          <p:nvPr/>
+        </p:nvSpPr>
+        <p:spPr>
+          <a:xfrm>
+            <a:off x="1706880" y="2404872"/>
+            <a:ext cx="3907536" cy="2293544"/>
+          </a:xfrm>
+          <a:prstGeom prst="rect">
+            <a:avLst/>
+          </a:prstGeom>
+          <a:noFill/>
+          <a:ln w="19050">
+            <a:solidFill>
+              <a:schemeClr val="tx2">
+                <a:lumMod val="50000"/>
+                <a:lumOff val="50000"/>
+              </a:schemeClr>
+            </a:solidFill>
+            <a:prstDash val="sysDash"/>
+          </a:ln>
+        </p:spPr>
+        <p:style>
+          <a:lnRef idx="2">
+            <a:schemeClr val="accent1">
+              <a:shade val="15000"/>
+            </a:schemeClr>
+          </a:lnRef>
+          <a:fillRef idx="1">
+            <a:schemeClr val="accent1"/>
+          </a:fillRef>
+          <a:effectRef idx="0">
+            <a:schemeClr val="accent1"/>
+          </a:effectRef>
+          <a:fontRef idx="minor">
+            <a:schemeClr val="lt1"/>
+          </a:fontRef>
+        </p:style>
+        <p:txBody>
+          <a:bodyPr rtlCol="0" anchor="ctr"/>
+          <a:lstStyle/>
+          <a:p>
+            <a:pPr algn="ctr"/>
+            <a:endParaRPr lang="en-SG" dirty="0">
+              <a:ln>
+                <a:solidFill>
+                  <a:schemeClr val="tx1"/>
+                </a:solidFill>
+                <a:prstDash val="sysDash"/>
+              </a:ln>
+            </a:endParaRPr>
+          </a:p>
+        </p:txBody>
+      </p:sp>
+      <p:pic>
+        <p:nvPicPr>
+          <p:cNvPr id="6" name="Picture 5">
+            <a:extLst>
+              <a:ext uri="{FF2B5EF4-FFF2-40B4-BE49-F238E27FC236}">
+                <a16:creationId xmlns:a16="http://schemas.microsoft.com/office/drawing/2014/main" id="{E9455D70-14EF-E904-7524-A96160603582}"/>
+              </a:ext>
+            </a:extLst>
+          </p:cNvPr>
+          <p:cNvPicPr>
+            <a:picLocks noChangeAspect="1"/>
+          </p:cNvPicPr>
+          <p:nvPr/>
+        </p:nvPicPr>
+        <p:blipFill>
+          <a:blip r:embed="rId3"/>
+          <a:stretch>
+            <a:fillRect/>
+          </a:stretch>
+        </p:blipFill>
+        <p:spPr>
+          <a:xfrm>
+            <a:off x="1813859" y="2118509"/>
+            <a:ext cx="572725" cy="572725"/>
+          </a:xfrm>
+          <a:prstGeom prst="rect">
+            <a:avLst/>
+          </a:prstGeom>
+          <a:ln>
+            <a:solidFill>
+              <a:srgbClr val="0070C0"/>
+            </a:solidFill>
+            <a:prstDash val="sysDash"/>
+          </a:ln>
+        </p:spPr>
+      </p:pic>
+      <p:sp>
+        <p:nvSpPr>
+          <p:cNvPr id="7" name="TextBox 6">
+            <a:extLst>
+              <a:ext uri="{FF2B5EF4-FFF2-40B4-BE49-F238E27FC236}">
+                <a16:creationId xmlns:a16="http://schemas.microsoft.com/office/drawing/2014/main" id="{7066AA24-1308-860C-12D0-B1146A59B9D5}"/>
+              </a:ext>
+            </a:extLst>
+          </p:cNvPr>
+          <p:cNvSpPr txBox="1"/>
+          <p:nvPr/>
+        </p:nvSpPr>
+        <p:spPr>
+          <a:xfrm>
+            <a:off x="2371687" y="2097094"/>
+            <a:ext cx="1497749" cy="307777"/>
+          </a:xfrm>
+          <a:prstGeom prst="rect">
+            <a:avLst/>
+          </a:prstGeom>
+          <a:noFill/>
+        </p:spPr>
+        <p:txBody>
+          <a:bodyPr wrap="square" rtlCol="0">
+            <a:spAutoFit/>
+          </a:bodyPr>
+          <a:lstStyle/>
+          <a:p>
+            <a:r>
+              <a:rPr lang="en-US" sz="1400" b="1" dirty="0"/>
+              <a:t>Raspberry PI 3</a:t>
+            </a:r>
+            <a:endParaRPr lang="en-SG" sz="1400" b="1" dirty="0"/>
+          </a:p>
+        </p:txBody>
+      </p:sp>
+      <p:pic>
+        <p:nvPicPr>
+          <p:cNvPr id="9" name="Picture 8">
+            <a:extLst>
+              <a:ext uri="{FF2B5EF4-FFF2-40B4-BE49-F238E27FC236}">
+                <a16:creationId xmlns:a16="http://schemas.microsoft.com/office/drawing/2014/main" id="{836062DD-C9F9-D2C5-F672-FEA9616F43D8}"/>
+              </a:ext>
+            </a:extLst>
+          </p:cNvPr>
+          <p:cNvPicPr>
+            <a:picLocks noChangeAspect="1"/>
+          </p:cNvPicPr>
+          <p:nvPr/>
+        </p:nvPicPr>
+        <p:blipFill>
+          <a:blip r:embed="rId4"/>
+          <a:stretch>
+            <a:fillRect/>
+          </a:stretch>
+        </p:blipFill>
+        <p:spPr>
+          <a:xfrm>
+            <a:off x="4545130" y="1577877"/>
+            <a:ext cx="811168" cy="611495"/>
+          </a:xfrm>
+          <a:prstGeom prst="rect">
+            <a:avLst/>
+          </a:prstGeom>
+          <a:ln w="9525">
+            <a:solidFill>
+              <a:schemeClr val="tx1"/>
+            </a:solidFill>
+          </a:ln>
+        </p:spPr>
+      </p:pic>
+      <p:sp>
+        <p:nvSpPr>
+          <p:cNvPr id="10" name="TextBox 9">
+            <a:extLst>
+              <a:ext uri="{FF2B5EF4-FFF2-40B4-BE49-F238E27FC236}">
+                <a16:creationId xmlns:a16="http://schemas.microsoft.com/office/drawing/2014/main" id="{013E7731-9CCA-CC56-F50E-E02653526DC1}"/>
+              </a:ext>
+            </a:extLst>
+          </p:cNvPr>
+          <p:cNvSpPr txBox="1"/>
+          <p:nvPr/>
+        </p:nvSpPr>
+        <p:spPr>
+          <a:xfrm>
+            <a:off x="4460180" y="1362377"/>
+            <a:ext cx="1218244" cy="261610"/>
+          </a:xfrm>
+          <a:prstGeom prst="rect">
+            <a:avLst/>
+          </a:prstGeom>
+          <a:noFill/>
+        </p:spPr>
+        <p:txBody>
+          <a:bodyPr wrap="square" rtlCol="0">
+            <a:spAutoFit/>
+          </a:bodyPr>
+          <a:lstStyle/>
+          <a:p>
+            <a:r>
+              <a:rPr lang="en-US" sz="1100" b="1" dirty="0"/>
+              <a:t>IoT sensors</a:t>
+            </a:r>
+            <a:endParaRPr lang="en-SG" sz="1100" b="1" dirty="0"/>
+          </a:p>
+        </p:txBody>
+      </p:sp>
+      <p:sp>
+        <p:nvSpPr>
+          <p:cNvPr id="12" name="TextBox 11">
+            <a:extLst>
+              <a:ext uri="{FF2B5EF4-FFF2-40B4-BE49-F238E27FC236}">
+                <a16:creationId xmlns:a16="http://schemas.microsoft.com/office/drawing/2014/main" id="{30A19485-2B22-4482-8D71-B015C07AB4C5}"/>
+              </a:ext>
+            </a:extLst>
+          </p:cNvPr>
+          <p:cNvSpPr txBox="1"/>
+          <p:nvPr/>
+        </p:nvSpPr>
+        <p:spPr>
+          <a:xfrm>
+            <a:off x="1706880" y="2805755"/>
+            <a:ext cx="1880110" cy="276999"/>
+          </a:xfrm>
+          <a:prstGeom prst="rect">
+            <a:avLst/>
+          </a:prstGeom>
+          <a:noFill/>
+        </p:spPr>
+        <p:txBody>
+          <a:bodyPr wrap="square" rtlCol="0">
+            <a:spAutoFit/>
+          </a:bodyPr>
+          <a:lstStyle/>
+          <a:p>
+            <a:r>
+              <a:rPr lang="en-US" sz="1200" b="1" dirty="0"/>
+              <a:t>Trust Zone Secure World </a:t>
+            </a:r>
+            <a:endParaRPr lang="en-SG" sz="1200" b="1" dirty="0"/>
+          </a:p>
+        </p:txBody>
+      </p:sp>
+      <p:sp>
+        <p:nvSpPr>
+          <p:cNvPr id="13" name="Rectangle 12">
+            <a:extLst>
+              <a:ext uri="{FF2B5EF4-FFF2-40B4-BE49-F238E27FC236}">
+                <a16:creationId xmlns:a16="http://schemas.microsoft.com/office/drawing/2014/main" id="{66A1E065-7ECA-AE62-B167-85BB1038CC77}"/>
+              </a:ext>
+            </a:extLst>
+          </p:cNvPr>
+          <p:cNvSpPr/>
+          <p:nvPr/>
+        </p:nvSpPr>
+        <p:spPr>
+          <a:xfrm>
+            <a:off x="2064986" y="3185756"/>
+            <a:ext cx="1055575" cy="281352"/>
+          </a:xfrm>
+          <a:prstGeom prst="rect">
+            <a:avLst/>
+          </a:prstGeom>
+          <a:solidFill>
+            <a:schemeClr val="accent1">
+              <a:lumMod val="60000"/>
+              <a:lumOff val="40000"/>
+            </a:schemeClr>
+          </a:solidFill>
+        </p:spPr>
+        <p:style>
+          <a:lnRef idx="2">
+            <a:schemeClr val="accent1">
+              <a:shade val="15000"/>
+            </a:schemeClr>
+          </a:lnRef>
+          <a:fillRef idx="1">
+            <a:schemeClr val="accent1"/>
+          </a:fillRef>
+          <a:effectRef idx="0">
+            <a:schemeClr val="accent1"/>
+          </a:effectRef>
+          <a:fontRef idx="minor">
+            <a:schemeClr val="lt1"/>
+          </a:fontRef>
+        </p:style>
+        <p:txBody>
+          <a:bodyPr rtlCol="0" anchor="ctr"/>
+          <a:lstStyle/>
+          <a:p>
+            <a:r>
+              <a:rPr lang="en-US" sz="1100" b="1" dirty="0">
+                <a:solidFill>
+                  <a:schemeClr val="tx1"/>
+                </a:solidFill>
+              </a:rPr>
+              <a:t>Trust Storage</a:t>
+            </a:r>
+          </a:p>
+        </p:txBody>
+      </p:sp>
+      <p:sp>
+        <p:nvSpPr>
+          <p:cNvPr id="15" name="Rectangle 14">
+            <a:extLst>
+              <a:ext uri="{FF2B5EF4-FFF2-40B4-BE49-F238E27FC236}">
+                <a16:creationId xmlns:a16="http://schemas.microsoft.com/office/drawing/2014/main" id="{B502D4DF-64C3-6853-78B1-D5F00AEFBE7B}"/>
+              </a:ext>
+            </a:extLst>
+          </p:cNvPr>
+          <p:cNvSpPr/>
+          <p:nvPr/>
+        </p:nvSpPr>
+        <p:spPr>
+          <a:xfrm>
+            <a:off x="2091686" y="3717795"/>
+            <a:ext cx="1052098" cy="307777"/>
+          </a:xfrm>
+          <a:prstGeom prst="rect">
+            <a:avLst/>
+          </a:prstGeom>
+          <a:solidFill>
+            <a:schemeClr val="tx1">
+              <a:lumMod val="65000"/>
+              <a:lumOff val="35000"/>
+            </a:schemeClr>
+          </a:solidFill>
+        </p:spPr>
+        <p:style>
+          <a:lnRef idx="2">
+            <a:schemeClr val="accent6">
+              <a:shade val="15000"/>
+            </a:schemeClr>
+          </a:lnRef>
+          <a:fillRef idx="1">
+            <a:schemeClr val="accent6"/>
+          </a:fillRef>
+          <a:effectRef idx="0">
+            <a:schemeClr val="accent6"/>
+          </a:effectRef>
+          <a:fontRef idx="minor">
+            <a:schemeClr val="lt1"/>
+          </a:fontRef>
+        </p:style>
+        <p:txBody>
+          <a:bodyPr rtlCol="0" anchor="ctr"/>
+          <a:lstStyle/>
+          <a:p>
+            <a:pPr algn="ctr"/>
+            <a:r>
+              <a:rPr lang="en-US" sz="900" b="1" dirty="0"/>
+              <a:t>Trust Execution Environment </a:t>
+            </a:r>
+            <a:endParaRPr lang="en-SG" sz="900" b="1" dirty="0"/>
+          </a:p>
+        </p:txBody>
+      </p:sp>
+      <p:sp>
+        <p:nvSpPr>
+          <p:cNvPr id="17" name="Rectangle 16">
+            <a:extLst>
+              <a:ext uri="{FF2B5EF4-FFF2-40B4-BE49-F238E27FC236}">
+                <a16:creationId xmlns:a16="http://schemas.microsoft.com/office/drawing/2014/main" id="{48BC0F77-05AE-BA40-109D-2BED503FE0D7}"/>
+              </a:ext>
+            </a:extLst>
+          </p:cNvPr>
+          <p:cNvSpPr/>
+          <p:nvPr/>
+        </p:nvSpPr>
+        <p:spPr>
+          <a:xfrm>
+            <a:off x="2254512" y="4394308"/>
+            <a:ext cx="2582664" cy="215500"/>
+          </a:xfrm>
+          <a:prstGeom prst="rect">
+            <a:avLst/>
+          </a:prstGeom>
+        </p:spPr>
+        <p:style>
+          <a:lnRef idx="2">
+            <a:schemeClr val="accent1">
+              <a:shade val="15000"/>
+            </a:schemeClr>
+          </a:lnRef>
+          <a:fillRef idx="1">
+            <a:schemeClr val="accent1"/>
+          </a:fillRef>
+          <a:effectRef idx="0">
+            <a:schemeClr val="accent1"/>
+          </a:effectRef>
+          <a:fontRef idx="minor">
+            <a:schemeClr val="lt1"/>
+          </a:fontRef>
+        </p:style>
+        <p:txBody>
+          <a:bodyPr rtlCol="0" anchor="ctr"/>
+          <a:lstStyle/>
+          <a:p>
+            <a:pPr algn="ctr"/>
+            <a:r>
+              <a:rPr lang="en-US" sz="1100" dirty="0"/>
+              <a:t>Trust Execution Environment Driver </a:t>
+            </a:r>
+            <a:endParaRPr lang="en-SG" sz="1100" dirty="0"/>
+          </a:p>
+        </p:txBody>
+      </p:sp>
+      <p:sp>
+        <p:nvSpPr>
+          <p:cNvPr id="18" name="Rectangle 17">
+            <a:extLst>
+              <a:ext uri="{FF2B5EF4-FFF2-40B4-BE49-F238E27FC236}">
+                <a16:creationId xmlns:a16="http://schemas.microsoft.com/office/drawing/2014/main" id="{0EB5B3CD-8691-90CB-2946-01C3AAA53278}"/>
+              </a:ext>
+            </a:extLst>
+          </p:cNvPr>
+          <p:cNvSpPr/>
+          <p:nvPr/>
+        </p:nvSpPr>
+        <p:spPr>
+          <a:xfrm>
+            <a:off x="3428006" y="3717795"/>
+            <a:ext cx="1336018" cy="369574"/>
+          </a:xfrm>
+          <a:prstGeom prst="rect">
+            <a:avLst/>
+          </a:prstGeom>
+        </p:spPr>
+        <p:style>
+          <a:lnRef idx="2">
+            <a:schemeClr val="accent6">
+              <a:shade val="15000"/>
+            </a:schemeClr>
+          </a:lnRef>
+          <a:fillRef idx="1">
+            <a:schemeClr val="accent6"/>
+          </a:fillRef>
+          <a:effectRef idx="0">
+            <a:schemeClr val="accent6"/>
+          </a:effectRef>
+          <a:fontRef idx="minor">
+            <a:schemeClr val="lt1"/>
+          </a:fontRef>
+        </p:style>
+        <p:txBody>
+          <a:bodyPr rtlCol="0" anchor="ctr"/>
+          <a:lstStyle/>
+          <a:p>
+            <a:pPr algn="ctr"/>
+            <a:r>
+              <a:rPr lang="en-US" sz="1100" b="1" dirty="0"/>
+              <a:t>Trust Firmware Attestation Client </a:t>
+            </a:r>
+            <a:endParaRPr lang="en-SG" sz="1100" b="1" dirty="0"/>
+          </a:p>
+        </p:txBody>
+      </p:sp>
+      <p:cxnSp>
+        <p:nvCxnSpPr>
+          <p:cNvPr id="20" name="Straight Arrow Connector 19">
+            <a:extLst>
+              <a:ext uri="{FF2B5EF4-FFF2-40B4-BE49-F238E27FC236}">
+                <a16:creationId xmlns:a16="http://schemas.microsoft.com/office/drawing/2014/main" id="{3201E51D-EBAE-8941-0DEE-3EF87B517549}"/>
+              </a:ext>
+            </a:extLst>
+          </p:cNvPr>
+          <p:cNvCxnSpPr>
+            <a:stCxn id="11" idx="2"/>
+          </p:cNvCxnSpPr>
+          <p:nvPr/>
+        </p:nvCxnSpPr>
+        <p:spPr>
+          <a:xfrm>
+            <a:off x="2617735" y="4178808"/>
+            <a:ext cx="0" cy="215500"/>
+          </a:xfrm>
+          <a:prstGeom prst="straightConnector1">
+            <a:avLst/>
+          </a:prstGeom>
+          <a:ln>
+            <a:headEnd type="triangle"/>
+            <a:tailEnd type="triangle"/>
+          </a:ln>
+        </p:spPr>
+        <p:style>
+          <a:lnRef idx="2">
+            <a:schemeClr val="accent1"/>
+          </a:lnRef>
+          <a:fillRef idx="0">
+            <a:schemeClr val="accent1"/>
+          </a:fillRef>
+          <a:effectRef idx="1">
+            <a:schemeClr val="accent1"/>
+          </a:effectRef>
+          <a:fontRef idx="minor">
+            <a:schemeClr val="tx1"/>
+          </a:fontRef>
+        </p:style>
+      </p:cxnSp>
+      <p:cxnSp>
+        <p:nvCxnSpPr>
+          <p:cNvPr id="21" name="Straight Arrow Connector 20">
+            <a:extLst>
+              <a:ext uri="{FF2B5EF4-FFF2-40B4-BE49-F238E27FC236}">
+                <a16:creationId xmlns:a16="http://schemas.microsoft.com/office/drawing/2014/main" id="{42E2768A-6991-4362-6386-625C40B93132}"/>
+              </a:ext>
+            </a:extLst>
+          </p:cNvPr>
+          <p:cNvCxnSpPr>
+            <a:cxnSpLocks/>
+          </p:cNvCxnSpPr>
+          <p:nvPr/>
+        </p:nvCxnSpPr>
+        <p:spPr>
+          <a:xfrm>
+            <a:off x="3593095" y="4087369"/>
+            <a:ext cx="0" cy="306939"/>
+          </a:xfrm>
+          <a:prstGeom prst="straightConnector1">
+            <a:avLst/>
+          </a:prstGeom>
+          <a:ln>
+            <a:headEnd type="triangle"/>
+            <a:tailEnd type="triangle"/>
+          </a:ln>
+        </p:spPr>
+        <p:style>
+          <a:lnRef idx="2">
+            <a:schemeClr val="accent1"/>
+          </a:lnRef>
+          <a:fillRef idx="0">
+            <a:schemeClr val="accent1"/>
+          </a:fillRef>
+          <a:effectRef idx="1">
+            <a:schemeClr val="accent1"/>
+          </a:effectRef>
+          <a:fontRef idx="minor">
+            <a:schemeClr val="tx1"/>
+          </a:fontRef>
+        </p:style>
+      </p:cxnSp>
+      <p:sp>
+        <p:nvSpPr>
+          <p:cNvPr id="24" name="TextBox 23">
+            <a:extLst>
+              <a:ext uri="{FF2B5EF4-FFF2-40B4-BE49-F238E27FC236}">
+                <a16:creationId xmlns:a16="http://schemas.microsoft.com/office/drawing/2014/main" id="{2D978F18-3C11-8089-2BE0-3F2335541429}"/>
+              </a:ext>
+            </a:extLst>
+          </p:cNvPr>
+          <p:cNvSpPr txBox="1"/>
+          <p:nvPr/>
+        </p:nvSpPr>
+        <p:spPr>
+          <a:xfrm>
+            <a:off x="3306465" y="3391740"/>
+            <a:ext cx="1880110" cy="276999"/>
+          </a:xfrm>
+          <a:prstGeom prst="rect">
+            <a:avLst/>
+          </a:prstGeom>
+          <a:noFill/>
+        </p:spPr>
+        <p:txBody>
+          <a:bodyPr wrap="square" rtlCol="0">
+            <a:spAutoFit/>
+          </a:bodyPr>
+          <a:lstStyle/>
+          <a:p>
+            <a:r>
+              <a:rPr lang="en-US" sz="1200" b="1" dirty="0">
+                <a:solidFill>
+                  <a:schemeClr val="tx1">
+                    <a:lumMod val="50000"/>
+                    <a:lumOff val="50000"/>
+                  </a:schemeClr>
+                </a:solidFill>
+              </a:rPr>
+              <a:t>Trust Client</a:t>
+            </a:r>
+            <a:endParaRPr lang="en-SG" sz="1200" b="1" dirty="0">
+              <a:solidFill>
+                <a:schemeClr val="tx1">
+                  <a:lumMod val="50000"/>
+                  <a:lumOff val="50000"/>
+                </a:schemeClr>
+              </a:solidFill>
+            </a:endParaRPr>
+          </a:p>
+        </p:txBody>
+      </p:sp>
+      <p:cxnSp>
+        <p:nvCxnSpPr>
+          <p:cNvPr id="25" name="Straight Arrow Connector 24">
+            <a:extLst>
+              <a:ext uri="{FF2B5EF4-FFF2-40B4-BE49-F238E27FC236}">
+                <a16:creationId xmlns:a16="http://schemas.microsoft.com/office/drawing/2014/main" id="{3C648C7B-C0A6-6E22-0673-BBBEBCA9ECBB}"/>
+              </a:ext>
+            </a:extLst>
+          </p:cNvPr>
+          <p:cNvCxnSpPr>
+            <a:cxnSpLocks/>
+          </p:cNvCxnSpPr>
+          <p:nvPr/>
+        </p:nvCxnSpPr>
+        <p:spPr>
+          <a:xfrm>
+            <a:off x="4493211" y="3326432"/>
+            <a:ext cx="0" cy="378681"/>
+          </a:xfrm>
+          <a:prstGeom prst="straightConnector1">
+            <a:avLst/>
+          </a:prstGeom>
+          <a:ln>
+            <a:headEnd type="triangle"/>
+            <a:tailEnd type="triangle"/>
+          </a:ln>
+        </p:spPr>
+        <p:style>
+          <a:lnRef idx="2">
+            <a:schemeClr val="accent1"/>
+          </a:lnRef>
+          <a:fillRef idx="0">
+            <a:schemeClr val="accent1"/>
+          </a:fillRef>
+          <a:effectRef idx="1">
+            <a:schemeClr val="accent1"/>
+          </a:effectRef>
+          <a:fontRef idx="minor">
+            <a:schemeClr val="tx1"/>
+          </a:fontRef>
+        </p:style>
+      </p:cxnSp>
+      <p:sp>
+        <p:nvSpPr>
+          <p:cNvPr id="27" name="Rectangle 26">
+            <a:extLst>
+              <a:ext uri="{FF2B5EF4-FFF2-40B4-BE49-F238E27FC236}">
+                <a16:creationId xmlns:a16="http://schemas.microsoft.com/office/drawing/2014/main" id="{3FDE1CDE-BFDF-24FA-702B-8496EE919F1A}"/>
+              </a:ext>
+            </a:extLst>
+          </p:cNvPr>
+          <p:cNvSpPr/>
+          <p:nvPr/>
+        </p:nvSpPr>
+        <p:spPr>
+          <a:xfrm>
+            <a:off x="3973658" y="2969803"/>
+            <a:ext cx="1411613" cy="350288"/>
+          </a:xfrm>
+          <a:prstGeom prst="rect">
+            <a:avLst/>
+          </a:prstGeom>
+          <a:solidFill>
+            <a:schemeClr val="tx1">
+              <a:lumMod val="65000"/>
+              <a:lumOff val="35000"/>
+            </a:schemeClr>
+          </a:solidFill>
+        </p:spPr>
+        <p:style>
+          <a:lnRef idx="2">
+            <a:schemeClr val="accent6">
+              <a:shade val="15000"/>
+            </a:schemeClr>
+          </a:lnRef>
+          <a:fillRef idx="1">
+            <a:schemeClr val="accent6"/>
+          </a:fillRef>
+          <a:effectRef idx="0">
+            <a:schemeClr val="accent6"/>
+          </a:effectRef>
+          <a:fontRef idx="minor">
+            <a:schemeClr val="lt1"/>
+          </a:fontRef>
+        </p:style>
+        <p:txBody>
+          <a:bodyPr rtlCol="0" anchor="ctr"/>
+          <a:lstStyle/>
+          <a:p>
+            <a:pPr algn="ctr"/>
+            <a:r>
+              <a:rPr lang="en-US" sz="900" b="1" dirty="0"/>
+              <a:t>Target IOT Firmware / Application</a:t>
+            </a:r>
+            <a:endParaRPr lang="en-SG" sz="900" b="1" dirty="0"/>
+          </a:p>
+        </p:txBody>
+      </p:sp>
+      <p:sp>
+        <p:nvSpPr>
+          <p:cNvPr id="28" name="TextBox 27">
+            <a:extLst>
+              <a:ext uri="{FF2B5EF4-FFF2-40B4-BE49-F238E27FC236}">
+                <a16:creationId xmlns:a16="http://schemas.microsoft.com/office/drawing/2014/main" id="{26856DA1-869D-FC24-04E3-DC8126D354C2}"/>
+              </a:ext>
+            </a:extLst>
+          </p:cNvPr>
+          <p:cNvSpPr txBox="1"/>
+          <p:nvPr/>
+        </p:nvSpPr>
+        <p:spPr>
+          <a:xfrm>
+            <a:off x="2702642" y="2391347"/>
+            <a:ext cx="2134534" cy="307777"/>
+          </a:xfrm>
+          <a:prstGeom prst="rect">
+            <a:avLst/>
+          </a:prstGeom>
+          <a:noFill/>
+        </p:spPr>
+        <p:txBody>
+          <a:bodyPr wrap="square" rtlCol="0">
+            <a:spAutoFit/>
+          </a:bodyPr>
+          <a:lstStyle/>
+          <a:p>
+            <a:r>
+              <a:rPr lang="en-US" sz="1400" b="1" dirty="0">
+                <a:solidFill>
+                  <a:schemeClr val="tx2">
+                    <a:lumMod val="75000"/>
+                    <a:lumOff val="25000"/>
+                  </a:schemeClr>
+                </a:solidFill>
+              </a:rPr>
+              <a:t>Raspbian Normal World </a:t>
+            </a:r>
+            <a:endParaRPr lang="en-SG" sz="1400" b="1" dirty="0">
+              <a:solidFill>
+                <a:schemeClr val="tx2">
+                  <a:lumMod val="75000"/>
+                  <a:lumOff val="25000"/>
+                </a:schemeClr>
+              </a:solidFill>
+            </a:endParaRPr>
+          </a:p>
+        </p:txBody>
+      </p:sp>
+      <p:cxnSp>
+        <p:nvCxnSpPr>
+          <p:cNvPr id="29" name="Straight Arrow Connector 28">
+            <a:extLst>
+              <a:ext uri="{FF2B5EF4-FFF2-40B4-BE49-F238E27FC236}">
+                <a16:creationId xmlns:a16="http://schemas.microsoft.com/office/drawing/2014/main" id="{15658CE3-4F88-86A0-CB41-250FB9F2E29E}"/>
+              </a:ext>
+            </a:extLst>
+          </p:cNvPr>
+          <p:cNvCxnSpPr>
+            <a:cxnSpLocks/>
+          </p:cNvCxnSpPr>
+          <p:nvPr/>
+        </p:nvCxnSpPr>
+        <p:spPr>
+          <a:xfrm>
+            <a:off x="4819347" y="2189372"/>
+            <a:ext cx="0" cy="780431"/>
+          </a:xfrm>
+          <a:prstGeom prst="straightConnector1">
+            <a:avLst/>
+          </a:prstGeom>
+          <a:ln>
+            <a:headEnd type="triangle"/>
+            <a:tailEnd type="triangle"/>
+          </a:ln>
+        </p:spPr>
+        <p:style>
+          <a:lnRef idx="2">
+            <a:schemeClr val="accent1"/>
+          </a:lnRef>
+          <a:fillRef idx="0">
+            <a:schemeClr val="accent1"/>
+          </a:fillRef>
+          <a:effectRef idx="1">
+            <a:schemeClr val="accent1"/>
+          </a:effectRef>
+          <a:fontRef idx="minor">
+            <a:schemeClr val="tx1"/>
+          </a:fontRef>
+        </p:style>
+      </p:cxnSp>
+      <p:sp>
+        <p:nvSpPr>
+          <p:cNvPr id="31" name="Cloud 30">
+            <a:extLst>
+              <a:ext uri="{FF2B5EF4-FFF2-40B4-BE49-F238E27FC236}">
+                <a16:creationId xmlns:a16="http://schemas.microsoft.com/office/drawing/2014/main" id="{095E401F-B891-D5FF-0F7C-F9A5D865870E}"/>
+              </a:ext>
+            </a:extLst>
+          </p:cNvPr>
+          <p:cNvSpPr/>
+          <p:nvPr/>
+        </p:nvSpPr>
+        <p:spPr>
+          <a:xfrm>
+            <a:off x="6247250" y="2994986"/>
+            <a:ext cx="1027532" cy="675965"/>
+          </a:xfrm>
+          <a:prstGeom prst="cloud">
+            <a:avLst/>
+          </a:prstGeom>
+        </p:spPr>
+        <p:style>
+          <a:lnRef idx="2">
+            <a:schemeClr val="accent1">
+              <a:shade val="15000"/>
+            </a:schemeClr>
+          </a:lnRef>
+          <a:fillRef idx="1">
+            <a:schemeClr val="accent1"/>
+          </a:fillRef>
+          <a:effectRef idx="0">
+            <a:schemeClr val="accent1"/>
+          </a:effectRef>
+          <a:fontRef idx="minor">
+            <a:schemeClr val="lt1"/>
+          </a:fontRef>
+        </p:style>
+        <p:txBody>
+          <a:bodyPr rtlCol="0" anchor="ctr"/>
+          <a:lstStyle/>
+          <a:p>
+            <a:pPr algn="ctr"/>
+            <a:r>
+              <a:rPr lang="en-US" dirty="0"/>
+              <a:t> </a:t>
+            </a:r>
+            <a:endParaRPr lang="en-SG" dirty="0"/>
+          </a:p>
+        </p:txBody>
+      </p:sp>
+      <p:sp>
+        <p:nvSpPr>
+          <p:cNvPr id="32" name="TextBox 31">
+            <a:extLst>
+              <a:ext uri="{FF2B5EF4-FFF2-40B4-BE49-F238E27FC236}">
+                <a16:creationId xmlns:a16="http://schemas.microsoft.com/office/drawing/2014/main" id="{13F90765-3BFA-7B2D-D350-8274FF96F42A}"/>
+              </a:ext>
+            </a:extLst>
+          </p:cNvPr>
+          <p:cNvSpPr txBox="1"/>
+          <p:nvPr/>
+        </p:nvSpPr>
+        <p:spPr>
+          <a:xfrm>
+            <a:off x="6349343" y="3147192"/>
+            <a:ext cx="823167" cy="261610"/>
+          </a:xfrm>
+          <a:prstGeom prst="rect">
+            <a:avLst/>
+          </a:prstGeom>
+          <a:noFill/>
+        </p:spPr>
+        <p:txBody>
+          <a:bodyPr wrap="square" rtlCol="0">
+            <a:spAutoFit/>
+          </a:bodyPr>
+          <a:lstStyle/>
+          <a:p>
+            <a:r>
+              <a:rPr lang="en-US" sz="1100" b="1" dirty="0">
+                <a:solidFill>
+                  <a:schemeClr val="bg1"/>
+                </a:solidFill>
+              </a:rPr>
+              <a:t>Network</a:t>
+            </a:r>
+            <a:r>
+              <a:rPr lang="en-US" sz="1100" b="1" dirty="0"/>
+              <a:t> </a:t>
+            </a:r>
+            <a:endParaRPr lang="en-SG" sz="1100" b="1" dirty="0"/>
+          </a:p>
+        </p:txBody>
+      </p:sp>
+      <p:sp>
+        <p:nvSpPr>
+          <p:cNvPr id="34" name="Rectangle 33">
+            <a:extLst>
+              <a:ext uri="{FF2B5EF4-FFF2-40B4-BE49-F238E27FC236}">
+                <a16:creationId xmlns:a16="http://schemas.microsoft.com/office/drawing/2014/main" id="{3FAC78E6-44D2-87B7-B72A-205383D419F6}"/>
+              </a:ext>
+            </a:extLst>
+          </p:cNvPr>
+          <p:cNvSpPr/>
+          <p:nvPr/>
+        </p:nvSpPr>
+        <p:spPr>
+          <a:xfrm>
+            <a:off x="7813417" y="2404872"/>
+            <a:ext cx="2025096" cy="2293544"/>
+          </a:xfrm>
+          <a:prstGeom prst="rect">
+            <a:avLst/>
+          </a:prstGeom>
+          <a:noFill/>
+          <a:ln w="19050">
+            <a:solidFill>
+              <a:schemeClr val="tx2">
+                <a:lumMod val="50000"/>
+                <a:lumOff val="50000"/>
+              </a:schemeClr>
+            </a:solidFill>
+            <a:prstDash val="sysDash"/>
+          </a:ln>
+        </p:spPr>
+        <p:style>
+          <a:lnRef idx="2">
+            <a:schemeClr val="accent1">
+              <a:shade val="15000"/>
+            </a:schemeClr>
+          </a:lnRef>
+          <a:fillRef idx="1">
+            <a:schemeClr val="accent1"/>
+          </a:fillRef>
+          <a:effectRef idx="0">
+            <a:schemeClr val="accent1"/>
+          </a:effectRef>
+          <a:fontRef idx="minor">
+            <a:schemeClr val="lt1"/>
+          </a:fontRef>
+        </p:style>
+        <p:txBody>
+          <a:bodyPr rtlCol="0" anchor="ctr"/>
+          <a:lstStyle/>
+          <a:p>
+            <a:pPr algn="ctr"/>
+            <a:endParaRPr lang="en-SG" dirty="0">
+              <a:ln>
+                <a:solidFill>
+                  <a:schemeClr val="tx1"/>
+                </a:solidFill>
+                <a:prstDash val="sysDash"/>
+              </a:ln>
+            </a:endParaRPr>
+          </a:p>
+        </p:txBody>
+      </p:sp>
+      <p:pic>
+        <p:nvPicPr>
+          <p:cNvPr id="33" name="Picture 4" descr="Top Networking Interview Questions (2023) - InterviewBit">
+            <a:extLst>
+              <a:ext uri="{FF2B5EF4-FFF2-40B4-BE49-F238E27FC236}">
+                <a16:creationId xmlns:a16="http://schemas.microsoft.com/office/drawing/2014/main" id="{42B0A695-4C73-C09E-D1E5-65E29FE25C57}"/>
+              </a:ext>
+            </a:extLst>
+          </p:cNvPr>
+          <p:cNvPicPr>
+            <a:picLocks noChangeAspect="1" noChangeArrowheads="1"/>
+          </p:cNvPicPr>
+          <p:nvPr/>
+        </p:nvPicPr>
+        <p:blipFill rotWithShape="1">
+          <a:blip r:embed="rId5">
+            <a:extLst>
+              <a:ext uri="{28A0092B-C50C-407E-A947-70E740481C1C}">
+                <a14:useLocalDpi xmlns:a14="http://schemas.microsoft.com/office/drawing/2010/main" val="0"/>
+              </a:ext>
+            </a:extLst>
+          </a:blip>
+          <a:srcRect t="9019"/>
+          <a:stretch/>
+        </p:blipFill>
+        <p:spPr bwMode="auto">
+          <a:xfrm>
+            <a:off x="7931815" y="2112731"/>
+            <a:ext cx="606152" cy="489100"/>
+          </a:xfrm>
+          <a:prstGeom prst="rect">
+            <a:avLst/>
+          </a:prstGeom>
+          <a:noFill/>
+          <a:ln w="9525">
+            <a:solidFill>
+              <a:srgbClr val="0070C0"/>
+            </a:solidFill>
+            <a:prstDash val="dash"/>
+          </a:ln>
+          <a:extLst>
+            <a:ext uri="{909E8E84-426E-40DD-AFC4-6F175D3DCCD1}">
+              <a14:hiddenFill xmlns:a14="http://schemas.microsoft.com/office/drawing/2010/main">
+                <a:solidFill>
+                  <a:srgbClr val="FFFFFF"/>
+                </a:solidFill>
+              </a14:hiddenFill>
+            </a:ext>
+          </a:extLst>
+        </p:spPr>
+      </p:pic>
+      <p:sp>
+        <p:nvSpPr>
+          <p:cNvPr id="35" name="TextBox 34">
+            <a:extLst>
+              <a:ext uri="{FF2B5EF4-FFF2-40B4-BE49-F238E27FC236}">
+                <a16:creationId xmlns:a16="http://schemas.microsoft.com/office/drawing/2014/main" id="{0340DA19-7CD6-DD20-AF92-3903E384FA5C}"/>
+              </a:ext>
+            </a:extLst>
+          </p:cNvPr>
+          <p:cNvSpPr txBox="1"/>
+          <p:nvPr/>
+        </p:nvSpPr>
+        <p:spPr>
+          <a:xfrm>
+            <a:off x="8537967" y="2049145"/>
+            <a:ext cx="1497749" cy="307777"/>
+          </a:xfrm>
+          <a:prstGeom prst="rect">
+            <a:avLst/>
+          </a:prstGeom>
+          <a:noFill/>
+        </p:spPr>
+        <p:txBody>
+          <a:bodyPr wrap="square" rtlCol="0">
+            <a:spAutoFit/>
+          </a:bodyPr>
+          <a:lstStyle/>
+          <a:p>
+            <a:r>
+              <a:rPr lang="en-US" sz="1400" b="1" dirty="0"/>
+              <a:t>IoT Control Hub </a:t>
+            </a:r>
+            <a:endParaRPr lang="en-SG" sz="1400" b="1" dirty="0"/>
+          </a:p>
+        </p:txBody>
+      </p:sp>
+      <p:cxnSp>
+        <p:nvCxnSpPr>
+          <p:cNvPr id="37" name="Straight Arrow Connector 36">
+            <a:extLst>
+              <a:ext uri="{FF2B5EF4-FFF2-40B4-BE49-F238E27FC236}">
+                <a16:creationId xmlns:a16="http://schemas.microsoft.com/office/drawing/2014/main" id="{6EC14D62-5270-258A-5E2F-1C58235F913E}"/>
+              </a:ext>
+            </a:extLst>
+          </p:cNvPr>
+          <p:cNvCxnSpPr>
+            <a:stCxn id="27" idx="3"/>
+          </p:cNvCxnSpPr>
+          <p:nvPr/>
+        </p:nvCxnSpPr>
+        <p:spPr>
+          <a:xfrm>
+            <a:off x="5385271" y="3144947"/>
+            <a:ext cx="861979" cy="0"/>
+          </a:xfrm>
+          <a:prstGeom prst="straightConnector1">
+            <a:avLst/>
+          </a:prstGeom>
+          <a:ln>
+            <a:tailEnd type="triangle"/>
+          </a:ln>
+        </p:spPr>
+        <p:style>
+          <a:lnRef idx="2">
+            <a:schemeClr val="accent1"/>
+          </a:lnRef>
+          <a:fillRef idx="0">
+            <a:schemeClr val="accent1"/>
+          </a:fillRef>
+          <a:effectRef idx="1">
+            <a:schemeClr val="accent1"/>
+          </a:effectRef>
+          <a:fontRef idx="minor">
+            <a:schemeClr val="tx1"/>
+          </a:fontRef>
+        </p:style>
+      </p:cxnSp>
+      <p:cxnSp>
+        <p:nvCxnSpPr>
+          <p:cNvPr id="38" name="Straight Arrow Connector 37">
+            <a:extLst>
+              <a:ext uri="{FF2B5EF4-FFF2-40B4-BE49-F238E27FC236}">
+                <a16:creationId xmlns:a16="http://schemas.microsoft.com/office/drawing/2014/main" id="{2E0DA519-14F4-9D7A-6A3F-E8B0A5567B74}"/>
+              </a:ext>
+            </a:extLst>
+          </p:cNvPr>
+          <p:cNvCxnSpPr/>
+          <p:nvPr/>
+        </p:nvCxnSpPr>
+        <p:spPr>
+          <a:xfrm>
+            <a:off x="7274782" y="3082754"/>
+            <a:ext cx="861979" cy="0"/>
+          </a:xfrm>
+          <a:prstGeom prst="straightConnector1">
+            <a:avLst/>
+          </a:prstGeom>
+          <a:ln>
+            <a:tailEnd type="triangle"/>
+          </a:ln>
+        </p:spPr>
+        <p:style>
+          <a:lnRef idx="2">
+            <a:schemeClr val="accent1"/>
+          </a:lnRef>
+          <a:fillRef idx="0">
+            <a:schemeClr val="accent1"/>
+          </a:fillRef>
+          <a:effectRef idx="1">
+            <a:schemeClr val="accent1"/>
+          </a:effectRef>
+          <a:fontRef idx="minor">
+            <a:schemeClr val="tx1"/>
+          </a:fontRef>
+        </p:style>
+      </p:cxnSp>
+      <p:sp>
+        <p:nvSpPr>
+          <p:cNvPr id="39" name="Rectangle 38">
+            <a:extLst>
+              <a:ext uri="{FF2B5EF4-FFF2-40B4-BE49-F238E27FC236}">
+                <a16:creationId xmlns:a16="http://schemas.microsoft.com/office/drawing/2014/main" id="{80A7348C-00B6-FC03-B91B-48C2072D7E25}"/>
+              </a:ext>
+            </a:extLst>
+          </p:cNvPr>
+          <p:cNvSpPr/>
+          <p:nvPr/>
+        </p:nvSpPr>
+        <p:spPr>
+          <a:xfrm>
+            <a:off x="8154693" y="2866985"/>
+            <a:ext cx="1411613" cy="350288"/>
+          </a:xfrm>
+          <a:prstGeom prst="rect">
+            <a:avLst/>
+          </a:prstGeom>
+          <a:solidFill>
+            <a:schemeClr val="tx1">
+              <a:lumMod val="65000"/>
+              <a:lumOff val="35000"/>
+            </a:schemeClr>
+          </a:solidFill>
+        </p:spPr>
+        <p:style>
+          <a:lnRef idx="2">
+            <a:schemeClr val="accent6">
+              <a:shade val="15000"/>
+            </a:schemeClr>
+          </a:lnRef>
+          <a:fillRef idx="1">
+            <a:schemeClr val="accent6"/>
+          </a:fillRef>
+          <a:effectRef idx="0">
+            <a:schemeClr val="accent6"/>
+          </a:effectRef>
+          <a:fontRef idx="minor">
+            <a:schemeClr val="lt1"/>
+          </a:fontRef>
+        </p:style>
+        <p:txBody>
+          <a:bodyPr rtlCol="0" anchor="ctr"/>
+          <a:lstStyle/>
+          <a:p>
+            <a:pPr algn="ctr"/>
+            <a:r>
+              <a:rPr lang="en-US" sz="900" b="1" dirty="0"/>
+              <a:t>IoT Function Handling Service</a:t>
+            </a:r>
+            <a:endParaRPr lang="en-SG" sz="900" b="1" dirty="0"/>
+          </a:p>
+        </p:txBody>
+      </p:sp>
+      <p:cxnSp>
+        <p:nvCxnSpPr>
+          <p:cNvPr id="41" name="Connector: Elbow 40">
+            <a:extLst>
+              <a:ext uri="{FF2B5EF4-FFF2-40B4-BE49-F238E27FC236}">
+                <a16:creationId xmlns:a16="http://schemas.microsoft.com/office/drawing/2014/main" id="{6F03D900-BF67-29DA-456E-922A22D88312}"/>
+              </a:ext>
+            </a:extLst>
+          </p:cNvPr>
+          <p:cNvCxnSpPr>
+            <a:stCxn id="18" idx="3"/>
+          </p:cNvCxnSpPr>
+          <p:nvPr/>
+        </p:nvCxnSpPr>
+        <p:spPr>
+          <a:xfrm flipV="1">
+            <a:off x="4764024" y="3515772"/>
+            <a:ext cx="1483226" cy="386810"/>
+          </a:xfrm>
+          <a:prstGeom prst="bentConnector3">
+            <a:avLst>
+              <a:gd name="adj1" fmla="val 27190"/>
+            </a:avLst>
+          </a:prstGeom>
+          <a:ln>
+            <a:solidFill>
+              <a:schemeClr val="accent6">
+                <a:lumMod val="75000"/>
+              </a:schemeClr>
+            </a:solidFill>
+            <a:tailEnd type="triangle"/>
+          </a:ln>
+        </p:spPr>
+        <p:style>
+          <a:lnRef idx="2">
+            <a:schemeClr val="accent1"/>
+          </a:lnRef>
+          <a:fillRef idx="0">
+            <a:schemeClr val="accent1"/>
+          </a:fillRef>
+          <a:effectRef idx="1">
+            <a:schemeClr val="accent1"/>
+          </a:effectRef>
+          <a:fontRef idx="minor">
+            <a:schemeClr val="tx1"/>
+          </a:fontRef>
+        </p:style>
+      </p:cxnSp>
+      <p:sp>
+        <p:nvSpPr>
+          <p:cNvPr id="42" name="Rectangle 41">
+            <a:extLst>
+              <a:ext uri="{FF2B5EF4-FFF2-40B4-BE49-F238E27FC236}">
+                <a16:creationId xmlns:a16="http://schemas.microsoft.com/office/drawing/2014/main" id="{A9140DB7-2B31-320E-EAF4-9261C7743E9C}"/>
+              </a:ext>
+            </a:extLst>
+          </p:cNvPr>
+          <p:cNvSpPr/>
+          <p:nvPr/>
+        </p:nvSpPr>
+        <p:spPr>
+          <a:xfrm>
+            <a:off x="8284366" y="4192625"/>
+            <a:ext cx="1411614" cy="369574"/>
+          </a:xfrm>
+          <a:prstGeom prst="rect">
+            <a:avLst/>
+          </a:prstGeom>
+        </p:spPr>
+        <p:style>
+          <a:lnRef idx="2">
+            <a:schemeClr val="accent6">
+              <a:shade val="15000"/>
+            </a:schemeClr>
+          </a:lnRef>
+          <a:fillRef idx="1">
+            <a:schemeClr val="accent6"/>
+          </a:fillRef>
+          <a:effectRef idx="0">
+            <a:schemeClr val="accent6"/>
+          </a:effectRef>
+          <a:fontRef idx="minor">
+            <a:schemeClr val="lt1"/>
+          </a:fontRef>
+        </p:style>
+        <p:txBody>
+          <a:bodyPr rtlCol="0" anchor="ctr"/>
+          <a:lstStyle/>
+          <a:p>
+            <a:pPr algn="ctr"/>
+            <a:r>
+              <a:rPr lang="en-US" sz="1100" b="1" dirty="0"/>
+              <a:t>Trust Firmware Attestation Service </a:t>
+            </a:r>
+            <a:endParaRPr lang="en-SG" sz="1100" b="1" dirty="0"/>
+          </a:p>
+        </p:txBody>
+      </p:sp>
+      <p:cxnSp>
+        <p:nvCxnSpPr>
+          <p:cNvPr id="43" name="Connector: Elbow 42">
+            <a:extLst>
+              <a:ext uri="{FF2B5EF4-FFF2-40B4-BE49-F238E27FC236}">
+                <a16:creationId xmlns:a16="http://schemas.microsoft.com/office/drawing/2014/main" id="{3BF0F119-4289-D1C0-A210-E8AF84B9B58A}"/>
+              </a:ext>
+            </a:extLst>
+          </p:cNvPr>
+          <p:cNvCxnSpPr>
+            <a:cxnSpLocks/>
+            <a:endCxn id="42" idx="1"/>
+          </p:cNvCxnSpPr>
+          <p:nvPr/>
+        </p:nvCxnSpPr>
+        <p:spPr>
+          <a:xfrm>
+            <a:off x="7274782" y="3482427"/>
+            <a:ext cx="1009584" cy="894985"/>
+          </a:xfrm>
+          <a:prstGeom prst="bentConnector3">
+            <a:avLst>
+              <a:gd name="adj1" fmla="val 72643"/>
+            </a:avLst>
+          </a:prstGeom>
+          <a:ln>
+            <a:solidFill>
+              <a:schemeClr val="accent6">
+                <a:lumMod val="75000"/>
+              </a:schemeClr>
+            </a:solidFill>
+            <a:tailEnd type="triangle"/>
+          </a:ln>
+        </p:spPr>
+        <p:style>
+          <a:lnRef idx="2">
+            <a:schemeClr val="accent1"/>
+          </a:lnRef>
+          <a:fillRef idx="0">
+            <a:schemeClr val="accent1"/>
+          </a:fillRef>
+          <a:effectRef idx="1">
+            <a:schemeClr val="accent1"/>
+          </a:effectRef>
+          <a:fontRef idx="minor">
+            <a:schemeClr val="tx1"/>
+          </a:fontRef>
+        </p:style>
+      </p:cxnSp>
+      <p:cxnSp>
+        <p:nvCxnSpPr>
+          <p:cNvPr id="50" name="Straight Arrow Connector 49">
+            <a:extLst>
+              <a:ext uri="{FF2B5EF4-FFF2-40B4-BE49-F238E27FC236}">
+                <a16:creationId xmlns:a16="http://schemas.microsoft.com/office/drawing/2014/main" id="{96C74105-4FAD-8648-D28D-F2DC208595BD}"/>
+              </a:ext>
+            </a:extLst>
+          </p:cNvPr>
+          <p:cNvCxnSpPr>
+            <a:cxnSpLocks/>
+          </p:cNvCxnSpPr>
+          <p:nvPr/>
+        </p:nvCxnSpPr>
+        <p:spPr>
+          <a:xfrm>
+            <a:off x="8412939" y="3252057"/>
+            <a:ext cx="0" cy="863798"/>
+          </a:xfrm>
+          <a:prstGeom prst="straightConnector1">
+            <a:avLst/>
+          </a:prstGeom>
+          <a:ln>
+            <a:headEnd type="triangle"/>
+            <a:tailEnd type="triangle"/>
+          </a:ln>
+        </p:spPr>
+        <p:style>
+          <a:lnRef idx="2">
+            <a:schemeClr val="accent1"/>
+          </a:lnRef>
+          <a:fillRef idx="0">
+            <a:schemeClr val="accent1"/>
+          </a:fillRef>
+          <a:effectRef idx="1">
+            <a:schemeClr val="accent1"/>
+          </a:effectRef>
+          <a:fontRef idx="minor">
+            <a:schemeClr val="tx1"/>
+          </a:fontRef>
+        </p:style>
+      </p:cxnSp>
+      <p:sp>
+        <p:nvSpPr>
+          <p:cNvPr id="51" name="TextBox 50">
+            <a:extLst>
+              <a:ext uri="{FF2B5EF4-FFF2-40B4-BE49-F238E27FC236}">
+                <a16:creationId xmlns:a16="http://schemas.microsoft.com/office/drawing/2014/main" id="{570216C7-4CC7-4178-468A-976A14257D8A}"/>
+              </a:ext>
+            </a:extLst>
+          </p:cNvPr>
+          <p:cNvSpPr txBox="1"/>
+          <p:nvPr/>
+        </p:nvSpPr>
+        <p:spPr>
+          <a:xfrm>
+            <a:off x="5759402" y="2591028"/>
+            <a:ext cx="1880110" cy="461665"/>
+          </a:xfrm>
+          <a:prstGeom prst="rect">
+            <a:avLst/>
+          </a:prstGeom>
+          <a:noFill/>
+        </p:spPr>
+        <p:txBody>
+          <a:bodyPr wrap="square" rtlCol="0">
+            <a:spAutoFit/>
+          </a:bodyPr>
+          <a:lstStyle/>
+          <a:p>
+            <a:r>
+              <a:rPr lang="en-US" sz="1200" b="1" dirty="0"/>
+              <a:t>Normal IoT data communication channel</a:t>
+            </a:r>
+            <a:endParaRPr lang="en-SG" sz="1200" b="1" dirty="0"/>
+          </a:p>
+        </p:txBody>
+      </p:sp>
+      <p:sp>
+        <p:nvSpPr>
+          <p:cNvPr id="52" name="TextBox 51">
+            <a:extLst>
+              <a:ext uri="{FF2B5EF4-FFF2-40B4-BE49-F238E27FC236}">
+                <a16:creationId xmlns:a16="http://schemas.microsoft.com/office/drawing/2014/main" id="{1006415F-B0B7-0935-1175-F5989C931C65}"/>
+              </a:ext>
+            </a:extLst>
+          </p:cNvPr>
+          <p:cNvSpPr txBox="1"/>
+          <p:nvPr/>
+        </p:nvSpPr>
+        <p:spPr>
+          <a:xfrm>
+            <a:off x="5856348" y="3654190"/>
+            <a:ext cx="2025096" cy="461665"/>
+          </a:xfrm>
+          <a:prstGeom prst="rect">
+            <a:avLst/>
+          </a:prstGeom>
+          <a:noFill/>
+        </p:spPr>
+        <p:txBody>
+          <a:bodyPr wrap="square" rtlCol="0">
+            <a:spAutoFit/>
+          </a:bodyPr>
+          <a:lstStyle/>
+          <a:p>
+            <a:r>
+              <a:rPr lang="en-US" sz="1200" b="1" dirty="0">
+                <a:solidFill>
+                  <a:schemeClr val="accent6">
+                    <a:lumMod val="75000"/>
+                  </a:schemeClr>
+                </a:solidFill>
+              </a:rPr>
+              <a:t>Encrypted firmware attestation data channel</a:t>
+            </a:r>
+            <a:endParaRPr lang="en-SG" sz="1200" b="1" dirty="0">
+              <a:solidFill>
+                <a:schemeClr val="accent6">
+                  <a:lumMod val="75000"/>
+                </a:schemeClr>
+              </a:solidFill>
+            </a:endParaRPr>
+          </a:p>
+        </p:txBody>
+      </p:sp>
+      <p:sp>
+        <p:nvSpPr>
+          <p:cNvPr id="59" name="Cylinder 58">
+            <a:extLst>
+              <a:ext uri="{FF2B5EF4-FFF2-40B4-BE49-F238E27FC236}">
+                <a16:creationId xmlns:a16="http://schemas.microsoft.com/office/drawing/2014/main" id="{CA5A3EE0-42B4-660B-17E3-D6C91CBB314E}"/>
+              </a:ext>
+            </a:extLst>
+          </p:cNvPr>
+          <p:cNvSpPr/>
+          <p:nvPr/>
+        </p:nvSpPr>
+        <p:spPr>
+          <a:xfrm>
+            <a:off x="8693216" y="3551644"/>
+            <a:ext cx="887984" cy="350288"/>
+          </a:xfrm>
+          <a:prstGeom prst="can">
+            <a:avLst/>
+          </a:prstGeom>
+        </p:spPr>
+        <p:style>
+          <a:lnRef idx="2">
+            <a:schemeClr val="accent1">
+              <a:shade val="15000"/>
+            </a:schemeClr>
+          </a:lnRef>
+          <a:fillRef idx="1">
+            <a:schemeClr val="accent1"/>
+          </a:fillRef>
+          <a:effectRef idx="0">
+            <a:schemeClr val="accent1"/>
+          </a:effectRef>
+          <a:fontRef idx="minor">
+            <a:schemeClr val="lt1"/>
+          </a:fontRef>
+        </p:style>
+        <p:txBody>
+          <a:bodyPr rtlCol="0" anchor="ctr"/>
+          <a:lstStyle/>
+          <a:p>
+            <a:pPr algn="ctr"/>
+            <a:r>
+              <a:rPr lang="en-US" sz="1200" dirty="0"/>
+              <a:t>Database</a:t>
+            </a:r>
+            <a:endParaRPr lang="en-SG" sz="1200" dirty="0"/>
+          </a:p>
+        </p:txBody>
+      </p:sp>
+      <p:cxnSp>
+        <p:nvCxnSpPr>
+          <p:cNvPr id="60" name="Straight Arrow Connector 59">
+            <a:extLst>
+              <a:ext uri="{FF2B5EF4-FFF2-40B4-BE49-F238E27FC236}">
+                <a16:creationId xmlns:a16="http://schemas.microsoft.com/office/drawing/2014/main" id="{515A5F4C-F7E5-B389-BA2E-2CA1D45B935D}"/>
+              </a:ext>
+            </a:extLst>
+          </p:cNvPr>
+          <p:cNvCxnSpPr>
+            <a:cxnSpLocks/>
+          </p:cNvCxnSpPr>
+          <p:nvPr/>
+        </p:nvCxnSpPr>
+        <p:spPr>
+          <a:xfrm>
+            <a:off x="9137208" y="3242953"/>
+            <a:ext cx="0" cy="313602"/>
+          </a:xfrm>
+          <a:prstGeom prst="straightConnector1">
+            <a:avLst/>
+          </a:prstGeom>
+          <a:ln>
+            <a:headEnd type="triangle"/>
+            <a:tailEnd type="triangle"/>
+          </a:ln>
+        </p:spPr>
+        <p:style>
+          <a:lnRef idx="2">
+            <a:schemeClr val="accent1"/>
+          </a:lnRef>
+          <a:fillRef idx="0">
+            <a:schemeClr val="accent1"/>
+          </a:fillRef>
+          <a:effectRef idx="1">
+            <a:schemeClr val="accent1"/>
+          </a:effectRef>
+          <a:fontRef idx="minor">
+            <a:schemeClr val="tx1"/>
+          </a:fontRef>
+        </p:style>
+      </p:cxnSp>
+      <p:cxnSp>
+        <p:nvCxnSpPr>
+          <p:cNvPr id="63" name="Straight Arrow Connector 62">
+            <a:extLst>
+              <a:ext uri="{FF2B5EF4-FFF2-40B4-BE49-F238E27FC236}">
+                <a16:creationId xmlns:a16="http://schemas.microsoft.com/office/drawing/2014/main" id="{604C416D-D81A-7799-C53A-30C2037A7645}"/>
+              </a:ext>
+            </a:extLst>
+          </p:cNvPr>
+          <p:cNvCxnSpPr>
+            <a:cxnSpLocks/>
+          </p:cNvCxnSpPr>
+          <p:nvPr/>
+        </p:nvCxnSpPr>
+        <p:spPr>
+          <a:xfrm>
+            <a:off x="9137208" y="3908472"/>
+            <a:ext cx="0" cy="270336"/>
+          </a:xfrm>
+          <a:prstGeom prst="straightConnector1">
+            <a:avLst/>
+          </a:prstGeom>
+          <a:ln>
+            <a:headEnd type="triangle"/>
+            <a:tailEnd type="triangle"/>
+          </a:ln>
+        </p:spPr>
+        <p:style>
+          <a:lnRef idx="2">
+            <a:schemeClr val="accent1"/>
+          </a:lnRef>
+          <a:fillRef idx="0">
+            <a:schemeClr val="accent1"/>
+          </a:fillRef>
+          <a:effectRef idx="1">
+            <a:schemeClr val="accent1"/>
+          </a:effectRef>
+          <a:fontRef idx="minor">
+            <a:schemeClr val="tx1"/>
+          </a:fontRef>
+        </p:style>
+      </p:cxnSp>
+      <p:sp>
+        <p:nvSpPr>
+          <p:cNvPr id="65" name="TextBox 64">
+            <a:extLst>
+              <a:ext uri="{FF2B5EF4-FFF2-40B4-BE49-F238E27FC236}">
+                <a16:creationId xmlns:a16="http://schemas.microsoft.com/office/drawing/2014/main" id="{253E5317-343A-7194-F684-E3E6646DDF1E}"/>
+              </a:ext>
+            </a:extLst>
+          </p:cNvPr>
+          <p:cNvSpPr txBox="1"/>
+          <p:nvPr/>
+        </p:nvSpPr>
+        <p:spPr>
+          <a:xfrm>
+            <a:off x="8638077" y="2370088"/>
+            <a:ext cx="1328144" cy="307777"/>
+          </a:xfrm>
+          <a:prstGeom prst="rect">
+            <a:avLst/>
+          </a:prstGeom>
+          <a:noFill/>
+        </p:spPr>
+        <p:txBody>
+          <a:bodyPr wrap="square" rtlCol="0">
+            <a:spAutoFit/>
+          </a:bodyPr>
+          <a:lstStyle/>
+          <a:p>
+            <a:r>
+              <a:rPr lang="en-US" sz="1400" b="1" dirty="0">
+                <a:solidFill>
+                  <a:schemeClr val="tx2">
+                    <a:lumMod val="75000"/>
+                    <a:lumOff val="25000"/>
+                  </a:schemeClr>
+                </a:solidFill>
+              </a:rPr>
+              <a:t>Cloud Server</a:t>
+            </a:r>
+            <a:endParaRPr lang="en-SG" sz="1400" b="1" dirty="0">
+              <a:solidFill>
+                <a:schemeClr val="tx2">
+                  <a:lumMod val="75000"/>
+                  <a:lumOff val="25000"/>
+                </a:schemeClr>
+              </a:solidFill>
+            </a:endParaRPr>
+          </a:p>
+        </p:txBody>
+      </p:sp>
+      <p:pic>
+        <p:nvPicPr>
+          <p:cNvPr id="66" name="Graphic 65" descr="Shield Tick with solid fill">
+            <a:extLst>
+              <a:ext uri="{FF2B5EF4-FFF2-40B4-BE49-F238E27FC236}">
+                <a16:creationId xmlns:a16="http://schemas.microsoft.com/office/drawing/2014/main" id="{73523D06-DEC3-5689-C7E2-22818981D901}"/>
+              </a:ext>
+            </a:extLst>
+          </p:cNvPr>
+          <p:cNvPicPr>
+            <a:picLocks noChangeAspect="1"/>
+          </p:cNvPicPr>
+          <p:nvPr/>
+        </p:nvPicPr>
+        <p:blipFill>
+          <a:blip r:embed="rId6">
+            <a:extLst>
+              <a:ext uri="{28A0092B-C50C-407E-A947-70E740481C1C}">
+                <a14:useLocalDpi xmlns:a14="http://schemas.microsoft.com/office/drawing/2010/main" val="0"/>
+              </a:ext>
+              <a:ext uri="{96DAC541-7B7A-43D3-8B79-37D633B846F1}">
+                <asvg:svgBlip xmlns:asvg="http://schemas.microsoft.com/office/drawing/2016/SVG/main" r:embed="rId7"/>
+              </a:ext>
+            </a:extLst>
+          </a:blip>
+          <a:stretch>
+            <a:fillRect/>
+          </a:stretch>
+        </p:blipFill>
+        <p:spPr>
+          <a:xfrm>
+            <a:off x="5064989" y="2603103"/>
+            <a:ext cx="484414" cy="484414"/>
+          </a:xfrm>
+          <a:prstGeom prst="rect">
+            <a:avLst/>
+          </a:prstGeom>
+        </p:spPr>
+      </p:pic>
+      <p:pic>
+        <p:nvPicPr>
+          <p:cNvPr id="67" name="Picture 66">
+            <a:extLst>
+              <a:ext uri="{FF2B5EF4-FFF2-40B4-BE49-F238E27FC236}">
+                <a16:creationId xmlns:a16="http://schemas.microsoft.com/office/drawing/2014/main" id="{AD3516E2-A209-C46E-AF46-409E682590A0}"/>
+              </a:ext>
+            </a:extLst>
+          </p:cNvPr>
+          <p:cNvPicPr>
+            <a:picLocks noChangeAspect="1"/>
+          </p:cNvPicPr>
+          <p:nvPr/>
+        </p:nvPicPr>
+        <p:blipFill>
+          <a:blip r:embed="rId8"/>
+          <a:stretch>
+            <a:fillRect/>
+          </a:stretch>
+        </p:blipFill>
+        <p:spPr>
+          <a:xfrm>
+            <a:off x="6002496" y="1557565"/>
+            <a:ext cx="489507" cy="542715"/>
+          </a:xfrm>
+          <a:prstGeom prst="rect">
+            <a:avLst/>
+          </a:prstGeom>
+          <a:ln w="9525">
+            <a:solidFill>
+              <a:schemeClr val="tx1"/>
+            </a:solidFill>
+          </a:ln>
+        </p:spPr>
+      </p:pic>
+      <p:sp>
+        <p:nvSpPr>
+          <p:cNvPr id="68" name="TextBox 67">
+            <a:extLst>
+              <a:ext uri="{FF2B5EF4-FFF2-40B4-BE49-F238E27FC236}">
+                <a16:creationId xmlns:a16="http://schemas.microsoft.com/office/drawing/2014/main" id="{BEA8052C-B190-F819-0ABA-721B11E546D8}"/>
+              </a:ext>
+            </a:extLst>
+          </p:cNvPr>
+          <p:cNvSpPr txBox="1"/>
+          <p:nvPr/>
+        </p:nvSpPr>
+        <p:spPr>
+          <a:xfrm>
+            <a:off x="6492003" y="1582994"/>
+            <a:ext cx="1144339" cy="461665"/>
+          </a:xfrm>
+          <a:prstGeom prst="rect">
+            <a:avLst/>
+          </a:prstGeom>
+          <a:noFill/>
+        </p:spPr>
+        <p:txBody>
+          <a:bodyPr wrap="square">
+            <a:spAutoFit/>
+          </a:bodyPr>
+          <a:lstStyle/>
+          <a:p>
+            <a:r>
+              <a:rPr lang="en-US" sz="1200" b="1" dirty="0">
+                <a:solidFill>
+                  <a:srgbClr val="FF0000"/>
+                </a:solidFill>
+              </a:rPr>
+              <a:t>Red team attacker</a:t>
+            </a:r>
+            <a:endParaRPr lang="en-SG" sz="1200" b="1" dirty="0">
+              <a:solidFill>
+                <a:srgbClr val="FF0000"/>
+              </a:solidFill>
+            </a:endParaRPr>
+          </a:p>
+        </p:txBody>
+      </p:sp>
+      <p:sp>
+        <p:nvSpPr>
+          <p:cNvPr id="73" name="TextBox 72">
+            <a:extLst>
+              <a:ext uri="{FF2B5EF4-FFF2-40B4-BE49-F238E27FC236}">
+                <a16:creationId xmlns:a16="http://schemas.microsoft.com/office/drawing/2014/main" id="{ECE6191F-A622-06D1-70F7-C1FC59420117}"/>
+              </a:ext>
+            </a:extLst>
+          </p:cNvPr>
+          <p:cNvSpPr txBox="1"/>
+          <p:nvPr/>
+        </p:nvSpPr>
+        <p:spPr>
+          <a:xfrm>
+            <a:off x="6240624" y="2069284"/>
+            <a:ext cx="1144339" cy="461665"/>
+          </a:xfrm>
+          <a:prstGeom prst="rect">
+            <a:avLst/>
+          </a:prstGeom>
+          <a:noFill/>
+        </p:spPr>
+        <p:txBody>
+          <a:bodyPr wrap="square">
+            <a:spAutoFit/>
+          </a:bodyPr>
+          <a:lstStyle/>
+          <a:p>
+            <a:r>
+              <a:rPr lang="en-US" sz="1200" b="1" dirty="0">
+                <a:solidFill>
+                  <a:srgbClr val="FF0000"/>
+                </a:solidFill>
+              </a:rPr>
+              <a:t>Firmware attack</a:t>
+            </a:r>
+            <a:endParaRPr lang="en-SG" sz="1200" b="1" dirty="0">
+              <a:solidFill>
+                <a:srgbClr val="FF0000"/>
+              </a:solidFill>
+            </a:endParaRPr>
+          </a:p>
+        </p:txBody>
+      </p:sp>
+      <p:cxnSp>
+        <p:nvCxnSpPr>
+          <p:cNvPr id="76" name="Connector: Elbow 75">
+            <a:extLst>
+              <a:ext uri="{FF2B5EF4-FFF2-40B4-BE49-F238E27FC236}">
+                <a16:creationId xmlns:a16="http://schemas.microsoft.com/office/drawing/2014/main" id="{983754C2-E06F-82D7-8BC3-445D9D3B0D5E}"/>
+              </a:ext>
+            </a:extLst>
+          </p:cNvPr>
+          <p:cNvCxnSpPr>
+            <a:stCxn id="67" idx="2"/>
+            <a:endCxn id="66" idx="0"/>
+          </p:cNvCxnSpPr>
+          <p:nvPr/>
+        </p:nvCxnSpPr>
+        <p:spPr>
+          <a:xfrm rot="5400000">
+            <a:off x="5525812" y="1881664"/>
+            <a:ext cx="502823" cy="940054"/>
+          </a:xfrm>
+          <a:prstGeom prst="bentConnector3">
+            <a:avLst>
+              <a:gd name="adj1" fmla="val 50000"/>
+            </a:avLst>
+          </a:prstGeom>
+          <a:ln>
+            <a:solidFill>
+              <a:srgbClr val="C00000"/>
+            </a:solidFill>
+            <a:tailEnd type="triangle"/>
+          </a:ln>
+        </p:spPr>
+        <p:style>
+          <a:lnRef idx="2">
+            <a:schemeClr val="accent1"/>
+          </a:lnRef>
+          <a:fillRef idx="0">
+            <a:schemeClr val="accent1"/>
+          </a:fillRef>
+          <a:effectRef idx="1">
+            <a:schemeClr val="accent1"/>
+          </a:effectRef>
+          <a:fontRef idx="minor">
+            <a:schemeClr val="tx1"/>
+          </a:fontRef>
+        </p:style>
+      </p:cxnSp>
+      <p:pic>
+        <p:nvPicPr>
+          <p:cNvPr id="78" name="Picture 77">
+            <a:extLst>
+              <a:ext uri="{FF2B5EF4-FFF2-40B4-BE49-F238E27FC236}">
+                <a16:creationId xmlns:a16="http://schemas.microsoft.com/office/drawing/2014/main" id="{E091A3B6-A1A6-1E19-1569-F5311959E3F5}"/>
+              </a:ext>
+            </a:extLst>
+          </p:cNvPr>
+          <p:cNvPicPr>
+            <a:picLocks noChangeAspect="1"/>
+          </p:cNvPicPr>
+          <p:nvPr/>
+        </p:nvPicPr>
+        <p:blipFill>
+          <a:blip r:embed="rId8"/>
+          <a:stretch>
+            <a:fillRect/>
+          </a:stretch>
+        </p:blipFill>
+        <p:spPr>
+          <a:xfrm>
+            <a:off x="7045158" y="4415932"/>
+            <a:ext cx="489507" cy="542715"/>
+          </a:xfrm>
+          <a:prstGeom prst="rect">
+            <a:avLst/>
+          </a:prstGeom>
+          <a:ln w="9525">
+            <a:solidFill>
+              <a:schemeClr val="tx1"/>
+            </a:solidFill>
+          </a:ln>
+        </p:spPr>
+      </p:pic>
+      <p:sp>
+        <p:nvSpPr>
+          <p:cNvPr id="79" name="TextBox 78">
+            <a:extLst>
+              <a:ext uri="{FF2B5EF4-FFF2-40B4-BE49-F238E27FC236}">
+                <a16:creationId xmlns:a16="http://schemas.microsoft.com/office/drawing/2014/main" id="{A346293D-AC06-FFFB-8045-5188DA974AD6}"/>
+              </a:ext>
+            </a:extLst>
+          </p:cNvPr>
+          <p:cNvSpPr txBox="1"/>
+          <p:nvPr/>
+        </p:nvSpPr>
+        <p:spPr>
+          <a:xfrm>
+            <a:off x="6865847" y="4007119"/>
+            <a:ext cx="1144339" cy="461665"/>
+          </a:xfrm>
+          <a:prstGeom prst="rect">
+            <a:avLst/>
+          </a:prstGeom>
+          <a:noFill/>
+        </p:spPr>
+        <p:txBody>
+          <a:bodyPr wrap="square">
+            <a:spAutoFit/>
+          </a:bodyPr>
+          <a:lstStyle/>
+          <a:p>
+            <a:r>
+              <a:rPr lang="en-US" sz="1200" b="1" dirty="0">
+                <a:solidFill>
+                  <a:srgbClr val="FF0000"/>
+                </a:solidFill>
+              </a:rPr>
+              <a:t>Red team attacker</a:t>
+            </a:r>
+            <a:endParaRPr lang="en-SG" sz="1200" b="1" dirty="0">
+              <a:solidFill>
+                <a:srgbClr val="FF0000"/>
+              </a:solidFill>
+            </a:endParaRPr>
+          </a:p>
+        </p:txBody>
+      </p:sp>
+      <p:pic>
+        <p:nvPicPr>
+          <p:cNvPr id="81" name="Graphic 80" descr="Shield Tick with solid fill">
+            <a:extLst>
+              <a:ext uri="{FF2B5EF4-FFF2-40B4-BE49-F238E27FC236}">
+                <a16:creationId xmlns:a16="http://schemas.microsoft.com/office/drawing/2014/main" id="{7B075C4C-F4E4-F143-E2AE-F659FF0F7ECE}"/>
+              </a:ext>
+            </a:extLst>
+          </p:cNvPr>
+          <p:cNvPicPr>
+            <a:picLocks noChangeAspect="1"/>
+          </p:cNvPicPr>
+          <p:nvPr/>
+        </p:nvPicPr>
+        <p:blipFill>
+          <a:blip r:embed="rId6">
+            <a:extLst>
+              <a:ext uri="{28A0092B-C50C-407E-A947-70E740481C1C}">
+                <a14:useLocalDpi xmlns:a14="http://schemas.microsoft.com/office/drawing/2010/main" val="0"/>
+              </a:ext>
+              <a:ext uri="{96DAC541-7B7A-43D3-8B79-37D633B846F1}">
+                <asvg:svgBlip xmlns:asvg="http://schemas.microsoft.com/office/drawing/2016/SVG/main" r:embed="rId7"/>
+              </a:ext>
+            </a:extLst>
+          </a:blip>
+          <a:stretch>
+            <a:fillRect/>
+          </a:stretch>
+        </p:blipFill>
+        <p:spPr>
+          <a:xfrm>
+            <a:off x="5363422" y="4227527"/>
+            <a:ext cx="484414" cy="484414"/>
+          </a:xfrm>
+          <a:prstGeom prst="rect">
+            <a:avLst/>
+          </a:prstGeom>
+        </p:spPr>
+      </p:pic>
+      <p:sp>
+        <p:nvSpPr>
+          <p:cNvPr id="74" name="Multiplication Sign 73">
+            <a:extLst>
+              <a:ext uri="{FF2B5EF4-FFF2-40B4-BE49-F238E27FC236}">
+                <a16:creationId xmlns:a16="http://schemas.microsoft.com/office/drawing/2014/main" id="{2A053231-AC75-8CBF-7D91-FEA894EFF553}"/>
+              </a:ext>
+            </a:extLst>
+          </p:cNvPr>
+          <p:cNvSpPr/>
+          <p:nvPr/>
+        </p:nvSpPr>
+        <p:spPr>
+          <a:xfrm>
+            <a:off x="5667782" y="2201802"/>
+            <a:ext cx="314741" cy="291385"/>
+          </a:xfrm>
+          <a:prstGeom prst="mathMultiply">
+            <a:avLst/>
+          </a:prstGeom>
+        </p:spPr>
+        <p:style>
+          <a:lnRef idx="2">
+            <a:schemeClr val="accent1">
+              <a:shade val="15000"/>
+            </a:schemeClr>
+          </a:lnRef>
+          <a:fillRef idx="1">
+            <a:schemeClr val="accent1"/>
+          </a:fillRef>
+          <a:effectRef idx="0">
+            <a:schemeClr val="accent1"/>
+          </a:effectRef>
+          <a:fontRef idx="minor">
+            <a:schemeClr val="lt1"/>
+          </a:fontRef>
+        </p:style>
+        <p:txBody>
+          <a:bodyPr rtlCol="0" anchor="ctr"/>
+          <a:lstStyle/>
+          <a:p>
+            <a:pPr algn="ctr"/>
+            <a:endParaRPr lang="en-SG"/>
+          </a:p>
+        </p:txBody>
+      </p:sp>
+      <p:cxnSp>
+        <p:nvCxnSpPr>
+          <p:cNvPr id="82" name="Connector: Elbow 81">
+            <a:extLst>
+              <a:ext uri="{FF2B5EF4-FFF2-40B4-BE49-F238E27FC236}">
+                <a16:creationId xmlns:a16="http://schemas.microsoft.com/office/drawing/2014/main" id="{8461BA9B-6F2A-036A-C475-A57358D89AF4}"/>
+              </a:ext>
+            </a:extLst>
+          </p:cNvPr>
+          <p:cNvCxnSpPr>
+            <a:cxnSpLocks/>
+            <a:stCxn id="78" idx="1"/>
+            <a:endCxn id="81" idx="3"/>
+          </p:cNvCxnSpPr>
+          <p:nvPr/>
+        </p:nvCxnSpPr>
+        <p:spPr>
+          <a:xfrm rot="10800000">
+            <a:off x="5847836" y="4469734"/>
+            <a:ext cx="1197322" cy="217556"/>
+          </a:xfrm>
+          <a:prstGeom prst="bentConnector3">
+            <a:avLst>
+              <a:gd name="adj1" fmla="val 50000"/>
+            </a:avLst>
+          </a:prstGeom>
+          <a:ln>
+            <a:solidFill>
+              <a:srgbClr val="C00000"/>
+            </a:solidFill>
+            <a:tailEnd type="triangle"/>
+          </a:ln>
+        </p:spPr>
+        <p:style>
+          <a:lnRef idx="2">
+            <a:schemeClr val="accent1"/>
+          </a:lnRef>
+          <a:fillRef idx="0">
+            <a:schemeClr val="accent1"/>
+          </a:fillRef>
+          <a:effectRef idx="1">
+            <a:schemeClr val="accent1"/>
+          </a:effectRef>
+          <a:fontRef idx="minor">
+            <a:schemeClr val="tx1"/>
+          </a:fontRef>
+        </p:style>
+      </p:cxnSp>
+      <p:sp>
+        <p:nvSpPr>
+          <p:cNvPr id="93" name="TextBox 92">
+            <a:extLst>
+              <a:ext uri="{FF2B5EF4-FFF2-40B4-BE49-F238E27FC236}">
+                <a16:creationId xmlns:a16="http://schemas.microsoft.com/office/drawing/2014/main" id="{DC376B90-87BE-F2A0-D986-9251B959A168}"/>
+              </a:ext>
+            </a:extLst>
+          </p:cNvPr>
+          <p:cNvSpPr txBox="1"/>
+          <p:nvPr/>
+        </p:nvSpPr>
+        <p:spPr>
+          <a:xfrm>
+            <a:off x="5924111" y="4666452"/>
+            <a:ext cx="1144339" cy="276999"/>
+          </a:xfrm>
+          <a:prstGeom prst="rect">
+            <a:avLst/>
+          </a:prstGeom>
+          <a:noFill/>
+        </p:spPr>
+        <p:txBody>
+          <a:bodyPr wrap="square">
+            <a:spAutoFit/>
+          </a:bodyPr>
+          <a:lstStyle/>
+          <a:p>
+            <a:r>
+              <a:rPr lang="en-US" sz="1200" b="1" dirty="0">
+                <a:solidFill>
+                  <a:srgbClr val="FF0000"/>
+                </a:solidFill>
+              </a:rPr>
+              <a:t>Replay attack</a:t>
+            </a:r>
+            <a:endParaRPr lang="en-SG" sz="1200" b="1" dirty="0">
+              <a:solidFill>
+                <a:srgbClr val="FF0000"/>
+              </a:solidFill>
+            </a:endParaRPr>
+          </a:p>
+        </p:txBody>
+      </p:sp>
+      <p:sp>
+        <p:nvSpPr>
+          <p:cNvPr id="94" name="Multiplication Sign 93">
+            <a:extLst>
+              <a:ext uri="{FF2B5EF4-FFF2-40B4-BE49-F238E27FC236}">
+                <a16:creationId xmlns:a16="http://schemas.microsoft.com/office/drawing/2014/main" id="{5E949688-D739-4F02-4804-30AEE0D10286}"/>
+              </a:ext>
+            </a:extLst>
+          </p:cNvPr>
+          <p:cNvSpPr/>
+          <p:nvPr/>
+        </p:nvSpPr>
+        <p:spPr>
+          <a:xfrm>
+            <a:off x="6012523" y="4331794"/>
+            <a:ext cx="314741" cy="291385"/>
+          </a:xfrm>
+          <a:prstGeom prst="mathMultiply">
+            <a:avLst/>
+          </a:prstGeom>
+        </p:spPr>
+        <p:style>
+          <a:lnRef idx="2">
+            <a:schemeClr val="accent1">
+              <a:shade val="15000"/>
+            </a:schemeClr>
+          </a:lnRef>
+          <a:fillRef idx="1">
+            <a:schemeClr val="accent1"/>
+          </a:fillRef>
+          <a:effectRef idx="0">
+            <a:schemeClr val="accent1"/>
+          </a:effectRef>
+          <a:fontRef idx="minor">
+            <a:schemeClr val="lt1"/>
+          </a:fontRef>
+        </p:style>
+        <p:txBody>
+          <a:bodyPr rtlCol="0" anchor="ctr"/>
+          <a:lstStyle/>
+          <a:p>
+            <a:pPr algn="ctr"/>
+            <a:endParaRPr lang="en-SG"/>
+          </a:p>
+        </p:txBody>
+      </p:sp>
+      <p:sp>
+        <p:nvSpPr>
+          <p:cNvPr id="95" name="TextBox 94">
+            <a:extLst>
+              <a:ext uri="{FF2B5EF4-FFF2-40B4-BE49-F238E27FC236}">
+                <a16:creationId xmlns:a16="http://schemas.microsoft.com/office/drawing/2014/main" id="{98680D49-D378-8A2A-0CFE-FB746A467F57}"/>
+              </a:ext>
+            </a:extLst>
+          </p:cNvPr>
+          <p:cNvSpPr txBox="1"/>
+          <p:nvPr/>
+        </p:nvSpPr>
+        <p:spPr>
+          <a:xfrm>
+            <a:off x="1642415" y="1032998"/>
+            <a:ext cx="3112466" cy="338554"/>
+          </a:xfrm>
+          <a:prstGeom prst="rect">
+            <a:avLst/>
+          </a:prstGeom>
+          <a:noFill/>
+          <a:ln w="12700">
+            <a:solidFill>
+              <a:schemeClr val="tx1"/>
+            </a:solidFill>
+            <a:prstDash val="sysDash"/>
+          </a:ln>
+        </p:spPr>
+        <p:txBody>
+          <a:bodyPr wrap="square">
+            <a:spAutoFit/>
+          </a:bodyPr>
+          <a:lstStyle/>
+          <a:p>
+            <a:r>
+              <a:rPr lang="en-US" sz="1600" b="1" dirty="0" err="1"/>
+              <a:t>TrustZone</a:t>
+            </a:r>
+            <a:r>
+              <a:rPr lang="en-US" sz="1600" b="1" dirty="0"/>
+              <a:t> Protected  IoT Device</a:t>
+            </a:r>
+            <a:endParaRPr lang="en-SG" sz="1600" b="1" dirty="0"/>
+          </a:p>
+        </p:txBody>
+      </p:sp>
+    </p:spTree>
+    <p:extLst>
+      <p:ext uri="{BB962C8B-B14F-4D97-AF65-F5344CB8AC3E}">
+        <p14:creationId xmlns:p14="http://schemas.microsoft.com/office/powerpoint/2010/main" val="1168420503"/>
+      </p:ext>
+    </p:extLst>
+  </p:cSld>
+  <p:clrMapOvr>
+    <a:masterClrMapping/>
+  </p:clrMapOvr>
+</p:sld>
+</file>
+
+<file path=ppt/slides/slide3.xml><?xml version="1.0" encoding="utf-8"?>
 <p:sld xmlns:a="http://schemas.openxmlformats.org/drawingml/2006/main" xmlns:r="http://schemas.openxmlformats.org/officeDocument/2006/relationships" xmlns:p="http://schemas.openxmlformats.org/presentationml/2006/main">
   <p:cSld>
     <p:spTree>

</xml_diff>

<commit_message>
update the device verification section.
</commit_message>
<xml_diff>
--- a/doc/designDoc.pptx
+++ b/doc/designDoc.pptx
@@ -5,12 +5,13 @@
     <p:sldMasterId id="2147483648" r:id="rId1"/>
   </p:sldMasterIdLst>
   <p:notesMasterIdLst>
-    <p:notesMasterId r:id="rId5"/>
+    <p:notesMasterId r:id="rId6"/>
   </p:notesMasterIdLst>
   <p:sldIdLst>
     <p:sldId id="256" r:id="rId2"/>
     <p:sldId id="262" r:id="rId3"/>
-    <p:sldId id="261" r:id="rId4"/>
+    <p:sldId id="263" r:id="rId4"/>
+    <p:sldId id="261" r:id="rId5"/>
   </p:sldIdLst>
   <p:sldSz cx="12192000" cy="6858000"/>
   <p:notesSz cx="6858000" cy="9144000"/>
@@ -700,7 +701,7 @@
           <a:p>
             <a:fld id="{620E605A-E658-4718-A0B0-0E0D18691EE8}" type="slidenum">
               <a:rPr lang="en-SG" smtClean="0"/>
-              <a:t>3</a:t>
+              <a:t>4</a:t>
             </a:fld>
             <a:endParaRPr lang="en-SG"/>
           </a:p>
@@ -8904,6 +8905,1836 @@
 </file>
 
 <file path=ppt/slides/slide3.xml><?xml version="1.0" encoding="utf-8"?>
+<p:sld xmlns:a="http://schemas.openxmlformats.org/drawingml/2006/main" xmlns:r="http://schemas.openxmlformats.org/officeDocument/2006/relationships" xmlns:p="http://schemas.openxmlformats.org/presentationml/2006/main">
+  <p:cSld>
+    <p:spTree>
+      <p:nvGrpSpPr>
+        <p:cNvPr id="1" name=""/>
+        <p:cNvGrpSpPr/>
+        <p:nvPr/>
+      </p:nvGrpSpPr>
+      <p:grpSpPr>
+        <a:xfrm>
+          <a:off x="0" y="0"/>
+          <a:ext cx="0" cy="0"/>
+          <a:chOff x="0" y="0"/>
+          <a:chExt cx="0" cy="0"/>
+        </a:xfrm>
+      </p:grpSpPr>
+      <p:sp>
+        <p:nvSpPr>
+          <p:cNvPr id="4" name="Rectangle 3">
+            <a:extLst>
+              <a:ext uri="{FF2B5EF4-FFF2-40B4-BE49-F238E27FC236}">
+                <a16:creationId xmlns:a16="http://schemas.microsoft.com/office/drawing/2014/main" id="{5E232319-3634-507F-C218-595A3CE57C73}"/>
+              </a:ext>
+            </a:extLst>
+          </p:cNvPr>
+          <p:cNvSpPr/>
+          <p:nvPr/>
+        </p:nvSpPr>
+        <p:spPr>
+          <a:xfrm>
+            <a:off x="676979" y="614235"/>
+            <a:ext cx="1719098" cy="2493510"/>
+          </a:xfrm>
+          <a:prstGeom prst="rect">
+            <a:avLst/>
+          </a:prstGeom>
+          <a:ln>
+            <a:prstDash val="sysDot"/>
+          </a:ln>
+        </p:spPr>
+        <p:style>
+          <a:lnRef idx="2">
+            <a:schemeClr val="dk1"/>
+          </a:lnRef>
+          <a:fillRef idx="1">
+            <a:schemeClr val="lt1"/>
+          </a:fillRef>
+          <a:effectRef idx="0">
+            <a:schemeClr val="dk1"/>
+          </a:effectRef>
+          <a:fontRef idx="minor">
+            <a:schemeClr val="dk1"/>
+          </a:fontRef>
+        </p:style>
+        <p:txBody>
+          <a:bodyPr rtlCol="0" anchor="ctr"/>
+          <a:lstStyle/>
+          <a:p>
+            <a:pPr algn="ctr"/>
+            <a:endParaRPr lang="en-SG"/>
+          </a:p>
+        </p:txBody>
+      </p:sp>
+      <p:sp>
+        <p:nvSpPr>
+          <p:cNvPr id="5" name="Rectangle 4">
+            <a:extLst>
+              <a:ext uri="{FF2B5EF4-FFF2-40B4-BE49-F238E27FC236}">
+                <a16:creationId xmlns:a16="http://schemas.microsoft.com/office/drawing/2014/main" id="{04708907-34F9-442D-D81F-D4D2D9D6B358}"/>
+              </a:ext>
+            </a:extLst>
+          </p:cNvPr>
+          <p:cNvSpPr/>
+          <p:nvPr/>
+        </p:nvSpPr>
+        <p:spPr>
+          <a:xfrm>
+            <a:off x="2786513" y="614235"/>
+            <a:ext cx="2608446" cy="2443784"/>
+          </a:xfrm>
+          <a:prstGeom prst="rect">
+            <a:avLst/>
+          </a:prstGeom>
+          <a:ln>
+            <a:prstDash val="sysDot"/>
+          </a:ln>
+        </p:spPr>
+        <p:style>
+          <a:lnRef idx="2">
+            <a:schemeClr val="dk1"/>
+          </a:lnRef>
+          <a:fillRef idx="1">
+            <a:schemeClr val="lt1"/>
+          </a:fillRef>
+          <a:effectRef idx="0">
+            <a:schemeClr val="dk1"/>
+          </a:effectRef>
+          <a:fontRef idx="minor">
+            <a:schemeClr val="dk1"/>
+          </a:fontRef>
+        </p:style>
+        <p:txBody>
+          <a:bodyPr rtlCol="0" anchor="ctr"/>
+          <a:lstStyle/>
+          <a:p>
+            <a:pPr algn="ctr"/>
+            <a:endParaRPr lang="en-SG"/>
+          </a:p>
+        </p:txBody>
+      </p:sp>
+      <p:cxnSp>
+        <p:nvCxnSpPr>
+          <p:cNvPr id="6" name="Straight Connector 5">
+            <a:extLst>
+              <a:ext uri="{FF2B5EF4-FFF2-40B4-BE49-F238E27FC236}">
+                <a16:creationId xmlns:a16="http://schemas.microsoft.com/office/drawing/2014/main" id="{D25AD7FC-31B7-1009-49A0-62523B4800DE}"/>
+              </a:ext>
+            </a:extLst>
+          </p:cNvPr>
+          <p:cNvCxnSpPr/>
+          <p:nvPr/>
+        </p:nvCxnSpPr>
+        <p:spPr>
+          <a:xfrm>
+            <a:off x="6001351" y="105878"/>
+            <a:ext cx="0" cy="3570973"/>
+          </a:xfrm>
+          <a:prstGeom prst="line">
+            <a:avLst/>
+          </a:prstGeom>
+          <a:ln>
+            <a:prstDash val="dash"/>
+          </a:ln>
+        </p:spPr>
+        <p:style>
+          <a:lnRef idx="1">
+            <a:schemeClr val="dk1"/>
+          </a:lnRef>
+          <a:fillRef idx="0">
+            <a:schemeClr val="dk1"/>
+          </a:fillRef>
+          <a:effectRef idx="0">
+            <a:schemeClr val="dk1"/>
+          </a:effectRef>
+          <a:fontRef idx="minor">
+            <a:schemeClr val="tx1"/>
+          </a:fontRef>
+        </p:style>
+      </p:cxnSp>
+      <p:sp>
+        <p:nvSpPr>
+          <p:cNvPr id="7" name="TextBox 6">
+            <a:extLst>
+              <a:ext uri="{FF2B5EF4-FFF2-40B4-BE49-F238E27FC236}">
+                <a16:creationId xmlns:a16="http://schemas.microsoft.com/office/drawing/2014/main" id="{F4216809-B4BF-9519-9511-9B620B4763B3}"/>
+              </a:ext>
+            </a:extLst>
+          </p:cNvPr>
+          <p:cNvSpPr txBox="1"/>
+          <p:nvPr/>
+        </p:nvSpPr>
+        <p:spPr>
+          <a:xfrm>
+            <a:off x="5529713" y="3107745"/>
+            <a:ext cx="1087655" cy="369332"/>
+          </a:xfrm>
+          <a:prstGeom prst="rect">
+            <a:avLst/>
+          </a:prstGeom>
+          <a:noFill/>
+        </p:spPr>
+        <p:txBody>
+          <a:bodyPr wrap="square" rtlCol="0">
+            <a:spAutoFit/>
+          </a:bodyPr>
+          <a:lstStyle/>
+          <a:p>
+            <a:r>
+              <a:rPr lang="en-US" dirty="0"/>
+              <a:t>Internet</a:t>
+            </a:r>
+            <a:endParaRPr lang="en-SG" dirty="0"/>
+          </a:p>
+        </p:txBody>
+      </p:sp>
+      <p:sp>
+        <p:nvSpPr>
+          <p:cNvPr id="8" name="Rectangle 7">
+            <a:extLst>
+              <a:ext uri="{FF2B5EF4-FFF2-40B4-BE49-F238E27FC236}">
+                <a16:creationId xmlns:a16="http://schemas.microsoft.com/office/drawing/2014/main" id="{93C5C26E-95AF-D9FB-3438-98D7C5EA85A6}"/>
+              </a:ext>
+            </a:extLst>
+          </p:cNvPr>
+          <p:cNvSpPr/>
+          <p:nvPr/>
+        </p:nvSpPr>
+        <p:spPr>
+          <a:xfrm>
+            <a:off x="6651057" y="614235"/>
+            <a:ext cx="2128787" cy="2359971"/>
+          </a:xfrm>
+          <a:prstGeom prst="rect">
+            <a:avLst/>
+          </a:prstGeom>
+          <a:ln>
+            <a:prstDash val="sysDot"/>
+          </a:ln>
+        </p:spPr>
+        <p:style>
+          <a:lnRef idx="2">
+            <a:schemeClr val="dk1"/>
+          </a:lnRef>
+          <a:fillRef idx="1">
+            <a:schemeClr val="lt1"/>
+          </a:fillRef>
+          <a:effectRef idx="0">
+            <a:schemeClr val="dk1"/>
+          </a:effectRef>
+          <a:fontRef idx="minor">
+            <a:schemeClr val="dk1"/>
+          </a:fontRef>
+        </p:style>
+        <p:txBody>
+          <a:bodyPr rtlCol="0" anchor="ctr"/>
+          <a:lstStyle/>
+          <a:p>
+            <a:pPr algn="ctr"/>
+            <a:endParaRPr lang="en-SG"/>
+          </a:p>
+        </p:txBody>
+      </p:sp>
+      <p:sp>
+        <p:nvSpPr>
+          <p:cNvPr id="9" name="TextBox 8">
+            <a:extLst>
+              <a:ext uri="{FF2B5EF4-FFF2-40B4-BE49-F238E27FC236}">
+                <a16:creationId xmlns:a16="http://schemas.microsoft.com/office/drawing/2014/main" id="{4D6AA127-A2EF-1E06-1DF5-D4A44B097196}"/>
+              </a:ext>
+            </a:extLst>
+          </p:cNvPr>
+          <p:cNvSpPr txBox="1"/>
+          <p:nvPr/>
+        </p:nvSpPr>
+        <p:spPr>
+          <a:xfrm>
+            <a:off x="631751" y="577411"/>
+            <a:ext cx="2031087" cy="307777"/>
+          </a:xfrm>
+          <a:prstGeom prst="rect">
+            <a:avLst/>
+          </a:prstGeom>
+          <a:noFill/>
+        </p:spPr>
+        <p:txBody>
+          <a:bodyPr wrap="square" rtlCol="0">
+            <a:spAutoFit/>
+          </a:bodyPr>
+          <a:lstStyle/>
+          <a:p>
+            <a:r>
+              <a:rPr lang="en-US" sz="1400" dirty="0"/>
+              <a:t>Trust App [Trust Zone]</a:t>
+            </a:r>
+            <a:endParaRPr lang="en-SG" sz="1400" dirty="0"/>
+          </a:p>
+        </p:txBody>
+      </p:sp>
+      <p:sp>
+        <p:nvSpPr>
+          <p:cNvPr id="10" name="TextBox 9">
+            <a:extLst>
+              <a:ext uri="{FF2B5EF4-FFF2-40B4-BE49-F238E27FC236}">
+                <a16:creationId xmlns:a16="http://schemas.microsoft.com/office/drawing/2014/main" id="{FA089A71-9B6C-2503-D38B-EF6F736916EB}"/>
+              </a:ext>
+            </a:extLst>
+          </p:cNvPr>
+          <p:cNvSpPr txBox="1"/>
+          <p:nvPr/>
+        </p:nvSpPr>
+        <p:spPr>
+          <a:xfrm>
+            <a:off x="2793730" y="612343"/>
+            <a:ext cx="2318645" cy="307777"/>
+          </a:xfrm>
+          <a:prstGeom prst="rect">
+            <a:avLst/>
+          </a:prstGeom>
+          <a:noFill/>
+        </p:spPr>
+        <p:txBody>
+          <a:bodyPr wrap="square" rtlCol="0">
+            <a:spAutoFit/>
+          </a:bodyPr>
+          <a:lstStyle/>
+          <a:p>
+            <a:r>
+              <a:rPr lang="en-US" sz="1400" dirty="0"/>
+              <a:t>Trust Client [Normal world]</a:t>
+            </a:r>
+            <a:endParaRPr lang="en-SG" sz="1400" dirty="0"/>
+          </a:p>
+        </p:txBody>
+      </p:sp>
+      <p:sp>
+        <p:nvSpPr>
+          <p:cNvPr id="11" name="TextBox 10">
+            <a:extLst>
+              <a:ext uri="{FF2B5EF4-FFF2-40B4-BE49-F238E27FC236}">
+                <a16:creationId xmlns:a16="http://schemas.microsoft.com/office/drawing/2014/main" id="{0893DA9B-A523-78C8-62A6-CC8E8FE59237}"/>
+              </a:ext>
+            </a:extLst>
+          </p:cNvPr>
+          <p:cNvSpPr txBox="1"/>
+          <p:nvPr/>
+        </p:nvSpPr>
+        <p:spPr>
+          <a:xfrm>
+            <a:off x="6651057" y="703840"/>
+            <a:ext cx="2157663" cy="307777"/>
+          </a:xfrm>
+          <a:prstGeom prst="rect">
+            <a:avLst/>
+          </a:prstGeom>
+          <a:noFill/>
+        </p:spPr>
+        <p:txBody>
+          <a:bodyPr wrap="square" rtlCol="0">
+            <a:spAutoFit/>
+          </a:bodyPr>
+          <a:lstStyle/>
+          <a:p>
+            <a:r>
+              <a:rPr lang="en-US" sz="1400" dirty="0"/>
+              <a:t>Server program</a:t>
+            </a:r>
+            <a:endParaRPr lang="en-SG" sz="1400" dirty="0"/>
+          </a:p>
+        </p:txBody>
+      </p:sp>
+      <p:sp>
+        <p:nvSpPr>
+          <p:cNvPr id="12" name="Rectangle 11">
+            <a:extLst>
+              <a:ext uri="{FF2B5EF4-FFF2-40B4-BE49-F238E27FC236}">
+                <a16:creationId xmlns:a16="http://schemas.microsoft.com/office/drawing/2014/main" id="{FBF4ED54-428C-50F4-5FC9-C56C8EB84585}"/>
+              </a:ext>
+            </a:extLst>
+          </p:cNvPr>
+          <p:cNvSpPr/>
+          <p:nvPr/>
+        </p:nvSpPr>
+        <p:spPr>
+          <a:xfrm>
+            <a:off x="3320716" y="1140593"/>
+            <a:ext cx="1183907" cy="225781"/>
+          </a:xfrm>
+          <a:prstGeom prst="rect">
+            <a:avLst/>
+          </a:prstGeom>
+          <a:ln w="19050"/>
+        </p:spPr>
+        <p:style>
+          <a:lnRef idx="2">
+            <a:schemeClr val="dk1"/>
+          </a:lnRef>
+          <a:fillRef idx="1">
+            <a:schemeClr val="lt1"/>
+          </a:fillRef>
+          <a:effectRef idx="0">
+            <a:schemeClr val="dk1"/>
+          </a:effectRef>
+          <a:fontRef idx="minor">
+            <a:schemeClr val="dk1"/>
+          </a:fontRef>
+        </p:style>
+        <p:txBody>
+          <a:bodyPr rtlCol="0" anchor="ctr"/>
+          <a:lstStyle/>
+          <a:p>
+            <a:pPr algn="ctr"/>
+            <a:r>
+              <a:rPr lang="en-US" sz="1000" dirty="0"/>
+              <a:t>0. Load config file </a:t>
+            </a:r>
+            <a:endParaRPr lang="en-SG" sz="1000" dirty="0"/>
+          </a:p>
+        </p:txBody>
+      </p:sp>
+      <p:cxnSp>
+        <p:nvCxnSpPr>
+          <p:cNvPr id="13" name="Straight Arrow Connector 12">
+            <a:extLst>
+              <a:ext uri="{FF2B5EF4-FFF2-40B4-BE49-F238E27FC236}">
+                <a16:creationId xmlns:a16="http://schemas.microsoft.com/office/drawing/2014/main" id="{2D07B26A-60FF-CF8C-0BA0-31D4E5BFBBA9}"/>
+              </a:ext>
+            </a:extLst>
+          </p:cNvPr>
+          <p:cNvCxnSpPr/>
+          <p:nvPr/>
+        </p:nvCxnSpPr>
+        <p:spPr>
+          <a:xfrm flipH="1">
+            <a:off x="4504623" y="1251284"/>
+            <a:ext cx="259882" cy="0"/>
+          </a:xfrm>
+          <a:prstGeom prst="straightConnector1">
+            <a:avLst/>
+          </a:prstGeom>
+          <a:ln>
+            <a:tailEnd type="triangle"/>
+          </a:ln>
+        </p:spPr>
+        <p:style>
+          <a:lnRef idx="1">
+            <a:schemeClr val="dk1"/>
+          </a:lnRef>
+          <a:fillRef idx="0">
+            <a:schemeClr val="dk1"/>
+          </a:fillRef>
+          <a:effectRef idx="0">
+            <a:schemeClr val="dk1"/>
+          </a:effectRef>
+          <a:fontRef idx="minor">
+            <a:schemeClr val="tx1"/>
+          </a:fontRef>
+        </p:style>
+      </p:cxnSp>
+      <p:pic>
+        <p:nvPicPr>
+          <p:cNvPr id="14" name="Picture 13">
+            <a:extLst>
+              <a:ext uri="{FF2B5EF4-FFF2-40B4-BE49-F238E27FC236}">
+                <a16:creationId xmlns:a16="http://schemas.microsoft.com/office/drawing/2014/main" id="{52BBF4C2-8646-A71A-17D9-E19481084798}"/>
+              </a:ext>
+            </a:extLst>
+          </p:cNvPr>
+          <p:cNvPicPr>
+            <a:picLocks noChangeAspect="1"/>
+          </p:cNvPicPr>
+          <p:nvPr/>
+        </p:nvPicPr>
+        <p:blipFill rotWithShape="1">
+          <a:blip r:embed="rId2" cstate="print">
+            <a:extLst>
+              <a:ext uri="{28A0092B-C50C-407E-A947-70E740481C1C}">
+                <a14:useLocalDpi xmlns:a14="http://schemas.microsoft.com/office/drawing/2010/main" val="0"/>
+              </a:ext>
+            </a:extLst>
+          </a:blip>
+          <a:srcRect l="10749" r="11155"/>
+          <a:stretch/>
+        </p:blipFill>
+        <p:spPr>
+          <a:xfrm>
+            <a:off x="4755045" y="1068288"/>
+            <a:ext cx="293405" cy="365992"/>
+          </a:xfrm>
+          <a:prstGeom prst="rect">
+            <a:avLst/>
+          </a:prstGeom>
+        </p:spPr>
+      </p:pic>
+      <p:cxnSp>
+        <p:nvCxnSpPr>
+          <p:cNvPr id="15" name="Straight Arrow Connector 14">
+            <a:extLst>
+              <a:ext uri="{FF2B5EF4-FFF2-40B4-BE49-F238E27FC236}">
+                <a16:creationId xmlns:a16="http://schemas.microsoft.com/office/drawing/2014/main" id="{D7C2D3BA-378D-8F94-50CB-CC65CD47AB40}"/>
+              </a:ext>
+            </a:extLst>
+          </p:cNvPr>
+          <p:cNvCxnSpPr/>
+          <p:nvPr/>
+        </p:nvCxnSpPr>
+        <p:spPr>
+          <a:xfrm>
+            <a:off x="3455471" y="1665173"/>
+            <a:ext cx="0" cy="298266"/>
+          </a:xfrm>
+          <a:prstGeom prst="straightConnector1">
+            <a:avLst/>
+          </a:prstGeom>
+          <a:ln>
+            <a:tailEnd type="triangle"/>
+          </a:ln>
+        </p:spPr>
+        <p:style>
+          <a:lnRef idx="1">
+            <a:schemeClr val="dk1"/>
+          </a:lnRef>
+          <a:fillRef idx="0">
+            <a:schemeClr val="dk1"/>
+          </a:fillRef>
+          <a:effectRef idx="0">
+            <a:schemeClr val="dk1"/>
+          </a:effectRef>
+          <a:fontRef idx="minor">
+            <a:schemeClr val="tx1"/>
+          </a:fontRef>
+        </p:style>
+      </p:cxnSp>
+      <p:cxnSp>
+        <p:nvCxnSpPr>
+          <p:cNvPr id="16" name="Straight Arrow Connector 15">
+            <a:extLst>
+              <a:ext uri="{FF2B5EF4-FFF2-40B4-BE49-F238E27FC236}">
+                <a16:creationId xmlns:a16="http://schemas.microsoft.com/office/drawing/2014/main" id="{8125ABAB-0DB2-6464-93FB-0CFC861C6FD2}"/>
+              </a:ext>
+            </a:extLst>
+          </p:cNvPr>
+          <p:cNvCxnSpPr/>
+          <p:nvPr/>
+        </p:nvCxnSpPr>
+        <p:spPr>
+          <a:xfrm>
+            <a:off x="4697130" y="1665173"/>
+            <a:ext cx="0" cy="298800"/>
+          </a:xfrm>
+          <a:prstGeom prst="straightConnector1">
+            <a:avLst/>
+          </a:prstGeom>
+          <a:ln>
+            <a:tailEnd type="triangle"/>
+          </a:ln>
+        </p:spPr>
+        <p:style>
+          <a:lnRef idx="1">
+            <a:schemeClr val="dk1"/>
+          </a:lnRef>
+          <a:fillRef idx="0">
+            <a:schemeClr val="dk1"/>
+          </a:fillRef>
+          <a:effectRef idx="0">
+            <a:schemeClr val="dk1"/>
+          </a:effectRef>
+          <a:fontRef idx="minor">
+            <a:schemeClr val="tx1"/>
+          </a:fontRef>
+        </p:style>
+      </p:cxnSp>
+      <p:cxnSp>
+        <p:nvCxnSpPr>
+          <p:cNvPr id="17" name="Straight Connector 16">
+            <a:extLst>
+              <a:ext uri="{FF2B5EF4-FFF2-40B4-BE49-F238E27FC236}">
+                <a16:creationId xmlns:a16="http://schemas.microsoft.com/office/drawing/2014/main" id="{72F29742-2B3F-FD5D-FFFA-5238BFA326DA}"/>
+              </a:ext>
+            </a:extLst>
+          </p:cNvPr>
+          <p:cNvCxnSpPr/>
+          <p:nvPr/>
+        </p:nvCxnSpPr>
+        <p:spPr>
+          <a:xfrm>
+            <a:off x="3455471" y="1665173"/>
+            <a:ext cx="1241659" cy="0"/>
+          </a:xfrm>
+          <a:prstGeom prst="line">
+            <a:avLst/>
+          </a:prstGeom>
+        </p:spPr>
+        <p:style>
+          <a:lnRef idx="1">
+            <a:schemeClr val="dk1"/>
+          </a:lnRef>
+          <a:fillRef idx="0">
+            <a:schemeClr val="dk1"/>
+          </a:fillRef>
+          <a:effectRef idx="0">
+            <a:schemeClr val="dk1"/>
+          </a:effectRef>
+          <a:fontRef idx="minor">
+            <a:schemeClr val="tx1"/>
+          </a:fontRef>
+        </p:style>
+      </p:cxnSp>
+      <p:cxnSp>
+        <p:nvCxnSpPr>
+          <p:cNvPr id="18" name="Straight Arrow Connector 17">
+            <a:extLst>
+              <a:ext uri="{FF2B5EF4-FFF2-40B4-BE49-F238E27FC236}">
+                <a16:creationId xmlns:a16="http://schemas.microsoft.com/office/drawing/2014/main" id="{4826BBB0-64C5-172B-A8D5-F2A75388D912}"/>
+              </a:ext>
+            </a:extLst>
+          </p:cNvPr>
+          <p:cNvCxnSpPr/>
+          <p:nvPr/>
+        </p:nvCxnSpPr>
+        <p:spPr>
+          <a:xfrm>
+            <a:off x="3983856" y="1366903"/>
+            <a:ext cx="0" cy="298266"/>
+          </a:xfrm>
+          <a:prstGeom prst="straightConnector1">
+            <a:avLst/>
+          </a:prstGeom>
+          <a:ln>
+            <a:tailEnd type="triangle"/>
+          </a:ln>
+        </p:spPr>
+        <p:style>
+          <a:lnRef idx="1">
+            <a:schemeClr val="dk1"/>
+          </a:lnRef>
+          <a:fillRef idx="0">
+            <a:schemeClr val="dk1"/>
+          </a:fillRef>
+          <a:effectRef idx="0">
+            <a:schemeClr val="dk1"/>
+          </a:effectRef>
+          <a:fontRef idx="minor">
+            <a:schemeClr val="tx1"/>
+          </a:fontRef>
+        </p:style>
+      </p:cxnSp>
+      <p:sp>
+        <p:nvSpPr>
+          <p:cNvPr id="19" name="Rectangle 18">
+            <a:extLst>
+              <a:ext uri="{FF2B5EF4-FFF2-40B4-BE49-F238E27FC236}">
+                <a16:creationId xmlns:a16="http://schemas.microsoft.com/office/drawing/2014/main" id="{D2B55E4B-162B-C1ED-F3AD-EA320D1B2DEE}"/>
+              </a:ext>
+            </a:extLst>
+          </p:cNvPr>
+          <p:cNvSpPr/>
+          <p:nvPr/>
+        </p:nvSpPr>
+        <p:spPr>
+          <a:xfrm>
+            <a:off x="2863708" y="1991808"/>
+            <a:ext cx="1135592" cy="234394"/>
+          </a:xfrm>
+          <a:prstGeom prst="rect">
+            <a:avLst/>
+          </a:prstGeom>
+          <a:ln w="19050"/>
+        </p:spPr>
+        <p:style>
+          <a:lnRef idx="2">
+            <a:schemeClr val="dk1"/>
+          </a:lnRef>
+          <a:fillRef idx="1">
+            <a:schemeClr val="lt1"/>
+          </a:fillRef>
+          <a:effectRef idx="0">
+            <a:schemeClr val="dk1"/>
+          </a:effectRef>
+          <a:fontRef idx="minor">
+            <a:schemeClr val="dk1"/>
+          </a:fontRef>
+        </p:style>
+        <p:txBody>
+          <a:bodyPr rtlCol="0" anchor="ctr"/>
+          <a:lstStyle/>
+          <a:p>
+            <a:pPr algn="ctr"/>
+            <a:r>
+              <a:rPr lang="en-US" sz="1000" dirty="0"/>
+              <a:t>1. OPTEE session</a:t>
+            </a:r>
+            <a:endParaRPr lang="en-SG" sz="1000" dirty="0"/>
+          </a:p>
+        </p:txBody>
+      </p:sp>
+      <p:sp>
+        <p:nvSpPr>
+          <p:cNvPr id="20" name="Rectangle 19">
+            <a:extLst>
+              <a:ext uri="{FF2B5EF4-FFF2-40B4-BE49-F238E27FC236}">
+                <a16:creationId xmlns:a16="http://schemas.microsoft.com/office/drawing/2014/main" id="{3DA451AA-B194-7A3F-C372-410293316222}"/>
+              </a:ext>
+            </a:extLst>
+          </p:cNvPr>
+          <p:cNvSpPr/>
+          <p:nvPr/>
+        </p:nvSpPr>
+        <p:spPr>
+          <a:xfrm>
+            <a:off x="4168340" y="2000009"/>
+            <a:ext cx="1057579" cy="226193"/>
+          </a:xfrm>
+          <a:prstGeom prst="rect">
+            <a:avLst/>
+          </a:prstGeom>
+          <a:ln w="19050"/>
+        </p:spPr>
+        <p:style>
+          <a:lnRef idx="2">
+            <a:schemeClr val="dk1"/>
+          </a:lnRef>
+          <a:fillRef idx="1">
+            <a:schemeClr val="lt1"/>
+          </a:fillRef>
+          <a:effectRef idx="0">
+            <a:schemeClr val="dk1"/>
+          </a:effectRef>
+          <a:fontRef idx="minor">
+            <a:schemeClr val="dk1"/>
+          </a:fontRef>
+        </p:style>
+        <p:txBody>
+          <a:bodyPr rtlCol="0" anchor="ctr"/>
+          <a:lstStyle/>
+          <a:p>
+            <a:pPr algn="ctr"/>
+            <a:r>
+              <a:rPr lang="en-US" sz="1100" dirty="0"/>
+              <a:t>TCP Client</a:t>
+            </a:r>
+            <a:endParaRPr lang="en-SG" sz="1100" dirty="0"/>
+          </a:p>
+        </p:txBody>
+      </p:sp>
+      <p:cxnSp>
+        <p:nvCxnSpPr>
+          <p:cNvPr id="21" name="Straight Arrow Connector 20">
+            <a:extLst>
+              <a:ext uri="{FF2B5EF4-FFF2-40B4-BE49-F238E27FC236}">
+                <a16:creationId xmlns:a16="http://schemas.microsoft.com/office/drawing/2014/main" id="{C3BD09FC-50A2-9952-17D1-B90C04E193EA}"/>
+              </a:ext>
+            </a:extLst>
+          </p:cNvPr>
+          <p:cNvCxnSpPr/>
+          <p:nvPr/>
+        </p:nvCxnSpPr>
+        <p:spPr>
+          <a:xfrm>
+            <a:off x="3455471" y="2226202"/>
+            <a:ext cx="0" cy="299434"/>
+          </a:xfrm>
+          <a:prstGeom prst="straightConnector1">
+            <a:avLst/>
+          </a:prstGeom>
+          <a:ln>
+            <a:tailEnd type="triangle"/>
+          </a:ln>
+        </p:spPr>
+        <p:style>
+          <a:lnRef idx="1">
+            <a:schemeClr val="dk1"/>
+          </a:lnRef>
+          <a:fillRef idx="0">
+            <a:schemeClr val="dk1"/>
+          </a:fillRef>
+          <a:effectRef idx="0">
+            <a:schemeClr val="dk1"/>
+          </a:effectRef>
+          <a:fontRef idx="minor">
+            <a:schemeClr val="tx1"/>
+          </a:fontRef>
+        </p:style>
+      </p:cxnSp>
+      <p:sp>
+        <p:nvSpPr>
+          <p:cNvPr id="22" name="Rectangle 21">
+            <a:extLst>
+              <a:ext uri="{FF2B5EF4-FFF2-40B4-BE49-F238E27FC236}">
+                <a16:creationId xmlns:a16="http://schemas.microsoft.com/office/drawing/2014/main" id="{76D63CC0-0BB1-7E18-2334-C0FDCE4A1A68}"/>
+              </a:ext>
+            </a:extLst>
+          </p:cNvPr>
+          <p:cNvSpPr/>
+          <p:nvPr/>
+        </p:nvSpPr>
+        <p:spPr>
+          <a:xfrm>
+            <a:off x="2853279" y="2535978"/>
+            <a:ext cx="1448410" cy="234394"/>
+          </a:xfrm>
+          <a:prstGeom prst="rect">
+            <a:avLst/>
+          </a:prstGeom>
+          <a:ln w="19050"/>
+        </p:spPr>
+        <p:style>
+          <a:lnRef idx="2">
+            <a:schemeClr val="dk1"/>
+          </a:lnRef>
+          <a:fillRef idx="1">
+            <a:schemeClr val="lt1"/>
+          </a:fillRef>
+          <a:effectRef idx="0">
+            <a:schemeClr val="dk1"/>
+          </a:effectRef>
+          <a:fontRef idx="minor">
+            <a:schemeClr val="dk1"/>
+          </a:fontRef>
+        </p:style>
+        <p:txBody>
+          <a:bodyPr rtlCol="0" anchor="ctr"/>
+          <a:lstStyle/>
+          <a:p>
+            <a:pPr algn="ctr"/>
+            <a:r>
+              <a:rPr lang="en-US" sz="1000" dirty="0"/>
+              <a:t>Tee-supplicant service</a:t>
+            </a:r>
+            <a:endParaRPr lang="en-SG" sz="1000" dirty="0"/>
+          </a:p>
+        </p:txBody>
+      </p:sp>
+      <p:sp>
+        <p:nvSpPr>
+          <p:cNvPr id="23" name="Rectangle 22">
+            <a:extLst>
+              <a:ext uri="{FF2B5EF4-FFF2-40B4-BE49-F238E27FC236}">
+                <a16:creationId xmlns:a16="http://schemas.microsoft.com/office/drawing/2014/main" id="{39D8FF64-7AAF-584A-C51F-938A84C1AD31}"/>
+              </a:ext>
+            </a:extLst>
+          </p:cNvPr>
+          <p:cNvSpPr/>
+          <p:nvPr/>
+        </p:nvSpPr>
+        <p:spPr>
+          <a:xfrm>
+            <a:off x="2863514" y="3175214"/>
+            <a:ext cx="1168468" cy="234394"/>
+          </a:xfrm>
+          <a:prstGeom prst="rect">
+            <a:avLst/>
+          </a:prstGeom>
+          <a:ln w="19050"/>
+        </p:spPr>
+        <p:style>
+          <a:lnRef idx="2">
+            <a:schemeClr val="dk1"/>
+          </a:lnRef>
+          <a:fillRef idx="1">
+            <a:schemeClr val="lt1"/>
+          </a:fillRef>
+          <a:effectRef idx="0">
+            <a:schemeClr val="dk1"/>
+          </a:effectRef>
+          <a:fontRef idx="minor">
+            <a:schemeClr val="dk1"/>
+          </a:fontRef>
+        </p:style>
+        <p:txBody>
+          <a:bodyPr rtlCol="0" anchor="ctr"/>
+          <a:lstStyle/>
+          <a:p>
+            <a:pPr algn="ctr"/>
+            <a:r>
+              <a:rPr lang="en-US" sz="1100" dirty="0"/>
+              <a:t>OPTEE driver</a:t>
+            </a:r>
+            <a:endParaRPr lang="en-SG" sz="1100" dirty="0"/>
+          </a:p>
+        </p:txBody>
+      </p:sp>
+      <p:cxnSp>
+        <p:nvCxnSpPr>
+          <p:cNvPr id="24" name="Straight Arrow Connector 23">
+            <a:extLst>
+              <a:ext uri="{FF2B5EF4-FFF2-40B4-BE49-F238E27FC236}">
+                <a16:creationId xmlns:a16="http://schemas.microsoft.com/office/drawing/2014/main" id="{3C7A985E-F5FF-7C5E-0C13-1FAA63964189}"/>
+              </a:ext>
+            </a:extLst>
+          </p:cNvPr>
+          <p:cNvCxnSpPr/>
+          <p:nvPr/>
+        </p:nvCxnSpPr>
+        <p:spPr>
+          <a:xfrm>
+            <a:off x="3455471" y="2770372"/>
+            <a:ext cx="0" cy="404842"/>
+          </a:xfrm>
+          <a:prstGeom prst="straightConnector1">
+            <a:avLst/>
+          </a:prstGeom>
+          <a:ln>
+            <a:tailEnd type="triangle"/>
+          </a:ln>
+        </p:spPr>
+        <p:style>
+          <a:lnRef idx="1">
+            <a:schemeClr val="dk1"/>
+          </a:lnRef>
+          <a:fillRef idx="0">
+            <a:schemeClr val="dk1"/>
+          </a:fillRef>
+          <a:effectRef idx="0">
+            <a:schemeClr val="dk1"/>
+          </a:effectRef>
+          <a:fontRef idx="minor">
+            <a:schemeClr val="tx1"/>
+          </a:fontRef>
+        </p:style>
+      </p:cxnSp>
+      <p:sp>
+        <p:nvSpPr>
+          <p:cNvPr id="25" name="Rectangle 24">
+            <a:extLst>
+              <a:ext uri="{FF2B5EF4-FFF2-40B4-BE49-F238E27FC236}">
+                <a16:creationId xmlns:a16="http://schemas.microsoft.com/office/drawing/2014/main" id="{0AB376E4-B0D6-FE7C-D202-2723EED5728C}"/>
+              </a:ext>
+            </a:extLst>
+          </p:cNvPr>
+          <p:cNvSpPr/>
+          <p:nvPr/>
+        </p:nvSpPr>
+        <p:spPr>
+          <a:xfrm>
+            <a:off x="920215" y="1068288"/>
+            <a:ext cx="1322471" cy="365992"/>
+          </a:xfrm>
+          <a:prstGeom prst="rect">
+            <a:avLst/>
+          </a:prstGeom>
+          <a:ln w="19050"/>
+        </p:spPr>
+        <p:style>
+          <a:lnRef idx="2">
+            <a:schemeClr val="dk1"/>
+          </a:lnRef>
+          <a:fillRef idx="1">
+            <a:schemeClr val="lt1"/>
+          </a:fillRef>
+          <a:effectRef idx="0">
+            <a:schemeClr val="dk1"/>
+          </a:effectRef>
+          <a:fontRef idx="minor">
+            <a:schemeClr val="dk1"/>
+          </a:fontRef>
+        </p:style>
+        <p:txBody>
+          <a:bodyPr rtlCol="0" anchor="ctr"/>
+          <a:lstStyle/>
+          <a:p>
+            <a:pPr algn="ctr"/>
+            <a:r>
+              <a:rPr lang="en-US" sz="1000" dirty="0"/>
+              <a:t>2. Accept OPTEE connection</a:t>
+            </a:r>
+            <a:endParaRPr lang="en-SG" sz="1000" dirty="0"/>
+          </a:p>
+        </p:txBody>
+      </p:sp>
+      <p:cxnSp>
+        <p:nvCxnSpPr>
+          <p:cNvPr id="26" name="Elbow Connector 39">
+            <a:extLst>
+              <a:ext uri="{FF2B5EF4-FFF2-40B4-BE49-F238E27FC236}">
+                <a16:creationId xmlns:a16="http://schemas.microsoft.com/office/drawing/2014/main" id="{D3108C13-FF1F-6F5E-77D6-37B4E402323D}"/>
+              </a:ext>
+            </a:extLst>
+          </p:cNvPr>
+          <p:cNvCxnSpPr>
+            <a:cxnSpLocks/>
+            <a:stCxn id="23" idx="1"/>
+            <a:endCxn id="25" idx="3"/>
+          </p:cNvCxnSpPr>
+          <p:nvPr/>
+        </p:nvCxnSpPr>
+        <p:spPr>
+          <a:xfrm rot="10800000">
+            <a:off x="2242686" y="1251285"/>
+            <a:ext cx="620828" cy="2041127"/>
+          </a:xfrm>
+          <a:prstGeom prst="bentConnector3">
+            <a:avLst/>
+          </a:prstGeom>
+          <a:ln>
+            <a:tailEnd type="triangle"/>
+          </a:ln>
+        </p:spPr>
+        <p:style>
+          <a:lnRef idx="1">
+            <a:schemeClr val="dk1"/>
+          </a:lnRef>
+          <a:fillRef idx="0">
+            <a:schemeClr val="dk1"/>
+          </a:fillRef>
+          <a:effectRef idx="0">
+            <a:schemeClr val="dk1"/>
+          </a:effectRef>
+          <a:fontRef idx="minor">
+            <a:schemeClr val="tx1"/>
+          </a:fontRef>
+        </p:style>
+      </p:cxnSp>
+      <p:sp>
+        <p:nvSpPr>
+          <p:cNvPr id="27" name="TextBox 26">
+            <a:extLst>
+              <a:ext uri="{FF2B5EF4-FFF2-40B4-BE49-F238E27FC236}">
+                <a16:creationId xmlns:a16="http://schemas.microsoft.com/office/drawing/2014/main" id="{DB4B6671-6726-92ED-99B2-4128F441D50A}"/>
+              </a:ext>
+            </a:extLst>
+          </p:cNvPr>
+          <p:cNvSpPr txBox="1"/>
+          <p:nvPr/>
+        </p:nvSpPr>
+        <p:spPr>
+          <a:xfrm>
+            <a:off x="2133437" y="157572"/>
+            <a:ext cx="1590576" cy="307777"/>
+          </a:xfrm>
+          <a:prstGeom prst="rect">
+            <a:avLst/>
+          </a:prstGeom>
+          <a:noFill/>
+        </p:spPr>
+        <p:txBody>
+          <a:bodyPr wrap="square" rtlCol="0">
+            <a:spAutoFit/>
+          </a:bodyPr>
+          <a:lstStyle/>
+          <a:p>
+            <a:r>
+              <a:rPr lang="en-US" sz="1400" b="1" dirty="0"/>
+              <a:t>Raspberry PI </a:t>
+            </a:r>
+            <a:endParaRPr lang="en-SG" sz="1400" b="1" dirty="0"/>
+          </a:p>
+        </p:txBody>
+      </p:sp>
+      <p:sp>
+        <p:nvSpPr>
+          <p:cNvPr id="28" name="TextBox 27">
+            <a:extLst>
+              <a:ext uri="{FF2B5EF4-FFF2-40B4-BE49-F238E27FC236}">
+                <a16:creationId xmlns:a16="http://schemas.microsoft.com/office/drawing/2014/main" id="{AFA6FC1B-4581-CEA8-0410-579DF52BA0CC}"/>
+              </a:ext>
+            </a:extLst>
+          </p:cNvPr>
+          <p:cNvSpPr txBox="1"/>
+          <p:nvPr/>
+        </p:nvSpPr>
+        <p:spPr>
+          <a:xfrm>
+            <a:off x="6552118" y="254996"/>
+            <a:ext cx="2846152" cy="307777"/>
+          </a:xfrm>
+          <a:prstGeom prst="rect">
+            <a:avLst/>
+          </a:prstGeom>
+          <a:noFill/>
+        </p:spPr>
+        <p:txBody>
+          <a:bodyPr wrap="square" rtlCol="0">
+            <a:spAutoFit/>
+          </a:bodyPr>
+          <a:lstStyle/>
+          <a:p>
+            <a:r>
+              <a:rPr lang="en-US" sz="1400" b="1" dirty="0"/>
+              <a:t>Trust Server Computer</a:t>
+            </a:r>
+            <a:endParaRPr lang="en-SG" sz="1400" b="1" dirty="0"/>
+          </a:p>
+        </p:txBody>
+      </p:sp>
+      <p:sp>
+        <p:nvSpPr>
+          <p:cNvPr id="29" name="Rectangle 28">
+            <a:extLst>
+              <a:ext uri="{FF2B5EF4-FFF2-40B4-BE49-F238E27FC236}">
+                <a16:creationId xmlns:a16="http://schemas.microsoft.com/office/drawing/2014/main" id="{856EA982-130D-F6B5-ABD1-AEBB9856391D}"/>
+              </a:ext>
+            </a:extLst>
+          </p:cNvPr>
+          <p:cNvSpPr/>
+          <p:nvPr/>
+        </p:nvSpPr>
+        <p:spPr>
+          <a:xfrm>
+            <a:off x="6786814" y="1068287"/>
+            <a:ext cx="1866298" cy="430521"/>
+          </a:xfrm>
+          <a:prstGeom prst="rect">
+            <a:avLst/>
+          </a:prstGeom>
+          <a:ln w="19050"/>
+        </p:spPr>
+        <p:style>
+          <a:lnRef idx="2">
+            <a:schemeClr val="dk1"/>
+          </a:lnRef>
+          <a:fillRef idx="1">
+            <a:schemeClr val="lt1"/>
+          </a:fillRef>
+          <a:effectRef idx="0">
+            <a:schemeClr val="dk1"/>
+          </a:effectRef>
+          <a:fontRef idx="minor">
+            <a:schemeClr val="dk1"/>
+          </a:fontRef>
+        </p:style>
+        <p:txBody>
+          <a:bodyPr rtlCol="0" anchor="ctr"/>
+          <a:lstStyle/>
+          <a:p>
+            <a:pPr algn="ctr"/>
+            <a:r>
+              <a:rPr lang="en-US" sz="1100" dirty="0"/>
+              <a:t>3. Accept the TCP connection  </a:t>
+            </a:r>
+            <a:endParaRPr lang="en-SG" sz="1100" dirty="0"/>
+          </a:p>
+        </p:txBody>
+      </p:sp>
+      <p:cxnSp>
+        <p:nvCxnSpPr>
+          <p:cNvPr id="30" name="Elbow Connector 49">
+            <a:extLst>
+              <a:ext uri="{FF2B5EF4-FFF2-40B4-BE49-F238E27FC236}">
+                <a16:creationId xmlns:a16="http://schemas.microsoft.com/office/drawing/2014/main" id="{D32EF725-D570-7C91-0706-4D0229391076}"/>
+              </a:ext>
+            </a:extLst>
+          </p:cNvPr>
+          <p:cNvCxnSpPr>
+            <a:cxnSpLocks/>
+            <a:stCxn id="20" idx="3"/>
+            <a:endCxn id="29" idx="1"/>
+          </p:cNvCxnSpPr>
+          <p:nvPr/>
+        </p:nvCxnSpPr>
+        <p:spPr>
+          <a:xfrm flipV="1">
+            <a:off x="5225919" y="1283548"/>
+            <a:ext cx="1560895" cy="829558"/>
+          </a:xfrm>
+          <a:prstGeom prst="bentConnector3">
+            <a:avLst>
+              <a:gd name="adj1" fmla="val 35940"/>
+            </a:avLst>
+          </a:prstGeom>
+          <a:ln>
+            <a:tailEnd type="triangle"/>
+          </a:ln>
+        </p:spPr>
+        <p:style>
+          <a:lnRef idx="1">
+            <a:schemeClr val="dk1"/>
+          </a:lnRef>
+          <a:fillRef idx="0">
+            <a:schemeClr val="dk1"/>
+          </a:fillRef>
+          <a:effectRef idx="0">
+            <a:schemeClr val="dk1"/>
+          </a:effectRef>
+          <a:fontRef idx="minor">
+            <a:schemeClr val="tx1"/>
+          </a:fontRef>
+        </p:style>
+      </p:cxnSp>
+      <p:pic>
+        <p:nvPicPr>
+          <p:cNvPr id="31" name="Picture 30">
+            <a:extLst>
+              <a:ext uri="{FF2B5EF4-FFF2-40B4-BE49-F238E27FC236}">
+                <a16:creationId xmlns:a16="http://schemas.microsoft.com/office/drawing/2014/main" id="{56627DF7-6EAD-0BCF-35F9-DB45E2CF3B4B}"/>
+              </a:ext>
+            </a:extLst>
+          </p:cNvPr>
+          <p:cNvPicPr>
+            <a:picLocks noChangeAspect="1"/>
+          </p:cNvPicPr>
+          <p:nvPr/>
+        </p:nvPicPr>
+        <p:blipFill>
+          <a:blip r:embed="rId3"/>
+          <a:stretch>
+            <a:fillRect/>
+          </a:stretch>
+        </p:blipFill>
+        <p:spPr>
+          <a:xfrm>
+            <a:off x="4790412" y="2614180"/>
+            <a:ext cx="321963" cy="355501"/>
+          </a:xfrm>
+          <a:prstGeom prst="rect">
+            <a:avLst/>
+          </a:prstGeom>
+          <a:ln w="6350">
+            <a:solidFill>
+              <a:schemeClr val="tx1"/>
+            </a:solidFill>
+          </a:ln>
+        </p:spPr>
+      </p:pic>
+      <p:sp>
+        <p:nvSpPr>
+          <p:cNvPr id="32" name="TextBox 31">
+            <a:extLst>
+              <a:ext uri="{FF2B5EF4-FFF2-40B4-BE49-F238E27FC236}">
+                <a16:creationId xmlns:a16="http://schemas.microsoft.com/office/drawing/2014/main" id="{D5A7DE21-771C-332E-7FC7-0D052E940B06}"/>
+              </a:ext>
+            </a:extLst>
+          </p:cNvPr>
+          <p:cNvSpPr txBox="1"/>
+          <p:nvPr/>
+        </p:nvSpPr>
+        <p:spPr>
+          <a:xfrm>
+            <a:off x="4473119" y="2227969"/>
+            <a:ext cx="1045508" cy="430887"/>
+          </a:xfrm>
+          <a:prstGeom prst="rect">
+            <a:avLst/>
+          </a:prstGeom>
+          <a:noFill/>
+        </p:spPr>
+        <p:txBody>
+          <a:bodyPr wrap="square" rtlCol="0">
+            <a:spAutoFit/>
+          </a:bodyPr>
+          <a:lstStyle/>
+          <a:p>
+            <a:r>
+              <a:rPr lang="en-US" sz="1100" b="1" dirty="0">
+                <a:solidFill>
+                  <a:schemeClr val="tx2">
+                    <a:lumMod val="75000"/>
+                    <a:lumOff val="25000"/>
+                  </a:schemeClr>
+                </a:solidFill>
+              </a:rPr>
+              <a:t>Arm Chip information</a:t>
+            </a:r>
+            <a:endParaRPr lang="en-SG" sz="1100" b="1" dirty="0">
+              <a:solidFill>
+                <a:schemeClr val="tx2">
+                  <a:lumMod val="75000"/>
+                  <a:lumOff val="25000"/>
+                </a:schemeClr>
+              </a:solidFill>
+            </a:endParaRPr>
+          </a:p>
+        </p:txBody>
+      </p:sp>
+      <p:sp>
+        <p:nvSpPr>
+          <p:cNvPr id="34" name="TextBox 33">
+            <a:extLst>
+              <a:ext uri="{FF2B5EF4-FFF2-40B4-BE49-F238E27FC236}">
+                <a16:creationId xmlns:a16="http://schemas.microsoft.com/office/drawing/2014/main" id="{A63AF960-1BFC-45F9-B335-9D82D9442B65}"/>
+              </a:ext>
+            </a:extLst>
+          </p:cNvPr>
+          <p:cNvSpPr txBox="1"/>
+          <p:nvPr/>
+        </p:nvSpPr>
+        <p:spPr>
+          <a:xfrm>
+            <a:off x="4489278" y="1360907"/>
+            <a:ext cx="924230" cy="261610"/>
+          </a:xfrm>
+          <a:prstGeom prst="rect">
+            <a:avLst/>
+          </a:prstGeom>
+          <a:noFill/>
+        </p:spPr>
+        <p:txBody>
+          <a:bodyPr wrap="square" rtlCol="0">
+            <a:spAutoFit/>
+          </a:bodyPr>
+          <a:lstStyle/>
+          <a:p>
+            <a:r>
+              <a:rPr lang="en-US" sz="1100" b="1" dirty="0">
+                <a:solidFill>
+                  <a:schemeClr val="tx2">
+                    <a:lumMod val="75000"/>
+                    <a:lumOff val="25000"/>
+                  </a:schemeClr>
+                </a:solidFill>
+              </a:rPr>
+              <a:t>Config file</a:t>
+            </a:r>
+            <a:endParaRPr lang="en-SG" sz="1100" b="1" dirty="0">
+              <a:solidFill>
+                <a:schemeClr val="tx2">
+                  <a:lumMod val="75000"/>
+                  <a:lumOff val="25000"/>
+                </a:schemeClr>
+              </a:solidFill>
+            </a:endParaRPr>
+          </a:p>
+        </p:txBody>
+      </p:sp>
+      <p:cxnSp>
+        <p:nvCxnSpPr>
+          <p:cNvPr id="35" name="Straight Arrow Connector 34">
+            <a:extLst>
+              <a:ext uri="{FF2B5EF4-FFF2-40B4-BE49-F238E27FC236}">
+                <a16:creationId xmlns:a16="http://schemas.microsoft.com/office/drawing/2014/main" id="{CF75F2CB-AE7C-7F16-A9C7-833611FDF02C}"/>
+              </a:ext>
+            </a:extLst>
+          </p:cNvPr>
+          <p:cNvCxnSpPr>
+            <a:cxnSpLocks/>
+          </p:cNvCxnSpPr>
+          <p:nvPr/>
+        </p:nvCxnSpPr>
+        <p:spPr>
+          <a:xfrm flipH="1">
+            <a:off x="4308275" y="2653175"/>
+            <a:ext cx="446770" cy="0"/>
+          </a:xfrm>
+          <a:prstGeom prst="straightConnector1">
+            <a:avLst/>
+          </a:prstGeom>
+          <a:ln>
+            <a:tailEnd type="triangle"/>
+          </a:ln>
+        </p:spPr>
+        <p:style>
+          <a:lnRef idx="1">
+            <a:schemeClr val="dk1"/>
+          </a:lnRef>
+          <a:fillRef idx="0">
+            <a:schemeClr val="dk1"/>
+          </a:fillRef>
+          <a:effectRef idx="0">
+            <a:schemeClr val="dk1"/>
+          </a:effectRef>
+          <a:fontRef idx="minor">
+            <a:schemeClr val="tx1"/>
+          </a:fontRef>
+        </p:style>
+      </p:cxnSp>
+      <p:sp>
+        <p:nvSpPr>
+          <p:cNvPr id="37" name="TextBox 36">
+            <a:extLst>
+              <a:ext uri="{FF2B5EF4-FFF2-40B4-BE49-F238E27FC236}">
+                <a16:creationId xmlns:a16="http://schemas.microsoft.com/office/drawing/2014/main" id="{9CED44A8-8347-FCB5-99A7-6BDAAD8DBCA4}"/>
+              </a:ext>
+            </a:extLst>
+          </p:cNvPr>
+          <p:cNvSpPr txBox="1"/>
+          <p:nvPr/>
+        </p:nvSpPr>
+        <p:spPr>
+          <a:xfrm>
+            <a:off x="2325039" y="1498809"/>
+            <a:ext cx="1045508" cy="430887"/>
+          </a:xfrm>
+          <a:prstGeom prst="rect">
+            <a:avLst/>
+          </a:prstGeom>
+          <a:noFill/>
+        </p:spPr>
+        <p:txBody>
+          <a:bodyPr wrap="square" rtlCol="0">
+            <a:spAutoFit/>
+          </a:bodyPr>
+          <a:lstStyle/>
+          <a:p>
+            <a:r>
+              <a:rPr lang="en-US" sz="1100" b="1" dirty="0">
+                <a:solidFill>
+                  <a:schemeClr val="tx2">
+                    <a:lumMod val="75000"/>
+                    <a:lumOff val="25000"/>
+                  </a:schemeClr>
+                </a:solidFill>
+              </a:rPr>
+              <a:t>Arm Chip UDID</a:t>
+            </a:r>
+            <a:endParaRPr lang="en-SG" sz="1100" b="1" dirty="0">
+              <a:solidFill>
+                <a:schemeClr val="tx2">
+                  <a:lumMod val="75000"/>
+                  <a:lumOff val="25000"/>
+                </a:schemeClr>
+              </a:solidFill>
+            </a:endParaRPr>
+          </a:p>
+        </p:txBody>
+      </p:sp>
+      <p:sp>
+        <p:nvSpPr>
+          <p:cNvPr id="38" name="TextBox 37">
+            <a:extLst>
+              <a:ext uri="{FF2B5EF4-FFF2-40B4-BE49-F238E27FC236}">
+                <a16:creationId xmlns:a16="http://schemas.microsoft.com/office/drawing/2014/main" id="{67DCA78F-9351-7062-CFBE-E30F5E3DDAB0}"/>
+              </a:ext>
+            </a:extLst>
+          </p:cNvPr>
+          <p:cNvSpPr txBox="1"/>
+          <p:nvPr/>
+        </p:nvSpPr>
+        <p:spPr>
+          <a:xfrm>
+            <a:off x="5522211" y="862862"/>
+            <a:ext cx="1045508" cy="430887"/>
+          </a:xfrm>
+          <a:prstGeom prst="rect">
+            <a:avLst/>
+          </a:prstGeom>
+          <a:noFill/>
+        </p:spPr>
+        <p:txBody>
+          <a:bodyPr wrap="square" rtlCol="0">
+            <a:spAutoFit/>
+          </a:bodyPr>
+          <a:lstStyle/>
+          <a:p>
+            <a:r>
+              <a:rPr lang="en-US" sz="1100" b="1" dirty="0">
+                <a:solidFill>
+                  <a:schemeClr val="tx2">
+                    <a:lumMod val="75000"/>
+                    <a:lumOff val="25000"/>
+                  </a:schemeClr>
+                </a:solidFill>
+              </a:rPr>
+              <a:t>IoT device information</a:t>
+            </a:r>
+            <a:endParaRPr lang="en-SG" sz="1100" b="1" dirty="0">
+              <a:solidFill>
+                <a:schemeClr val="tx2">
+                  <a:lumMod val="75000"/>
+                  <a:lumOff val="25000"/>
+                </a:schemeClr>
+              </a:solidFill>
+            </a:endParaRPr>
+          </a:p>
+        </p:txBody>
+      </p:sp>
+      <p:sp>
+        <p:nvSpPr>
+          <p:cNvPr id="41" name="Diamond 40">
+            <a:extLst>
+              <a:ext uri="{FF2B5EF4-FFF2-40B4-BE49-F238E27FC236}">
+                <a16:creationId xmlns:a16="http://schemas.microsoft.com/office/drawing/2014/main" id="{3A78A03D-4749-90E5-C4F7-E14D7A0B006F}"/>
+              </a:ext>
+            </a:extLst>
+          </p:cNvPr>
+          <p:cNvSpPr/>
+          <p:nvPr/>
+        </p:nvSpPr>
+        <p:spPr>
+          <a:xfrm>
+            <a:off x="859507" y="1691514"/>
+            <a:ext cx="1294443" cy="397284"/>
+          </a:xfrm>
+          <a:prstGeom prst="diamond">
+            <a:avLst/>
+          </a:prstGeom>
+        </p:spPr>
+        <p:style>
+          <a:lnRef idx="2">
+            <a:schemeClr val="dk1"/>
+          </a:lnRef>
+          <a:fillRef idx="1">
+            <a:schemeClr val="lt1"/>
+          </a:fillRef>
+          <a:effectRef idx="0">
+            <a:schemeClr val="dk1"/>
+          </a:effectRef>
+          <a:fontRef idx="minor">
+            <a:schemeClr val="dk1"/>
+          </a:fontRef>
+        </p:style>
+        <p:txBody>
+          <a:bodyPr rtlCol="0" anchor="ctr"/>
+          <a:lstStyle/>
+          <a:p>
+            <a:pPr algn="ctr"/>
+            <a:r>
+              <a:rPr lang="en-US" sz="900" dirty="0"/>
+              <a:t>UDID match ? </a:t>
+            </a:r>
+            <a:endParaRPr lang="en-SG" sz="900" dirty="0"/>
+          </a:p>
+        </p:txBody>
+      </p:sp>
+      <p:cxnSp>
+        <p:nvCxnSpPr>
+          <p:cNvPr id="42" name="Straight Arrow Connector 41">
+            <a:extLst>
+              <a:ext uri="{FF2B5EF4-FFF2-40B4-BE49-F238E27FC236}">
+                <a16:creationId xmlns:a16="http://schemas.microsoft.com/office/drawing/2014/main" id="{F1ACA24C-CA23-7C9F-CFC3-8163E0631694}"/>
+              </a:ext>
+            </a:extLst>
+          </p:cNvPr>
+          <p:cNvCxnSpPr>
+            <a:cxnSpLocks/>
+          </p:cNvCxnSpPr>
+          <p:nvPr/>
+        </p:nvCxnSpPr>
+        <p:spPr>
+          <a:xfrm>
+            <a:off x="1491834" y="1434280"/>
+            <a:ext cx="0" cy="230889"/>
+          </a:xfrm>
+          <a:prstGeom prst="straightConnector1">
+            <a:avLst/>
+          </a:prstGeom>
+          <a:ln>
+            <a:tailEnd type="triangle"/>
+          </a:ln>
+        </p:spPr>
+        <p:style>
+          <a:lnRef idx="1">
+            <a:schemeClr val="dk1"/>
+          </a:lnRef>
+          <a:fillRef idx="0">
+            <a:schemeClr val="dk1"/>
+          </a:fillRef>
+          <a:effectRef idx="0">
+            <a:schemeClr val="dk1"/>
+          </a:effectRef>
+          <a:fontRef idx="minor">
+            <a:schemeClr val="tx1"/>
+          </a:fontRef>
+        </p:style>
+      </p:cxnSp>
+      <p:cxnSp>
+        <p:nvCxnSpPr>
+          <p:cNvPr id="44" name="Straight Arrow Connector 43">
+            <a:extLst>
+              <a:ext uri="{FF2B5EF4-FFF2-40B4-BE49-F238E27FC236}">
+                <a16:creationId xmlns:a16="http://schemas.microsoft.com/office/drawing/2014/main" id="{29851852-99CE-673D-4DE3-DE0C704BD2CE}"/>
+              </a:ext>
+            </a:extLst>
+          </p:cNvPr>
+          <p:cNvCxnSpPr>
+            <a:cxnSpLocks/>
+          </p:cNvCxnSpPr>
+          <p:nvPr/>
+        </p:nvCxnSpPr>
+        <p:spPr>
+          <a:xfrm>
+            <a:off x="1491834" y="2109005"/>
+            <a:ext cx="0" cy="230889"/>
+          </a:xfrm>
+          <a:prstGeom prst="straightConnector1">
+            <a:avLst/>
+          </a:prstGeom>
+          <a:ln>
+            <a:tailEnd type="triangle"/>
+          </a:ln>
+        </p:spPr>
+        <p:style>
+          <a:lnRef idx="1">
+            <a:schemeClr val="dk1"/>
+          </a:lnRef>
+          <a:fillRef idx="0">
+            <a:schemeClr val="dk1"/>
+          </a:fillRef>
+          <a:effectRef idx="0">
+            <a:schemeClr val="dk1"/>
+          </a:effectRef>
+          <a:fontRef idx="minor">
+            <a:schemeClr val="tx1"/>
+          </a:fontRef>
+        </p:style>
+      </p:cxnSp>
+      <p:sp>
+        <p:nvSpPr>
+          <p:cNvPr id="45" name="Rectangle 44">
+            <a:extLst>
+              <a:ext uri="{FF2B5EF4-FFF2-40B4-BE49-F238E27FC236}">
+                <a16:creationId xmlns:a16="http://schemas.microsoft.com/office/drawing/2014/main" id="{992228BF-E419-D5DF-BD60-DD24DD75C935}"/>
+              </a:ext>
+            </a:extLst>
+          </p:cNvPr>
+          <p:cNvSpPr/>
+          <p:nvPr/>
+        </p:nvSpPr>
+        <p:spPr>
+          <a:xfrm>
+            <a:off x="1241184" y="2367438"/>
+            <a:ext cx="1088127" cy="246742"/>
+          </a:xfrm>
+          <a:prstGeom prst="rect">
+            <a:avLst/>
+          </a:prstGeom>
+          <a:ln w="19050">
+            <a:solidFill>
+              <a:schemeClr val="accent6">
+                <a:lumMod val="75000"/>
+              </a:schemeClr>
+            </a:solidFill>
+          </a:ln>
+        </p:spPr>
+        <p:style>
+          <a:lnRef idx="2">
+            <a:schemeClr val="dk1"/>
+          </a:lnRef>
+          <a:fillRef idx="1">
+            <a:schemeClr val="lt1"/>
+          </a:fillRef>
+          <a:effectRef idx="0">
+            <a:schemeClr val="dk1"/>
+          </a:effectRef>
+          <a:fontRef idx="minor">
+            <a:schemeClr val="dk1"/>
+          </a:fontRef>
+        </p:style>
+        <p:txBody>
+          <a:bodyPr rtlCol="0" anchor="ctr"/>
+          <a:lstStyle/>
+          <a:p>
+            <a:pPr algn="ctr"/>
+            <a:r>
+              <a:rPr lang="en-US" sz="1100" dirty="0">
+                <a:solidFill>
+                  <a:schemeClr val="accent6">
+                    <a:lumMod val="75000"/>
+                  </a:schemeClr>
+                </a:solidFill>
+              </a:rPr>
+              <a:t>Device verified </a:t>
+            </a:r>
+            <a:endParaRPr lang="en-SG" sz="1100" dirty="0">
+              <a:solidFill>
+                <a:schemeClr val="accent6">
+                  <a:lumMod val="75000"/>
+                </a:schemeClr>
+              </a:solidFill>
+            </a:endParaRPr>
+          </a:p>
+        </p:txBody>
+      </p:sp>
+      <p:sp>
+        <p:nvSpPr>
+          <p:cNvPr id="46" name="Rectangle 45">
+            <a:extLst>
+              <a:ext uri="{FF2B5EF4-FFF2-40B4-BE49-F238E27FC236}">
+                <a16:creationId xmlns:a16="http://schemas.microsoft.com/office/drawing/2014/main" id="{1BAA7897-E18A-6C53-A72B-CEBEC47DAEA0}"/>
+              </a:ext>
+            </a:extLst>
+          </p:cNvPr>
+          <p:cNvSpPr/>
+          <p:nvPr/>
+        </p:nvSpPr>
+        <p:spPr>
+          <a:xfrm>
+            <a:off x="773161" y="2706488"/>
+            <a:ext cx="1088127" cy="246742"/>
+          </a:xfrm>
+          <a:prstGeom prst="rect">
+            <a:avLst/>
+          </a:prstGeom>
+          <a:ln w="19050">
+            <a:solidFill>
+              <a:srgbClr val="C00000"/>
+            </a:solidFill>
+          </a:ln>
+        </p:spPr>
+        <p:style>
+          <a:lnRef idx="2">
+            <a:schemeClr val="dk1"/>
+          </a:lnRef>
+          <a:fillRef idx="1">
+            <a:schemeClr val="lt1"/>
+          </a:fillRef>
+          <a:effectRef idx="0">
+            <a:schemeClr val="dk1"/>
+          </a:effectRef>
+          <a:fontRef idx="minor">
+            <a:schemeClr val="dk1"/>
+          </a:fontRef>
+        </p:style>
+        <p:txBody>
+          <a:bodyPr rtlCol="0" anchor="ctr"/>
+          <a:lstStyle/>
+          <a:p>
+            <a:pPr algn="ctr"/>
+            <a:r>
+              <a:rPr lang="en-US" sz="1100" dirty="0">
+                <a:solidFill>
+                  <a:srgbClr val="C00000"/>
+                </a:solidFill>
+              </a:rPr>
+              <a:t>Invalid Device</a:t>
+            </a:r>
+            <a:endParaRPr lang="en-SG" sz="1100" dirty="0">
+              <a:solidFill>
+                <a:srgbClr val="C00000"/>
+              </a:solidFill>
+            </a:endParaRPr>
+          </a:p>
+        </p:txBody>
+      </p:sp>
+      <p:cxnSp>
+        <p:nvCxnSpPr>
+          <p:cNvPr id="47" name="Straight Arrow Connector 46">
+            <a:extLst>
+              <a:ext uri="{FF2B5EF4-FFF2-40B4-BE49-F238E27FC236}">
+                <a16:creationId xmlns:a16="http://schemas.microsoft.com/office/drawing/2014/main" id="{19C7F9A8-4CFF-BF12-AA14-AF966CC15E29}"/>
+              </a:ext>
+            </a:extLst>
+          </p:cNvPr>
+          <p:cNvCxnSpPr>
+            <a:cxnSpLocks/>
+            <a:stCxn id="41" idx="1"/>
+          </p:cNvCxnSpPr>
+          <p:nvPr/>
+        </p:nvCxnSpPr>
+        <p:spPr>
+          <a:xfrm>
+            <a:off x="859507" y="1890156"/>
+            <a:ext cx="0" cy="816332"/>
+          </a:xfrm>
+          <a:prstGeom prst="straightConnector1">
+            <a:avLst/>
+          </a:prstGeom>
+          <a:ln>
+            <a:tailEnd type="triangle"/>
+          </a:ln>
+        </p:spPr>
+        <p:style>
+          <a:lnRef idx="1">
+            <a:schemeClr val="dk1"/>
+          </a:lnRef>
+          <a:fillRef idx="0">
+            <a:schemeClr val="dk1"/>
+          </a:fillRef>
+          <a:effectRef idx="0">
+            <a:schemeClr val="dk1"/>
+          </a:effectRef>
+          <a:fontRef idx="minor">
+            <a:schemeClr val="tx1"/>
+          </a:fontRef>
+        </p:style>
+      </p:cxnSp>
+      <p:sp>
+        <p:nvSpPr>
+          <p:cNvPr id="50" name="TextBox 49">
+            <a:extLst>
+              <a:ext uri="{FF2B5EF4-FFF2-40B4-BE49-F238E27FC236}">
+                <a16:creationId xmlns:a16="http://schemas.microsoft.com/office/drawing/2014/main" id="{34767E4E-E858-B84E-2EA2-6DE80FCEA2CB}"/>
+              </a:ext>
+            </a:extLst>
+          </p:cNvPr>
+          <p:cNvSpPr txBox="1"/>
+          <p:nvPr/>
+        </p:nvSpPr>
+        <p:spPr>
+          <a:xfrm>
+            <a:off x="1462567" y="2097313"/>
+            <a:ext cx="455266" cy="261610"/>
+          </a:xfrm>
+          <a:prstGeom prst="rect">
+            <a:avLst/>
+          </a:prstGeom>
+          <a:noFill/>
+        </p:spPr>
+        <p:txBody>
+          <a:bodyPr wrap="square" rtlCol="0">
+            <a:spAutoFit/>
+          </a:bodyPr>
+          <a:lstStyle/>
+          <a:p>
+            <a:r>
+              <a:rPr lang="en-US" sz="1100" b="1" dirty="0">
+                <a:solidFill>
+                  <a:schemeClr val="accent6">
+                    <a:lumMod val="75000"/>
+                  </a:schemeClr>
+                </a:solidFill>
+              </a:rPr>
+              <a:t>Yes</a:t>
+            </a:r>
+            <a:endParaRPr lang="en-SG" sz="1100" b="1" dirty="0">
+              <a:solidFill>
+                <a:schemeClr val="accent6">
+                  <a:lumMod val="75000"/>
+                </a:schemeClr>
+              </a:solidFill>
+            </a:endParaRPr>
+          </a:p>
+        </p:txBody>
+      </p:sp>
+      <p:sp>
+        <p:nvSpPr>
+          <p:cNvPr id="51" name="TextBox 50">
+            <a:extLst>
+              <a:ext uri="{FF2B5EF4-FFF2-40B4-BE49-F238E27FC236}">
+                <a16:creationId xmlns:a16="http://schemas.microsoft.com/office/drawing/2014/main" id="{DB9681B9-1750-2921-6AA7-AD5445854F5F}"/>
+              </a:ext>
+            </a:extLst>
+          </p:cNvPr>
+          <p:cNvSpPr txBox="1"/>
+          <p:nvPr/>
+        </p:nvSpPr>
+        <p:spPr>
+          <a:xfrm>
+            <a:off x="806999" y="2017762"/>
+            <a:ext cx="455266" cy="261610"/>
+          </a:xfrm>
+          <a:prstGeom prst="rect">
+            <a:avLst/>
+          </a:prstGeom>
+          <a:noFill/>
+        </p:spPr>
+        <p:txBody>
+          <a:bodyPr wrap="square" rtlCol="0">
+            <a:spAutoFit/>
+          </a:bodyPr>
+          <a:lstStyle/>
+          <a:p>
+            <a:r>
+              <a:rPr lang="en-US" sz="1100" b="1" dirty="0">
+                <a:solidFill>
+                  <a:srgbClr val="C00000"/>
+                </a:solidFill>
+              </a:rPr>
+              <a:t>Yes</a:t>
+            </a:r>
+            <a:endParaRPr lang="en-SG" sz="1100" b="1" dirty="0">
+              <a:solidFill>
+                <a:srgbClr val="C00000"/>
+              </a:solidFill>
+            </a:endParaRPr>
+          </a:p>
+        </p:txBody>
+      </p:sp>
+    </p:spTree>
+    <p:extLst>
+      <p:ext uri="{BB962C8B-B14F-4D97-AF65-F5344CB8AC3E}">
+        <p14:creationId xmlns:p14="http://schemas.microsoft.com/office/powerpoint/2010/main" val="50930448"/>
+      </p:ext>
+    </p:extLst>
+  </p:cSld>
+  <p:clrMapOvr>
+    <a:masterClrMapping/>
+  </p:clrMapOvr>
+</p:sld>
+</file>
+
+<file path=ppt/slides/slide4.xml><?xml version="1.0" encoding="utf-8"?>
 <p:sld xmlns:a="http://schemas.openxmlformats.org/drawingml/2006/main" xmlns:r="http://schemas.openxmlformats.org/officeDocument/2006/relationships" xmlns:p="http://schemas.openxmlformats.org/presentationml/2006/main">
   <p:cSld>
     <p:spTree>

</xml_diff>

<commit_message>
update the design document section.
</commit_message>
<xml_diff>
--- a/doc/designDoc.pptx
+++ b/doc/designDoc.pptx
@@ -5,13 +5,16 @@
     <p:sldMasterId id="2147483648" r:id="rId1"/>
   </p:sldMasterIdLst>
   <p:notesMasterIdLst>
-    <p:notesMasterId r:id="rId6"/>
+    <p:notesMasterId r:id="rId9"/>
   </p:notesMasterIdLst>
   <p:sldIdLst>
     <p:sldId id="256" r:id="rId2"/>
     <p:sldId id="262" r:id="rId3"/>
     <p:sldId id="263" r:id="rId4"/>
-    <p:sldId id="261" r:id="rId5"/>
+    <p:sldId id="264" r:id="rId5"/>
+    <p:sldId id="265" r:id="rId6"/>
+    <p:sldId id="266" r:id="rId7"/>
+    <p:sldId id="261" r:id="rId8"/>
   </p:sldIdLst>
   <p:sldSz cx="12192000" cy="6858000"/>
   <p:notesSz cx="6858000" cy="9144000"/>
@@ -701,7 +704,7 @@
           <a:p>
             <a:fld id="{620E605A-E658-4718-A0B0-0E0D18691EE8}" type="slidenum">
               <a:rPr lang="en-SG" smtClean="0"/>
-              <a:t>4</a:t>
+              <a:t>7</a:t>
             </a:fld>
             <a:endParaRPr lang="en-SG"/>
           </a:p>
@@ -10711,7 +10714,7 @@
                   <a:srgbClr val="C00000"/>
                 </a:solidFill>
               </a:rPr>
-              <a:t>Yes</a:t>
+              <a:t>No</a:t>
             </a:r>
             <a:endParaRPr lang="en-SG" sz="1100" b="1" dirty="0">
               <a:solidFill>
@@ -10735,6 +10738,4326 @@
 </file>
 
 <file path=ppt/slides/slide4.xml><?xml version="1.0" encoding="utf-8"?>
+<p:sld xmlns:a="http://schemas.openxmlformats.org/drawingml/2006/main" xmlns:r="http://schemas.openxmlformats.org/officeDocument/2006/relationships" xmlns:p="http://schemas.openxmlformats.org/presentationml/2006/main">
+  <p:cSld>
+    <p:spTree>
+      <p:nvGrpSpPr>
+        <p:cNvPr id="1" name=""/>
+        <p:cNvGrpSpPr/>
+        <p:nvPr/>
+      </p:nvGrpSpPr>
+      <p:grpSpPr>
+        <a:xfrm>
+          <a:off x="0" y="0"/>
+          <a:ext cx="0" cy="0"/>
+          <a:chOff x="0" y="0"/>
+          <a:chExt cx="0" cy="0"/>
+        </a:xfrm>
+      </p:grpSpPr>
+      <p:sp>
+        <p:nvSpPr>
+          <p:cNvPr id="5" name="Rectangle 4">
+            <a:extLst>
+              <a:ext uri="{FF2B5EF4-FFF2-40B4-BE49-F238E27FC236}">
+                <a16:creationId xmlns:a16="http://schemas.microsoft.com/office/drawing/2014/main" id="{A246F335-98B2-9A94-7235-F77CA390333E}"/>
+              </a:ext>
+            </a:extLst>
+          </p:cNvPr>
+          <p:cNvSpPr/>
+          <p:nvPr/>
+        </p:nvSpPr>
+        <p:spPr>
+          <a:xfrm>
+            <a:off x="695363" y="1585715"/>
+            <a:ext cx="2358190" cy="3203455"/>
+          </a:xfrm>
+          <a:prstGeom prst="rect">
+            <a:avLst/>
+          </a:prstGeom>
+          <a:ln>
+            <a:prstDash val="sysDot"/>
+          </a:ln>
+        </p:spPr>
+        <p:style>
+          <a:lnRef idx="2">
+            <a:schemeClr val="dk1"/>
+          </a:lnRef>
+          <a:fillRef idx="1">
+            <a:schemeClr val="lt1"/>
+          </a:fillRef>
+          <a:effectRef idx="0">
+            <a:schemeClr val="dk1"/>
+          </a:effectRef>
+          <a:fontRef idx="minor">
+            <a:schemeClr val="dk1"/>
+          </a:fontRef>
+        </p:style>
+        <p:txBody>
+          <a:bodyPr rtlCol="0" anchor="ctr"/>
+          <a:lstStyle/>
+          <a:p>
+            <a:pPr algn="ctr"/>
+            <a:endParaRPr lang="en-SG"/>
+          </a:p>
+        </p:txBody>
+      </p:sp>
+      <p:cxnSp>
+        <p:nvCxnSpPr>
+          <p:cNvPr id="76" name="Straight Arrow Connector 75">
+            <a:extLst>
+              <a:ext uri="{FF2B5EF4-FFF2-40B4-BE49-F238E27FC236}">
+                <a16:creationId xmlns:a16="http://schemas.microsoft.com/office/drawing/2014/main" id="{A98012BF-68C6-0E0F-68EC-AEF046C2BC81}"/>
+              </a:ext>
+            </a:extLst>
+          </p:cNvPr>
+          <p:cNvCxnSpPr>
+            <a:cxnSpLocks/>
+          </p:cNvCxnSpPr>
+          <p:nvPr/>
+        </p:nvCxnSpPr>
+        <p:spPr>
+          <a:xfrm>
+            <a:off x="1828738" y="2413250"/>
+            <a:ext cx="0" cy="1781682"/>
+          </a:xfrm>
+          <a:prstGeom prst="straightConnector1">
+            <a:avLst/>
+          </a:prstGeom>
+          <a:ln>
+            <a:tailEnd type="triangle"/>
+          </a:ln>
+        </p:spPr>
+        <p:style>
+          <a:lnRef idx="1">
+            <a:schemeClr val="dk1"/>
+          </a:lnRef>
+          <a:fillRef idx="0">
+            <a:schemeClr val="dk1"/>
+          </a:fillRef>
+          <a:effectRef idx="0">
+            <a:schemeClr val="dk1"/>
+          </a:effectRef>
+          <a:fontRef idx="minor">
+            <a:schemeClr val="tx1"/>
+          </a:fontRef>
+        </p:style>
+      </p:cxnSp>
+      <p:sp>
+        <p:nvSpPr>
+          <p:cNvPr id="4" name="Rectangle 3">
+            <a:extLst>
+              <a:ext uri="{FF2B5EF4-FFF2-40B4-BE49-F238E27FC236}">
+                <a16:creationId xmlns:a16="http://schemas.microsoft.com/office/drawing/2014/main" id="{53C88D71-B931-12BC-C7E8-03656C61D496}"/>
+              </a:ext>
+            </a:extLst>
+          </p:cNvPr>
+          <p:cNvSpPr/>
+          <p:nvPr/>
+        </p:nvSpPr>
+        <p:spPr>
+          <a:xfrm>
+            <a:off x="3429001" y="1831206"/>
+            <a:ext cx="399443" cy="2797488"/>
+          </a:xfrm>
+          <a:prstGeom prst="rect">
+            <a:avLst/>
+          </a:prstGeom>
+          <a:ln>
+            <a:solidFill>
+              <a:schemeClr val="bg1">
+                <a:lumMod val="65000"/>
+              </a:schemeClr>
+            </a:solidFill>
+            <a:prstDash val="dash"/>
+          </a:ln>
+        </p:spPr>
+        <p:style>
+          <a:lnRef idx="2">
+            <a:schemeClr val="dk1"/>
+          </a:lnRef>
+          <a:fillRef idx="1">
+            <a:schemeClr val="lt1"/>
+          </a:fillRef>
+          <a:effectRef idx="0">
+            <a:schemeClr val="dk1"/>
+          </a:effectRef>
+          <a:fontRef idx="minor">
+            <a:schemeClr val="dk1"/>
+          </a:fontRef>
+        </p:style>
+        <p:txBody>
+          <a:bodyPr rtlCol="0" anchor="ctr"/>
+          <a:lstStyle/>
+          <a:p>
+            <a:pPr algn="ctr"/>
+            <a:endParaRPr lang="en-SG"/>
+          </a:p>
+        </p:txBody>
+      </p:sp>
+      <p:sp>
+        <p:nvSpPr>
+          <p:cNvPr id="6" name="Rectangle 5">
+            <a:extLst>
+              <a:ext uri="{FF2B5EF4-FFF2-40B4-BE49-F238E27FC236}">
+                <a16:creationId xmlns:a16="http://schemas.microsoft.com/office/drawing/2014/main" id="{A200E861-B757-4089-1F5F-EF1885E7A2E1}"/>
+              </a:ext>
+            </a:extLst>
+          </p:cNvPr>
+          <p:cNvSpPr/>
+          <p:nvPr/>
+        </p:nvSpPr>
+        <p:spPr>
+          <a:xfrm>
+            <a:off x="4182717" y="2214550"/>
+            <a:ext cx="2268116" cy="2316280"/>
+          </a:xfrm>
+          <a:prstGeom prst="rect">
+            <a:avLst/>
+          </a:prstGeom>
+          <a:ln>
+            <a:prstDash val="sysDot"/>
+          </a:ln>
+        </p:spPr>
+        <p:style>
+          <a:lnRef idx="2">
+            <a:schemeClr val="dk1"/>
+          </a:lnRef>
+          <a:fillRef idx="1">
+            <a:schemeClr val="lt1"/>
+          </a:fillRef>
+          <a:effectRef idx="0">
+            <a:schemeClr val="dk1"/>
+          </a:effectRef>
+          <a:fontRef idx="minor">
+            <a:schemeClr val="dk1"/>
+          </a:fontRef>
+        </p:style>
+        <p:txBody>
+          <a:bodyPr rtlCol="0" anchor="ctr"/>
+          <a:lstStyle/>
+          <a:p>
+            <a:pPr algn="ctr"/>
+            <a:endParaRPr lang="en-SG"/>
+          </a:p>
+        </p:txBody>
+      </p:sp>
+      <p:cxnSp>
+        <p:nvCxnSpPr>
+          <p:cNvPr id="7" name="Straight Connector 6">
+            <a:extLst>
+              <a:ext uri="{FF2B5EF4-FFF2-40B4-BE49-F238E27FC236}">
+                <a16:creationId xmlns:a16="http://schemas.microsoft.com/office/drawing/2014/main" id="{7A48D0E5-8F01-5A5E-E1DB-AFB209A4D604}"/>
+              </a:ext>
+            </a:extLst>
+          </p:cNvPr>
+          <p:cNvCxnSpPr/>
+          <p:nvPr/>
+        </p:nvCxnSpPr>
+        <p:spPr>
+          <a:xfrm>
+            <a:off x="6871092" y="1626524"/>
+            <a:ext cx="27371" cy="3001867"/>
+          </a:xfrm>
+          <a:prstGeom prst="line">
+            <a:avLst/>
+          </a:prstGeom>
+          <a:ln>
+            <a:prstDash val="dash"/>
+          </a:ln>
+        </p:spPr>
+        <p:style>
+          <a:lnRef idx="1">
+            <a:schemeClr val="dk1"/>
+          </a:lnRef>
+          <a:fillRef idx="0">
+            <a:schemeClr val="dk1"/>
+          </a:fillRef>
+          <a:effectRef idx="0">
+            <a:schemeClr val="dk1"/>
+          </a:effectRef>
+          <a:fontRef idx="minor">
+            <a:schemeClr val="tx1"/>
+          </a:fontRef>
+        </p:style>
+      </p:cxnSp>
+      <p:sp>
+        <p:nvSpPr>
+          <p:cNvPr id="8" name="TextBox 7">
+            <a:extLst>
+              <a:ext uri="{FF2B5EF4-FFF2-40B4-BE49-F238E27FC236}">
+                <a16:creationId xmlns:a16="http://schemas.microsoft.com/office/drawing/2014/main" id="{FC94BB9D-5F00-41E7-D3E0-1CD5CCB4C561}"/>
+              </a:ext>
+            </a:extLst>
+          </p:cNvPr>
+          <p:cNvSpPr txBox="1"/>
+          <p:nvPr/>
+        </p:nvSpPr>
+        <p:spPr>
+          <a:xfrm>
+            <a:off x="6476292" y="1419525"/>
+            <a:ext cx="941637" cy="338554"/>
+          </a:xfrm>
+          <a:prstGeom prst="rect">
+            <a:avLst/>
+          </a:prstGeom>
+          <a:noFill/>
+        </p:spPr>
+        <p:txBody>
+          <a:bodyPr wrap="square" rtlCol="0">
+            <a:spAutoFit/>
+          </a:bodyPr>
+          <a:lstStyle/>
+          <a:p>
+            <a:r>
+              <a:rPr lang="en-US" sz="1600" b="1" dirty="0"/>
+              <a:t>Internet</a:t>
+            </a:r>
+            <a:endParaRPr lang="en-SG" sz="1600" b="1" dirty="0"/>
+          </a:p>
+        </p:txBody>
+      </p:sp>
+      <p:sp>
+        <p:nvSpPr>
+          <p:cNvPr id="9" name="Rectangle 8">
+            <a:extLst>
+              <a:ext uri="{FF2B5EF4-FFF2-40B4-BE49-F238E27FC236}">
+                <a16:creationId xmlns:a16="http://schemas.microsoft.com/office/drawing/2014/main" id="{5856E6CF-F0AD-8FD8-0E2B-E46B2FF9D589}"/>
+              </a:ext>
+            </a:extLst>
+          </p:cNvPr>
+          <p:cNvSpPr/>
+          <p:nvPr/>
+        </p:nvSpPr>
+        <p:spPr>
+          <a:xfrm>
+            <a:off x="7582301" y="2214430"/>
+            <a:ext cx="3133701" cy="2689040"/>
+          </a:xfrm>
+          <a:prstGeom prst="rect">
+            <a:avLst/>
+          </a:prstGeom>
+          <a:ln>
+            <a:prstDash val="sysDot"/>
+          </a:ln>
+        </p:spPr>
+        <p:style>
+          <a:lnRef idx="2">
+            <a:schemeClr val="dk1"/>
+          </a:lnRef>
+          <a:fillRef idx="1">
+            <a:schemeClr val="lt1"/>
+          </a:fillRef>
+          <a:effectRef idx="0">
+            <a:schemeClr val="dk1"/>
+          </a:effectRef>
+          <a:fontRef idx="minor">
+            <a:schemeClr val="dk1"/>
+          </a:fontRef>
+        </p:style>
+        <p:txBody>
+          <a:bodyPr rtlCol="0" anchor="ctr"/>
+          <a:lstStyle/>
+          <a:p>
+            <a:pPr algn="ctr"/>
+            <a:endParaRPr lang="en-SG"/>
+          </a:p>
+        </p:txBody>
+      </p:sp>
+      <p:sp>
+        <p:nvSpPr>
+          <p:cNvPr id="10" name="TextBox 9">
+            <a:extLst>
+              <a:ext uri="{FF2B5EF4-FFF2-40B4-BE49-F238E27FC236}">
+                <a16:creationId xmlns:a16="http://schemas.microsoft.com/office/drawing/2014/main" id="{6919BAB1-46DE-717C-2D9B-BDFB79C623EC}"/>
+              </a:ext>
+            </a:extLst>
+          </p:cNvPr>
+          <p:cNvSpPr txBox="1"/>
+          <p:nvPr/>
+        </p:nvSpPr>
+        <p:spPr>
+          <a:xfrm>
+            <a:off x="940396" y="1230497"/>
+            <a:ext cx="2358108" cy="307777"/>
+          </a:xfrm>
+          <a:prstGeom prst="rect">
+            <a:avLst/>
+          </a:prstGeom>
+          <a:noFill/>
+        </p:spPr>
+        <p:txBody>
+          <a:bodyPr wrap="square" rtlCol="0">
+            <a:spAutoFit/>
+          </a:bodyPr>
+          <a:lstStyle/>
+          <a:p>
+            <a:r>
+              <a:rPr lang="en-US" sz="1400" dirty="0"/>
+              <a:t>Trust App [Trust Zone]</a:t>
+            </a:r>
+            <a:endParaRPr lang="en-SG" sz="1400" dirty="0"/>
+          </a:p>
+        </p:txBody>
+      </p:sp>
+      <p:sp>
+        <p:nvSpPr>
+          <p:cNvPr id="11" name="TextBox 10">
+            <a:extLst>
+              <a:ext uri="{FF2B5EF4-FFF2-40B4-BE49-F238E27FC236}">
+                <a16:creationId xmlns:a16="http://schemas.microsoft.com/office/drawing/2014/main" id="{0F4EAB24-32D7-05BE-9C5E-F96938F9C85D}"/>
+              </a:ext>
+            </a:extLst>
+          </p:cNvPr>
+          <p:cNvSpPr txBox="1"/>
+          <p:nvPr/>
+        </p:nvSpPr>
+        <p:spPr>
+          <a:xfrm>
+            <a:off x="4154134" y="1815275"/>
+            <a:ext cx="2486529" cy="307777"/>
+          </a:xfrm>
+          <a:prstGeom prst="rect">
+            <a:avLst/>
+          </a:prstGeom>
+          <a:noFill/>
+        </p:spPr>
+        <p:txBody>
+          <a:bodyPr wrap="square" rtlCol="0">
+            <a:spAutoFit/>
+          </a:bodyPr>
+          <a:lstStyle/>
+          <a:p>
+            <a:r>
+              <a:rPr lang="en-US" sz="1400" dirty="0"/>
+              <a:t>Trust Client [Normal world]</a:t>
+            </a:r>
+            <a:endParaRPr lang="en-SG" sz="1400" dirty="0"/>
+          </a:p>
+        </p:txBody>
+      </p:sp>
+      <p:sp>
+        <p:nvSpPr>
+          <p:cNvPr id="12" name="TextBox 11">
+            <a:extLst>
+              <a:ext uri="{FF2B5EF4-FFF2-40B4-BE49-F238E27FC236}">
+                <a16:creationId xmlns:a16="http://schemas.microsoft.com/office/drawing/2014/main" id="{4C579F11-92EE-B294-3517-6FAE1D968C08}"/>
+              </a:ext>
+            </a:extLst>
+          </p:cNvPr>
+          <p:cNvSpPr txBox="1"/>
+          <p:nvPr/>
+        </p:nvSpPr>
+        <p:spPr>
+          <a:xfrm>
+            <a:off x="7943250" y="2304035"/>
+            <a:ext cx="2157663" cy="307777"/>
+          </a:xfrm>
+          <a:prstGeom prst="rect">
+            <a:avLst/>
+          </a:prstGeom>
+          <a:noFill/>
+        </p:spPr>
+        <p:txBody>
+          <a:bodyPr wrap="square" rtlCol="0">
+            <a:spAutoFit/>
+          </a:bodyPr>
+          <a:lstStyle/>
+          <a:p>
+            <a:r>
+              <a:rPr lang="en-US" sz="1400" dirty="0"/>
+              <a:t>Server program</a:t>
+            </a:r>
+            <a:endParaRPr lang="en-SG" sz="1400" dirty="0"/>
+          </a:p>
+        </p:txBody>
+      </p:sp>
+      <p:sp>
+        <p:nvSpPr>
+          <p:cNvPr id="13" name="TextBox 12">
+            <a:extLst>
+              <a:ext uri="{FF2B5EF4-FFF2-40B4-BE49-F238E27FC236}">
+                <a16:creationId xmlns:a16="http://schemas.microsoft.com/office/drawing/2014/main" id="{25B28F48-A571-6B73-794D-35036A57C9CD}"/>
+              </a:ext>
+            </a:extLst>
+          </p:cNvPr>
+          <p:cNvSpPr txBox="1"/>
+          <p:nvPr/>
+        </p:nvSpPr>
+        <p:spPr>
+          <a:xfrm>
+            <a:off x="3263362" y="987755"/>
+            <a:ext cx="1590576" cy="369332"/>
+          </a:xfrm>
+          <a:prstGeom prst="rect">
+            <a:avLst/>
+          </a:prstGeom>
+          <a:noFill/>
+        </p:spPr>
+        <p:txBody>
+          <a:bodyPr wrap="square" rtlCol="0">
+            <a:spAutoFit/>
+          </a:bodyPr>
+          <a:lstStyle/>
+          <a:p>
+            <a:r>
+              <a:rPr lang="en-US" b="1" dirty="0"/>
+              <a:t>Raspberry PI </a:t>
+            </a:r>
+            <a:endParaRPr lang="en-SG" b="1" dirty="0"/>
+          </a:p>
+        </p:txBody>
+      </p:sp>
+      <p:sp>
+        <p:nvSpPr>
+          <p:cNvPr id="14" name="TextBox 13">
+            <a:extLst>
+              <a:ext uri="{FF2B5EF4-FFF2-40B4-BE49-F238E27FC236}">
+                <a16:creationId xmlns:a16="http://schemas.microsoft.com/office/drawing/2014/main" id="{47539E92-B60F-C8D7-497A-D972F236A7CC}"/>
+              </a:ext>
+            </a:extLst>
+          </p:cNvPr>
+          <p:cNvSpPr txBox="1"/>
+          <p:nvPr/>
+        </p:nvSpPr>
+        <p:spPr>
+          <a:xfrm>
+            <a:off x="7629578" y="1048725"/>
+            <a:ext cx="2471335" cy="338554"/>
+          </a:xfrm>
+          <a:prstGeom prst="rect">
+            <a:avLst/>
+          </a:prstGeom>
+          <a:noFill/>
+        </p:spPr>
+        <p:txBody>
+          <a:bodyPr wrap="square" rtlCol="0">
+            <a:spAutoFit/>
+          </a:bodyPr>
+          <a:lstStyle/>
+          <a:p>
+            <a:r>
+              <a:rPr lang="en-US" sz="1600" b="1" dirty="0"/>
+              <a:t>Trust Server Computer</a:t>
+            </a:r>
+            <a:endParaRPr lang="en-SG" sz="1600" b="1" dirty="0"/>
+          </a:p>
+        </p:txBody>
+      </p:sp>
+      <p:sp>
+        <p:nvSpPr>
+          <p:cNvPr id="15" name="Rectangle 14">
+            <a:extLst>
+              <a:ext uri="{FF2B5EF4-FFF2-40B4-BE49-F238E27FC236}">
+                <a16:creationId xmlns:a16="http://schemas.microsoft.com/office/drawing/2014/main" id="{5C8D22FF-22E7-13CC-C8C4-E781769D86E9}"/>
+              </a:ext>
+            </a:extLst>
+          </p:cNvPr>
+          <p:cNvSpPr/>
+          <p:nvPr/>
+        </p:nvSpPr>
+        <p:spPr>
+          <a:xfrm>
+            <a:off x="1148991" y="2951593"/>
+            <a:ext cx="1621859" cy="365992"/>
+          </a:xfrm>
+          <a:prstGeom prst="rect">
+            <a:avLst/>
+          </a:prstGeom>
+          <a:ln w="19050"/>
+        </p:spPr>
+        <p:style>
+          <a:lnRef idx="2">
+            <a:schemeClr val="dk1"/>
+          </a:lnRef>
+          <a:fillRef idx="1">
+            <a:schemeClr val="lt1"/>
+          </a:fillRef>
+          <a:effectRef idx="0">
+            <a:schemeClr val="dk1"/>
+          </a:effectRef>
+          <a:fontRef idx="minor">
+            <a:schemeClr val="dk1"/>
+          </a:fontRef>
+        </p:style>
+        <p:txBody>
+          <a:bodyPr rtlCol="0" anchor="ctr"/>
+          <a:lstStyle/>
+          <a:p>
+            <a:r>
+              <a:rPr lang="en-US" sz="1100" dirty="0"/>
+              <a:t>RSA[2048] encryption </a:t>
+            </a:r>
+            <a:endParaRPr lang="en-SG" sz="1100" dirty="0"/>
+          </a:p>
+        </p:txBody>
+      </p:sp>
+      <p:pic>
+        <p:nvPicPr>
+          <p:cNvPr id="16" name="Picture 15">
+            <a:extLst>
+              <a:ext uri="{FF2B5EF4-FFF2-40B4-BE49-F238E27FC236}">
+                <a16:creationId xmlns:a16="http://schemas.microsoft.com/office/drawing/2014/main" id="{6786AC52-BDD3-6D39-C958-CAC994ABF84F}"/>
+              </a:ext>
+            </a:extLst>
+          </p:cNvPr>
+          <p:cNvPicPr>
+            <a:picLocks noChangeAspect="1"/>
+          </p:cNvPicPr>
+          <p:nvPr/>
+        </p:nvPicPr>
+        <p:blipFill>
+          <a:blip r:embed="rId2" cstate="print">
+            <a:extLst>
+              <a:ext uri="{28A0092B-C50C-407E-A947-70E740481C1C}">
+                <a14:useLocalDpi xmlns:a14="http://schemas.microsoft.com/office/drawing/2010/main" val="0"/>
+              </a:ext>
+            </a:extLst>
+          </a:blip>
+          <a:stretch>
+            <a:fillRect/>
+          </a:stretch>
+        </p:blipFill>
+        <p:spPr>
+          <a:xfrm>
+            <a:off x="782377" y="1631546"/>
+            <a:ext cx="364236" cy="364236"/>
+          </a:xfrm>
+          <a:prstGeom prst="rect">
+            <a:avLst/>
+          </a:prstGeom>
+        </p:spPr>
+      </p:pic>
+      <p:sp>
+        <p:nvSpPr>
+          <p:cNvPr id="19" name="TextBox 18">
+            <a:extLst>
+              <a:ext uri="{FF2B5EF4-FFF2-40B4-BE49-F238E27FC236}">
+                <a16:creationId xmlns:a16="http://schemas.microsoft.com/office/drawing/2014/main" id="{339160E2-2742-F545-9255-4B5EAA509B7E}"/>
+              </a:ext>
+            </a:extLst>
+          </p:cNvPr>
+          <p:cNvSpPr txBox="1"/>
+          <p:nvPr/>
+        </p:nvSpPr>
+        <p:spPr>
+          <a:xfrm>
+            <a:off x="3096135" y="4707940"/>
+            <a:ext cx="3222060" cy="276999"/>
+          </a:xfrm>
+          <a:prstGeom prst="rect">
+            <a:avLst/>
+          </a:prstGeom>
+          <a:noFill/>
+        </p:spPr>
+        <p:txBody>
+          <a:bodyPr wrap="square" rtlCol="0">
+            <a:spAutoFit/>
+          </a:bodyPr>
+          <a:lstStyle/>
+          <a:p>
+            <a:r>
+              <a:rPr lang="en-US" sz="1200" b="1" dirty="0">
+                <a:solidFill>
+                  <a:schemeClr val="bg1">
+                    <a:lumMod val="50000"/>
+                  </a:schemeClr>
+                </a:solidFill>
+              </a:rPr>
+              <a:t>OPTEE driver  &lt;=&gt;  Tee-supplicant service </a:t>
+            </a:r>
+          </a:p>
+        </p:txBody>
+      </p:sp>
+      <p:cxnSp>
+        <p:nvCxnSpPr>
+          <p:cNvPr id="20" name="Straight Arrow Connector 19">
+            <a:extLst>
+              <a:ext uri="{FF2B5EF4-FFF2-40B4-BE49-F238E27FC236}">
+                <a16:creationId xmlns:a16="http://schemas.microsoft.com/office/drawing/2014/main" id="{07CA60BE-9E66-0121-53DC-27EEAC9B78D6}"/>
+              </a:ext>
+            </a:extLst>
+          </p:cNvPr>
+          <p:cNvCxnSpPr>
+            <a:cxnSpLocks/>
+          </p:cNvCxnSpPr>
+          <p:nvPr/>
+        </p:nvCxnSpPr>
+        <p:spPr>
+          <a:xfrm>
+            <a:off x="2770850" y="3134589"/>
+            <a:ext cx="1591328" cy="0"/>
+          </a:xfrm>
+          <a:prstGeom prst="straightConnector1">
+            <a:avLst/>
+          </a:prstGeom>
+          <a:ln>
+            <a:tailEnd type="triangle"/>
+          </a:ln>
+        </p:spPr>
+        <p:style>
+          <a:lnRef idx="1">
+            <a:schemeClr val="dk1"/>
+          </a:lnRef>
+          <a:fillRef idx="0">
+            <a:schemeClr val="dk1"/>
+          </a:fillRef>
+          <a:effectRef idx="0">
+            <a:schemeClr val="dk1"/>
+          </a:effectRef>
+          <a:fontRef idx="minor">
+            <a:schemeClr val="tx1"/>
+          </a:fontRef>
+        </p:style>
+      </p:cxnSp>
+      <p:sp>
+        <p:nvSpPr>
+          <p:cNvPr id="22" name="Rectangle 21">
+            <a:extLst>
+              <a:ext uri="{FF2B5EF4-FFF2-40B4-BE49-F238E27FC236}">
+                <a16:creationId xmlns:a16="http://schemas.microsoft.com/office/drawing/2014/main" id="{240CCA9B-29CB-3ED7-8753-1AC594E708A5}"/>
+              </a:ext>
+            </a:extLst>
+          </p:cNvPr>
+          <p:cNvSpPr/>
+          <p:nvPr/>
+        </p:nvSpPr>
+        <p:spPr>
+          <a:xfrm>
+            <a:off x="4397117" y="2963862"/>
+            <a:ext cx="1838308" cy="365629"/>
+          </a:xfrm>
+          <a:prstGeom prst="rect">
+            <a:avLst/>
+          </a:prstGeom>
+          <a:ln w="19050"/>
+        </p:spPr>
+        <p:style>
+          <a:lnRef idx="2">
+            <a:schemeClr val="dk1"/>
+          </a:lnRef>
+          <a:fillRef idx="1">
+            <a:schemeClr val="lt1"/>
+          </a:fillRef>
+          <a:effectRef idx="0">
+            <a:schemeClr val="dk1"/>
+          </a:effectRef>
+          <a:fontRef idx="minor">
+            <a:schemeClr val="dk1"/>
+          </a:fontRef>
+        </p:style>
+        <p:txBody>
+          <a:bodyPr rtlCol="0" anchor="ctr"/>
+          <a:lstStyle/>
+          <a:p>
+            <a:r>
+              <a:rPr lang="en-US" sz="1100" dirty="0"/>
+              <a:t>Communication module</a:t>
+            </a:r>
+            <a:endParaRPr lang="en-SG" sz="1100" dirty="0"/>
+          </a:p>
+        </p:txBody>
+      </p:sp>
+      <p:sp>
+        <p:nvSpPr>
+          <p:cNvPr id="24" name="Rectangle 23">
+            <a:extLst>
+              <a:ext uri="{FF2B5EF4-FFF2-40B4-BE49-F238E27FC236}">
+                <a16:creationId xmlns:a16="http://schemas.microsoft.com/office/drawing/2014/main" id="{15103B9F-B6C8-BD44-F8D0-1C85A23F78D0}"/>
+              </a:ext>
+            </a:extLst>
+          </p:cNvPr>
+          <p:cNvSpPr/>
+          <p:nvPr/>
+        </p:nvSpPr>
+        <p:spPr>
+          <a:xfrm>
+            <a:off x="8068436" y="2619556"/>
+            <a:ext cx="1225770" cy="286546"/>
+          </a:xfrm>
+          <a:prstGeom prst="rect">
+            <a:avLst/>
+          </a:prstGeom>
+          <a:ln w="19050"/>
+        </p:spPr>
+        <p:style>
+          <a:lnRef idx="2">
+            <a:schemeClr val="dk1"/>
+          </a:lnRef>
+          <a:fillRef idx="1">
+            <a:schemeClr val="lt1"/>
+          </a:fillRef>
+          <a:effectRef idx="0">
+            <a:schemeClr val="dk1"/>
+          </a:effectRef>
+          <a:fontRef idx="minor">
+            <a:schemeClr val="dk1"/>
+          </a:fontRef>
+        </p:style>
+        <p:txBody>
+          <a:bodyPr rtlCol="0" anchor="ctr"/>
+          <a:lstStyle/>
+          <a:p>
+            <a:r>
+              <a:rPr lang="en-US" sz="1100" dirty="0"/>
+              <a:t>Parse message </a:t>
+            </a:r>
+            <a:endParaRPr lang="en-SG" sz="1100" dirty="0"/>
+          </a:p>
+        </p:txBody>
+      </p:sp>
+      <p:sp>
+        <p:nvSpPr>
+          <p:cNvPr id="26" name="Rectangle 25">
+            <a:extLst>
+              <a:ext uri="{FF2B5EF4-FFF2-40B4-BE49-F238E27FC236}">
+                <a16:creationId xmlns:a16="http://schemas.microsoft.com/office/drawing/2014/main" id="{23AA2E07-9689-7ED1-B5B3-DB47A0204199}"/>
+              </a:ext>
+            </a:extLst>
+          </p:cNvPr>
+          <p:cNvSpPr/>
+          <p:nvPr/>
+        </p:nvSpPr>
+        <p:spPr>
+          <a:xfrm>
+            <a:off x="7659304" y="3120063"/>
+            <a:ext cx="1634901" cy="380759"/>
+          </a:xfrm>
+          <a:prstGeom prst="rect">
+            <a:avLst/>
+          </a:prstGeom>
+          <a:ln w="19050"/>
+        </p:spPr>
+        <p:style>
+          <a:lnRef idx="2">
+            <a:schemeClr val="dk1"/>
+          </a:lnRef>
+          <a:fillRef idx="1">
+            <a:schemeClr val="lt1"/>
+          </a:fillRef>
+          <a:effectRef idx="0">
+            <a:schemeClr val="dk1"/>
+          </a:effectRef>
+          <a:fontRef idx="minor">
+            <a:schemeClr val="dk1"/>
+          </a:fontRef>
+        </p:style>
+        <p:txBody>
+          <a:bodyPr rtlCol="0" anchor="ctr"/>
+          <a:lstStyle/>
+          <a:p>
+            <a:r>
+              <a:rPr lang="en-US" sz="1100" dirty="0"/>
+              <a:t>Fetch RSA Key based on the IoT information</a:t>
+            </a:r>
+            <a:endParaRPr lang="en-SG" sz="1100" dirty="0"/>
+          </a:p>
+        </p:txBody>
+      </p:sp>
+      <p:cxnSp>
+        <p:nvCxnSpPr>
+          <p:cNvPr id="27" name="Straight Arrow Connector 26">
+            <a:extLst>
+              <a:ext uri="{FF2B5EF4-FFF2-40B4-BE49-F238E27FC236}">
+                <a16:creationId xmlns:a16="http://schemas.microsoft.com/office/drawing/2014/main" id="{2148AC67-3131-BA4D-7956-93188E359E46}"/>
+              </a:ext>
+            </a:extLst>
+          </p:cNvPr>
+          <p:cNvCxnSpPr/>
+          <p:nvPr/>
+        </p:nvCxnSpPr>
+        <p:spPr>
+          <a:xfrm flipH="1">
+            <a:off x="8437746" y="2908973"/>
+            <a:ext cx="0" cy="203347"/>
+          </a:xfrm>
+          <a:prstGeom prst="straightConnector1">
+            <a:avLst/>
+          </a:prstGeom>
+          <a:ln>
+            <a:tailEnd type="triangle"/>
+          </a:ln>
+        </p:spPr>
+        <p:style>
+          <a:lnRef idx="1">
+            <a:schemeClr val="dk1"/>
+          </a:lnRef>
+          <a:fillRef idx="0">
+            <a:schemeClr val="dk1"/>
+          </a:fillRef>
+          <a:effectRef idx="0">
+            <a:schemeClr val="dk1"/>
+          </a:effectRef>
+          <a:fontRef idx="minor">
+            <a:schemeClr val="tx1"/>
+          </a:fontRef>
+        </p:style>
+      </p:cxnSp>
+      <p:sp>
+        <p:nvSpPr>
+          <p:cNvPr id="28" name="Rectangle 27">
+            <a:extLst>
+              <a:ext uri="{FF2B5EF4-FFF2-40B4-BE49-F238E27FC236}">
+                <a16:creationId xmlns:a16="http://schemas.microsoft.com/office/drawing/2014/main" id="{1F5EFFB6-F2E7-0431-8470-E951DC94D1A7}"/>
+              </a:ext>
+            </a:extLst>
+          </p:cNvPr>
+          <p:cNvSpPr/>
+          <p:nvPr/>
+        </p:nvSpPr>
+        <p:spPr>
+          <a:xfrm>
+            <a:off x="7659303" y="3712500"/>
+            <a:ext cx="2810575" cy="380759"/>
+          </a:xfrm>
+          <a:prstGeom prst="rect">
+            <a:avLst/>
+          </a:prstGeom>
+          <a:ln w="19050"/>
+        </p:spPr>
+        <p:style>
+          <a:lnRef idx="2">
+            <a:schemeClr val="dk1"/>
+          </a:lnRef>
+          <a:fillRef idx="1">
+            <a:schemeClr val="lt1"/>
+          </a:fillRef>
+          <a:effectRef idx="0">
+            <a:schemeClr val="dk1"/>
+          </a:effectRef>
+          <a:fontRef idx="minor">
+            <a:schemeClr val="dk1"/>
+          </a:fontRef>
+        </p:style>
+        <p:txBody>
+          <a:bodyPr rtlCol="0" anchor="ctr"/>
+          <a:lstStyle/>
+          <a:p>
+            <a:r>
+              <a:rPr lang="en-US" sz="1100" dirty="0"/>
+              <a:t>Decrypt the message, get the </a:t>
+            </a:r>
+            <a:r>
+              <a:rPr lang="en-US" sz="1100" b="1" dirty="0">
+                <a:solidFill>
+                  <a:schemeClr val="accent1"/>
+                </a:solidFill>
+              </a:rPr>
+              <a:t>Random#1</a:t>
+            </a:r>
+            <a:r>
+              <a:rPr lang="en-US" sz="1100" dirty="0"/>
+              <a:t>, append </a:t>
+            </a:r>
+            <a:r>
+              <a:rPr lang="en-US" sz="1100" b="1" dirty="0">
+                <a:solidFill>
+                  <a:srgbClr val="C00000"/>
+                </a:solidFill>
+              </a:rPr>
+              <a:t>Random#2 </a:t>
+            </a:r>
+            <a:r>
+              <a:rPr lang="en-US" sz="1100" dirty="0"/>
+              <a:t>and PATT parameters</a:t>
+            </a:r>
+            <a:endParaRPr lang="en-SG" sz="1100" dirty="0"/>
+          </a:p>
+        </p:txBody>
+      </p:sp>
+      <p:cxnSp>
+        <p:nvCxnSpPr>
+          <p:cNvPr id="29" name="Straight Arrow Connector 28">
+            <a:extLst>
+              <a:ext uri="{FF2B5EF4-FFF2-40B4-BE49-F238E27FC236}">
+                <a16:creationId xmlns:a16="http://schemas.microsoft.com/office/drawing/2014/main" id="{846B9ED5-08C3-1C91-A19D-91D927473DC3}"/>
+              </a:ext>
+            </a:extLst>
+          </p:cNvPr>
+          <p:cNvCxnSpPr/>
+          <p:nvPr/>
+        </p:nvCxnSpPr>
+        <p:spPr>
+          <a:xfrm flipH="1">
+            <a:off x="8437746" y="3509153"/>
+            <a:ext cx="0" cy="203347"/>
+          </a:xfrm>
+          <a:prstGeom prst="straightConnector1">
+            <a:avLst/>
+          </a:prstGeom>
+          <a:ln>
+            <a:tailEnd type="triangle"/>
+          </a:ln>
+        </p:spPr>
+        <p:style>
+          <a:lnRef idx="1">
+            <a:schemeClr val="dk1"/>
+          </a:lnRef>
+          <a:fillRef idx="0">
+            <a:schemeClr val="dk1"/>
+          </a:fillRef>
+          <a:effectRef idx="0">
+            <a:schemeClr val="dk1"/>
+          </a:effectRef>
+          <a:fontRef idx="minor">
+            <a:schemeClr val="tx1"/>
+          </a:fontRef>
+        </p:style>
+      </p:cxnSp>
+      <p:sp>
+        <p:nvSpPr>
+          <p:cNvPr id="33" name="Rectangle 32">
+            <a:extLst>
+              <a:ext uri="{FF2B5EF4-FFF2-40B4-BE49-F238E27FC236}">
+                <a16:creationId xmlns:a16="http://schemas.microsoft.com/office/drawing/2014/main" id="{934FD94A-AE6A-05BF-BD63-19F283B1E0D1}"/>
+              </a:ext>
+            </a:extLst>
+          </p:cNvPr>
+          <p:cNvSpPr/>
+          <p:nvPr/>
+        </p:nvSpPr>
+        <p:spPr>
+          <a:xfrm>
+            <a:off x="1374336" y="3711442"/>
+            <a:ext cx="1495422" cy="291367"/>
+          </a:xfrm>
+          <a:prstGeom prst="rect">
+            <a:avLst/>
+          </a:prstGeom>
+          <a:ln w="19050"/>
+        </p:spPr>
+        <p:style>
+          <a:lnRef idx="2">
+            <a:schemeClr val="dk1"/>
+          </a:lnRef>
+          <a:fillRef idx="1">
+            <a:schemeClr val="lt1"/>
+          </a:fillRef>
+          <a:effectRef idx="0">
+            <a:schemeClr val="dk1"/>
+          </a:effectRef>
+          <a:fontRef idx="minor">
+            <a:schemeClr val="dk1"/>
+          </a:fontRef>
+        </p:style>
+        <p:txBody>
+          <a:bodyPr rtlCol="0" anchor="ctr"/>
+          <a:lstStyle/>
+          <a:p>
+            <a:r>
+              <a:rPr lang="en-US" sz="1100" dirty="0"/>
+              <a:t>Decrypt the message</a:t>
+            </a:r>
+            <a:endParaRPr lang="en-SG" sz="1100" dirty="0"/>
+          </a:p>
+        </p:txBody>
+      </p:sp>
+      <p:sp>
+        <p:nvSpPr>
+          <p:cNvPr id="34" name="Rectangle 33">
+            <a:extLst>
+              <a:ext uri="{FF2B5EF4-FFF2-40B4-BE49-F238E27FC236}">
+                <a16:creationId xmlns:a16="http://schemas.microsoft.com/office/drawing/2014/main" id="{B4E6B914-48F7-2C6D-CBBA-6F11FF60372F}"/>
+              </a:ext>
+            </a:extLst>
+          </p:cNvPr>
+          <p:cNvSpPr/>
+          <p:nvPr/>
+        </p:nvSpPr>
+        <p:spPr>
+          <a:xfrm>
+            <a:off x="7659304" y="4327181"/>
+            <a:ext cx="1634901" cy="336715"/>
+          </a:xfrm>
+          <a:prstGeom prst="rect">
+            <a:avLst/>
+          </a:prstGeom>
+          <a:ln w="19050"/>
+        </p:spPr>
+        <p:style>
+          <a:lnRef idx="2">
+            <a:schemeClr val="dk1"/>
+          </a:lnRef>
+          <a:fillRef idx="1">
+            <a:schemeClr val="lt1"/>
+          </a:fillRef>
+          <a:effectRef idx="0">
+            <a:schemeClr val="dk1"/>
+          </a:effectRef>
+          <a:fontRef idx="minor">
+            <a:schemeClr val="dk1"/>
+          </a:fontRef>
+        </p:style>
+        <p:txBody>
+          <a:bodyPr rtlCol="0" anchor="ctr"/>
+          <a:lstStyle/>
+          <a:p>
+            <a:r>
+              <a:rPr lang="en-US" sz="1100" dirty="0"/>
+              <a:t>RSA[2048] Encryption</a:t>
+            </a:r>
+            <a:endParaRPr lang="en-SG" sz="1100" dirty="0"/>
+          </a:p>
+        </p:txBody>
+      </p:sp>
+      <p:cxnSp>
+        <p:nvCxnSpPr>
+          <p:cNvPr id="35" name="Straight Arrow Connector 34">
+            <a:extLst>
+              <a:ext uri="{FF2B5EF4-FFF2-40B4-BE49-F238E27FC236}">
+                <a16:creationId xmlns:a16="http://schemas.microsoft.com/office/drawing/2014/main" id="{C0218307-FBA7-0535-D677-375B4D0CD32D}"/>
+              </a:ext>
+            </a:extLst>
+          </p:cNvPr>
+          <p:cNvCxnSpPr/>
+          <p:nvPr/>
+        </p:nvCxnSpPr>
+        <p:spPr>
+          <a:xfrm flipH="1">
+            <a:off x="8437746" y="4093259"/>
+            <a:ext cx="0" cy="203347"/>
+          </a:xfrm>
+          <a:prstGeom prst="straightConnector1">
+            <a:avLst/>
+          </a:prstGeom>
+          <a:ln>
+            <a:tailEnd type="triangle"/>
+          </a:ln>
+        </p:spPr>
+        <p:style>
+          <a:lnRef idx="1">
+            <a:schemeClr val="dk1"/>
+          </a:lnRef>
+          <a:fillRef idx="0">
+            <a:schemeClr val="dk1"/>
+          </a:fillRef>
+          <a:effectRef idx="0">
+            <a:schemeClr val="dk1"/>
+          </a:effectRef>
+          <a:fontRef idx="minor">
+            <a:schemeClr val="tx1"/>
+          </a:fontRef>
+        </p:style>
+      </p:cxnSp>
+      <p:sp>
+        <p:nvSpPr>
+          <p:cNvPr id="36" name="Flowchart: Magnetic Disk 35">
+            <a:extLst>
+              <a:ext uri="{FF2B5EF4-FFF2-40B4-BE49-F238E27FC236}">
+                <a16:creationId xmlns:a16="http://schemas.microsoft.com/office/drawing/2014/main" id="{CD3AEDDA-A91C-4BEF-891B-5F87C22C1464}"/>
+              </a:ext>
+            </a:extLst>
+          </p:cNvPr>
+          <p:cNvSpPr/>
+          <p:nvPr/>
+        </p:nvSpPr>
+        <p:spPr>
+          <a:xfrm>
+            <a:off x="9651884" y="3110800"/>
+            <a:ext cx="392782" cy="380759"/>
+          </a:xfrm>
+          <a:prstGeom prst="flowChartMagneticDisk">
+            <a:avLst/>
+          </a:prstGeom>
+        </p:spPr>
+        <p:style>
+          <a:lnRef idx="2">
+            <a:schemeClr val="dk1"/>
+          </a:lnRef>
+          <a:fillRef idx="1">
+            <a:schemeClr val="lt1"/>
+          </a:fillRef>
+          <a:effectRef idx="0">
+            <a:schemeClr val="dk1"/>
+          </a:effectRef>
+          <a:fontRef idx="minor">
+            <a:schemeClr val="dk1"/>
+          </a:fontRef>
+        </p:style>
+        <p:txBody>
+          <a:bodyPr rtlCol="0" anchor="ctr"/>
+          <a:lstStyle/>
+          <a:p>
+            <a:pPr algn="ctr"/>
+            <a:endParaRPr lang="en-SG"/>
+          </a:p>
+        </p:txBody>
+      </p:sp>
+      <p:cxnSp>
+        <p:nvCxnSpPr>
+          <p:cNvPr id="37" name="Straight Arrow Connector 36">
+            <a:extLst>
+              <a:ext uri="{FF2B5EF4-FFF2-40B4-BE49-F238E27FC236}">
+                <a16:creationId xmlns:a16="http://schemas.microsoft.com/office/drawing/2014/main" id="{75259D2F-6FAC-4BED-238F-7EBC2751E8CA}"/>
+              </a:ext>
+            </a:extLst>
+          </p:cNvPr>
+          <p:cNvCxnSpPr/>
+          <p:nvPr/>
+        </p:nvCxnSpPr>
+        <p:spPr>
+          <a:xfrm flipH="1">
+            <a:off x="9317963" y="3310442"/>
+            <a:ext cx="333921" cy="3613"/>
+          </a:xfrm>
+          <a:prstGeom prst="straightConnector1">
+            <a:avLst/>
+          </a:prstGeom>
+          <a:ln>
+            <a:tailEnd type="triangle"/>
+          </a:ln>
+        </p:spPr>
+        <p:style>
+          <a:lnRef idx="1">
+            <a:schemeClr val="dk1"/>
+          </a:lnRef>
+          <a:fillRef idx="0">
+            <a:schemeClr val="dk1"/>
+          </a:fillRef>
+          <a:effectRef idx="0">
+            <a:schemeClr val="dk1"/>
+          </a:effectRef>
+          <a:fontRef idx="minor">
+            <a:schemeClr val="tx1"/>
+          </a:fontRef>
+        </p:style>
+      </p:cxnSp>
+      <p:cxnSp>
+        <p:nvCxnSpPr>
+          <p:cNvPr id="39" name="Elbow Connector 71">
+            <a:extLst>
+              <a:ext uri="{FF2B5EF4-FFF2-40B4-BE49-F238E27FC236}">
+                <a16:creationId xmlns:a16="http://schemas.microsoft.com/office/drawing/2014/main" id="{0CC5C4DD-E01B-685D-C6FB-15A5FB6A4AD6}"/>
+              </a:ext>
+            </a:extLst>
+          </p:cNvPr>
+          <p:cNvCxnSpPr>
+            <a:cxnSpLocks/>
+            <a:stCxn id="34" idx="1"/>
+            <a:endCxn id="72" idx="3"/>
+          </p:cNvCxnSpPr>
+          <p:nvPr/>
+        </p:nvCxnSpPr>
+        <p:spPr>
+          <a:xfrm rot="10800000">
+            <a:off x="6252670" y="3932557"/>
+            <a:ext cx="1406635" cy="562983"/>
+          </a:xfrm>
+          <a:prstGeom prst="bentConnector3">
+            <a:avLst>
+              <a:gd name="adj1" fmla="val 50000"/>
+            </a:avLst>
+          </a:prstGeom>
+          <a:ln>
+            <a:tailEnd type="triangle"/>
+          </a:ln>
+        </p:spPr>
+        <p:style>
+          <a:lnRef idx="1">
+            <a:schemeClr val="dk1"/>
+          </a:lnRef>
+          <a:fillRef idx="0">
+            <a:schemeClr val="dk1"/>
+          </a:fillRef>
+          <a:effectRef idx="0">
+            <a:schemeClr val="dk1"/>
+          </a:effectRef>
+          <a:fontRef idx="minor">
+            <a:schemeClr val="tx1"/>
+          </a:fontRef>
+        </p:style>
+      </p:cxnSp>
+      <p:cxnSp>
+        <p:nvCxnSpPr>
+          <p:cNvPr id="40" name="Straight Arrow Connector 39">
+            <a:extLst>
+              <a:ext uri="{FF2B5EF4-FFF2-40B4-BE49-F238E27FC236}">
+                <a16:creationId xmlns:a16="http://schemas.microsoft.com/office/drawing/2014/main" id="{FE1F2DB8-D1AF-F32D-CD96-7D8E2BF068A4}"/>
+              </a:ext>
+            </a:extLst>
+          </p:cNvPr>
+          <p:cNvCxnSpPr/>
+          <p:nvPr/>
+        </p:nvCxnSpPr>
+        <p:spPr>
+          <a:xfrm flipH="1" flipV="1">
+            <a:off x="2898512" y="3855763"/>
+            <a:ext cx="1495421" cy="2726"/>
+          </a:xfrm>
+          <a:prstGeom prst="straightConnector1">
+            <a:avLst/>
+          </a:prstGeom>
+          <a:ln>
+            <a:tailEnd type="triangle"/>
+          </a:ln>
+        </p:spPr>
+        <p:style>
+          <a:lnRef idx="1">
+            <a:schemeClr val="dk1"/>
+          </a:lnRef>
+          <a:fillRef idx="0">
+            <a:schemeClr val="dk1"/>
+          </a:fillRef>
+          <a:effectRef idx="0">
+            <a:schemeClr val="dk1"/>
+          </a:effectRef>
+          <a:fontRef idx="minor">
+            <a:schemeClr val="tx1"/>
+          </a:fontRef>
+        </p:style>
+      </p:cxnSp>
+      <p:sp>
+        <p:nvSpPr>
+          <p:cNvPr id="42" name="TextBox 41">
+            <a:extLst>
+              <a:ext uri="{FF2B5EF4-FFF2-40B4-BE49-F238E27FC236}">
+                <a16:creationId xmlns:a16="http://schemas.microsoft.com/office/drawing/2014/main" id="{42B4BB6D-4471-5C29-037E-B82CA4B18E20}"/>
+              </a:ext>
+            </a:extLst>
+          </p:cNvPr>
+          <p:cNvSpPr txBox="1"/>
+          <p:nvPr/>
+        </p:nvSpPr>
+        <p:spPr>
+          <a:xfrm>
+            <a:off x="1048442" y="1661799"/>
+            <a:ext cx="1352802" cy="261610"/>
+          </a:xfrm>
+          <a:prstGeom prst="rect">
+            <a:avLst/>
+          </a:prstGeom>
+          <a:noFill/>
+        </p:spPr>
+        <p:txBody>
+          <a:bodyPr wrap="square" rtlCol="0">
+            <a:spAutoFit/>
+          </a:bodyPr>
+          <a:lstStyle/>
+          <a:p>
+            <a:r>
+              <a:rPr lang="en-US" sz="1100" b="1" dirty="0">
+                <a:solidFill>
+                  <a:schemeClr val="tx2">
+                    <a:lumMod val="75000"/>
+                    <a:lumOff val="25000"/>
+                  </a:schemeClr>
+                </a:solidFill>
+              </a:rPr>
+              <a:t>2048bits-RSA-key</a:t>
+            </a:r>
+            <a:endParaRPr lang="en-SG" sz="1100" b="1" dirty="0">
+              <a:solidFill>
+                <a:schemeClr val="tx2">
+                  <a:lumMod val="75000"/>
+                  <a:lumOff val="25000"/>
+                </a:schemeClr>
+              </a:solidFill>
+            </a:endParaRPr>
+          </a:p>
+        </p:txBody>
+      </p:sp>
+      <p:pic>
+        <p:nvPicPr>
+          <p:cNvPr id="44" name="Picture 43">
+            <a:extLst>
+              <a:ext uri="{FF2B5EF4-FFF2-40B4-BE49-F238E27FC236}">
+                <a16:creationId xmlns:a16="http://schemas.microsoft.com/office/drawing/2014/main" id="{094B5D37-7310-1F85-A8BC-D47496F14B44}"/>
+              </a:ext>
+            </a:extLst>
+          </p:cNvPr>
+          <p:cNvPicPr>
+            <a:picLocks noChangeAspect="1"/>
+          </p:cNvPicPr>
+          <p:nvPr/>
+        </p:nvPicPr>
+        <p:blipFill>
+          <a:blip r:embed="rId2" cstate="print">
+            <a:extLst>
+              <a:ext uri="{28A0092B-C50C-407E-A947-70E740481C1C}">
+                <a14:useLocalDpi xmlns:a14="http://schemas.microsoft.com/office/drawing/2010/main" val="0"/>
+              </a:ext>
+            </a:extLst>
+          </a:blip>
+          <a:stretch>
+            <a:fillRect/>
+          </a:stretch>
+        </p:blipFill>
+        <p:spPr>
+          <a:xfrm>
+            <a:off x="1205550" y="1909787"/>
+            <a:ext cx="364236" cy="364236"/>
+          </a:xfrm>
+          <a:prstGeom prst="rect">
+            <a:avLst/>
+          </a:prstGeom>
+        </p:spPr>
+      </p:pic>
+      <p:sp>
+        <p:nvSpPr>
+          <p:cNvPr id="45" name="TextBox 44">
+            <a:extLst>
+              <a:ext uri="{FF2B5EF4-FFF2-40B4-BE49-F238E27FC236}">
+                <a16:creationId xmlns:a16="http://schemas.microsoft.com/office/drawing/2014/main" id="{C9F60632-C98E-D1D0-1BE1-A45BB43849CE}"/>
+              </a:ext>
+            </a:extLst>
+          </p:cNvPr>
+          <p:cNvSpPr txBox="1"/>
+          <p:nvPr/>
+        </p:nvSpPr>
+        <p:spPr>
+          <a:xfrm>
+            <a:off x="1491952" y="1909787"/>
+            <a:ext cx="1455155" cy="261610"/>
+          </a:xfrm>
+          <a:prstGeom prst="rect">
+            <a:avLst/>
+          </a:prstGeom>
+          <a:noFill/>
+        </p:spPr>
+        <p:txBody>
+          <a:bodyPr wrap="square" rtlCol="0">
+            <a:spAutoFit/>
+          </a:bodyPr>
+          <a:lstStyle/>
+          <a:p>
+            <a:r>
+              <a:rPr lang="en-US" sz="1100" b="1" dirty="0">
+                <a:solidFill>
+                  <a:schemeClr val="tx2">
+                    <a:lumMod val="75000"/>
+                    <a:lumOff val="25000"/>
+                  </a:schemeClr>
+                </a:solidFill>
+              </a:rPr>
+              <a:t>256bits-Random#1</a:t>
+            </a:r>
+            <a:endParaRPr lang="en-SG" sz="1100" b="1" dirty="0">
+              <a:solidFill>
+                <a:schemeClr val="tx2">
+                  <a:lumMod val="75000"/>
+                  <a:lumOff val="25000"/>
+                </a:schemeClr>
+              </a:solidFill>
+            </a:endParaRPr>
+          </a:p>
+        </p:txBody>
+      </p:sp>
+      <p:sp>
+        <p:nvSpPr>
+          <p:cNvPr id="46" name="Rectangle 45">
+            <a:extLst>
+              <a:ext uri="{FF2B5EF4-FFF2-40B4-BE49-F238E27FC236}">
+                <a16:creationId xmlns:a16="http://schemas.microsoft.com/office/drawing/2014/main" id="{40027BEC-2249-74F2-D52A-3F62B8B1047A}"/>
+              </a:ext>
+            </a:extLst>
+          </p:cNvPr>
+          <p:cNvSpPr/>
+          <p:nvPr/>
+        </p:nvSpPr>
+        <p:spPr>
+          <a:xfrm>
+            <a:off x="1619755" y="2171397"/>
+            <a:ext cx="1065100" cy="241853"/>
+          </a:xfrm>
+          <a:prstGeom prst="rect">
+            <a:avLst/>
+          </a:prstGeom>
+          <a:ln w="19050">
+            <a:solidFill>
+              <a:schemeClr val="tx1"/>
+            </a:solidFill>
+          </a:ln>
+        </p:spPr>
+        <p:style>
+          <a:lnRef idx="2">
+            <a:schemeClr val="dk1"/>
+          </a:lnRef>
+          <a:fillRef idx="1">
+            <a:schemeClr val="lt1"/>
+          </a:fillRef>
+          <a:effectRef idx="0">
+            <a:schemeClr val="dk1"/>
+          </a:effectRef>
+          <a:fontRef idx="minor">
+            <a:schemeClr val="dk1"/>
+          </a:fontRef>
+        </p:style>
+        <p:txBody>
+          <a:bodyPr rtlCol="0" anchor="ctr"/>
+          <a:lstStyle/>
+          <a:p>
+            <a:pPr algn="ctr"/>
+            <a:r>
+              <a:rPr lang="en-US" sz="1100" b="1" dirty="0">
+                <a:solidFill>
+                  <a:schemeClr val="accent1"/>
+                </a:solidFill>
+              </a:rPr>
+              <a:t>Verify result</a:t>
+            </a:r>
+            <a:endParaRPr lang="en-SG" sz="1100" b="1" dirty="0">
+              <a:solidFill>
+                <a:schemeClr val="accent1"/>
+              </a:solidFill>
+            </a:endParaRPr>
+          </a:p>
+        </p:txBody>
+      </p:sp>
+      <p:sp>
+        <p:nvSpPr>
+          <p:cNvPr id="48" name="Rectangle 47">
+            <a:extLst>
+              <a:ext uri="{FF2B5EF4-FFF2-40B4-BE49-F238E27FC236}">
+                <a16:creationId xmlns:a16="http://schemas.microsoft.com/office/drawing/2014/main" id="{99CD979C-DE6C-4985-2567-DAC95E05B2CF}"/>
+              </a:ext>
+            </a:extLst>
+          </p:cNvPr>
+          <p:cNvSpPr/>
+          <p:nvPr/>
+        </p:nvSpPr>
+        <p:spPr>
+          <a:xfrm>
+            <a:off x="1901078" y="2518274"/>
+            <a:ext cx="1065100" cy="241853"/>
+          </a:xfrm>
+          <a:prstGeom prst="rect">
+            <a:avLst/>
+          </a:prstGeom>
+          <a:ln w="19050">
+            <a:solidFill>
+              <a:schemeClr val="tx1"/>
+            </a:solidFill>
+          </a:ln>
+        </p:spPr>
+        <p:style>
+          <a:lnRef idx="2">
+            <a:schemeClr val="dk1"/>
+          </a:lnRef>
+          <a:fillRef idx="1">
+            <a:schemeClr val="lt1"/>
+          </a:fillRef>
+          <a:effectRef idx="0">
+            <a:schemeClr val="dk1"/>
+          </a:effectRef>
+          <a:fontRef idx="minor">
+            <a:schemeClr val="dk1"/>
+          </a:fontRef>
+        </p:style>
+        <p:txBody>
+          <a:bodyPr rtlCol="0" anchor="ctr"/>
+          <a:lstStyle/>
+          <a:p>
+            <a:pPr algn="ctr"/>
+            <a:r>
+              <a:rPr lang="en-US" sz="1100" b="1" dirty="0">
+                <a:solidFill>
+                  <a:schemeClr val="accent1"/>
+                </a:solidFill>
+              </a:rPr>
+              <a:t>Firmware info</a:t>
+            </a:r>
+            <a:endParaRPr lang="en-SG" sz="1100" b="1" dirty="0">
+              <a:solidFill>
+                <a:schemeClr val="accent1"/>
+              </a:solidFill>
+            </a:endParaRPr>
+          </a:p>
+        </p:txBody>
+      </p:sp>
+      <p:cxnSp>
+        <p:nvCxnSpPr>
+          <p:cNvPr id="49" name="Elbow Connector 39">
+            <a:extLst>
+              <a:ext uri="{FF2B5EF4-FFF2-40B4-BE49-F238E27FC236}">
+                <a16:creationId xmlns:a16="http://schemas.microsoft.com/office/drawing/2014/main" id="{800E5B1D-7896-41F1-82DF-2B5C306BD55C}"/>
+              </a:ext>
+            </a:extLst>
+          </p:cNvPr>
+          <p:cNvCxnSpPr>
+            <a:cxnSpLocks/>
+            <a:stCxn id="16" idx="2"/>
+            <a:endCxn id="15" idx="1"/>
+          </p:cNvCxnSpPr>
+          <p:nvPr/>
+        </p:nvCxnSpPr>
+        <p:spPr>
+          <a:xfrm rot="16200000" flipH="1">
+            <a:off x="487340" y="2472937"/>
+            <a:ext cx="1138807" cy="184496"/>
+          </a:xfrm>
+          <a:prstGeom prst="bentConnector2">
+            <a:avLst/>
+          </a:prstGeom>
+          <a:ln>
+            <a:tailEnd type="triangle"/>
+          </a:ln>
+        </p:spPr>
+        <p:style>
+          <a:lnRef idx="1">
+            <a:schemeClr val="dk1"/>
+          </a:lnRef>
+          <a:fillRef idx="0">
+            <a:schemeClr val="dk1"/>
+          </a:fillRef>
+          <a:effectRef idx="0">
+            <a:schemeClr val="dk1"/>
+          </a:effectRef>
+          <a:fontRef idx="minor">
+            <a:schemeClr val="tx1"/>
+          </a:fontRef>
+        </p:style>
+      </p:cxnSp>
+      <p:cxnSp>
+        <p:nvCxnSpPr>
+          <p:cNvPr id="52" name="Straight Arrow Connector 51">
+            <a:extLst>
+              <a:ext uri="{FF2B5EF4-FFF2-40B4-BE49-F238E27FC236}">
+                <a16:creationId xmlns:a16="http://schemas.microsoft.com/office/drawing/2014/main" id="{6F524870-1388-5853-A6AD-4AD5F0600490}"/>
+              </a:ext>
+            </a:extLst>
+          </p:cNvPr>
+          <p:cNvCxnSpPr>
+            <a:cxnSpLocks/>
+          </p:cNvCxnSpPr>
+          <p:nvPr/>
+        </p:nvCxnSpPr>
+        <p:spPr>
+          <a:xfrm>
+            <a:off x="1377534" y="2267668"/>
+            <a:ext cx="0" cy="638433"/>
+          </a:xfrm>
+          <a:prstGeom prst="straightConnector1">
+            <a:avLst/>
+          </a:prstGeom>
+          <a:ln>
+            <a:tailEnd type="triangle"/>
+          </a:ln>
+        </p:spPr>
+        <p:style>
+          <a:lnRef idx="1">
+            <a:schemeClr val="dk1"/>
+          </a:lnRef>
+          <a:fillRef idx="0">
+            <a:schemeClr val="dk1"/>
+          </a:fillRef>
+          <a:effectRef idx="0">
+            <a:schemeClr val="dk1"/>
+          </a:effectRef>
+          <a:fontRef idx="minor">
+            <a:schemeClr val="tx1"/>
+          </a:fontRef>
+        </p:style>
+      </p:cxnSp>
+      <p:cxnSp>
+        <p:nvCxnSpPr>
+          <p:cNvPr id="55" name="Straight Arrow Connector 54">
+            <a:extLst>
+              <a:ext uri="{FF2B5EF4-FFF2-40B4-BE49-F238E27FC236}">
+                <a16:creationId xmlns:a16="http://schemas.microsoft.com/office/drawing/2014/main" id="{A6FCA210-4567-DC26-6576-66B4F001CCDA}"/>
+              </a:ext>
+            </a:extLst>
+          </p:cNvPr>
+          <p:cNvCxnSpPr>
+            <a:cxnSpLocks/>
+          </p:cNvCxnSpPr>
+          <p:nvPr/>
+        </p:nvCxnSpPr>
+        <p:spPr>
+          <a:xfrm>
+            <a:off x="1712814" y="2424680"/>
+            <a:ext cx="0" cy="492851"/>
+          </a:xfrm>
+          <a:prstGeom prst="straightConnector1">
+            <a:avLst/>
+          </a:prstGeom>
+          <a:ln>
+            <a:tailEnd type="triangle"/>
+          </a:ln>
+        </p:spPr>
+        <p:style>
+          <a:lnRef idx="1">
+            <a:schemeClr val="dk1"/>
+          </a:lnRef>
+          <a:fillRef idx="0">
+            <a:schemeClr val="dk1"/>
+          </a:fillRef>
+          <a:effectRef idx="0">
+            <a:schemeClr val="dk1"/>
+          </a:effectRef>
+          <a:fontRef idx="minor">
+            <a:schemeClr val="tx1"/>
+          </a:fontRef>
+        </p:style>
+      </p:cxnSp>
+      <p:cxnSp>
+        <p:nvCxnSpPr>
+          <p:cNvPr id="58" name="Straight Arrow Connector 57">
+            <a:extLst>
+              <a:ext uri="{FF2B5EF4-FFF2-40B4-BE49-F238E27FC236}">
+                <a16:creationId xmlns:a16="http://schemas.microsoft.com/office/drawing/2014/main" id="{E94988DA-97A7-7F1C-63F9-D4CF4C73A0D0}"/>
+              </a:ext>
+            </a:extLst>
+          </p:cNvPr>
+          <p:cNvCxnSpPr>
+            <a:cxnSpLocks/>
+          </p:cNvCxnSpPr>
+          <p:nvPr/>
+        </p:nvCxnSpPr>
+        <p:spPr>
+          <a:xfrm>
+            <a:off x="2284314" y="2756914"/>
+            <a:ext cx="0" cy="189394"/>
+          </a:xfrm>
+          <a:prstGeom prst="straightConnector1">
+            <a:avLst/>
+          </a:prstGeom>
+          <a:ln>
+            <a:tailEnd type="triangle"/>
+          </a:ln>
+        </p:spPr>
+        <p:style>
+          <a:lnRef idx="1">
+            <a:schemeClr val="dk1"/>
+          </a:lnRef>
+          <a:fillRef idx="0">
+            <a:schemeClr val="dk1"/>
+          </a:fillRef>
+          <a:effectRef idx="0">
+            <a:schemeClr val="dk1"/>
+          </a:effectRef>
+          <a:fontRef idx="minor">
+            <a:schemeClr val="tx1"/>
+          </a:fontRef>
+        </p:style>
+      </p:cxnSp>
+      <p:sp>
+        <p:nvSpPr>
+          <p:cNvPr id="62" name="TextBox 61">
+            <a:extLst>
+              <a:ext uri="{FF2B5EF4-FFF2-40B4-BE49-F238E27FC236}">
+                <a16:creationId xmlns:a16="http://schemas.microsoft.com/office/drawing/2014/main" id="{E5D3DF09-15E2-D353-54E8-C91EE691E2B0}"/>
+              </a:ext>
+            </a:extLst>
+          </p:cNvPr>
+          <p:cNvSpPr txBox="1"/>
+          <p:nvPr/>
+        </p:nvSpPr>
+        <p:spPr>
+          <a:xfrm>
+            <a:off x="2984221" y="2748418"/>
+            <a:ext cx="1352802" cy="430887"/>
+          </a:xfrm>
+          <a:prstGeom prst="rect">
+            <a:avLst/>
+          </a:prstGeom>
+          <a:noFill/>
+        </p:spPr>
+        <p:txBody>
+          <a:bodyPr wrap="square" rtlCol="0">
+            <a:spAutoFit/>
+          </a:bodyPr>
+          <a:lstStyle/>
+          <a:p>
+            <a:r>
+              <a:rPr lang="en-US" sz="1100" b="1" dirty="0">
+                <a:solidFill>
+                  <a:schemeClr val="tx2">
+                    <a:lumMod val="75000"/>
+                    <a:lumOff val="25000"/>
+                  </a:schemeClr>
+                </a:solidFill>
+              </a:rPr>
+              <a:t>RSA encrypted verification data</a:t>
+            </a:r>
+            <a:endParaRPr lang="en-SG" sz="1100" b="1" dirty="0">
+              <a:solidFill>
+                <a:schemeClr val="tx2">
+                  <a:lumMod val="75000"/>
+                  <a:lumOff val="25000"/>
+                </a:schemeClr>
+              </a:solidFill>
+            </a:endParaRPr>
+          </a:p>
+        </p:txBody>
+      </p:sp>
+      <p:cxnSp>
+        <p:nvCxnSpPr>
+          <p:cNvPr id="63" name="Elbow Connector 39">
+            <a:extLst>
+              <a:ext uri="{FF2B5EF4-FFF2-40B4-BE49-F238E27FC236}">
+                <a16:creationId xmlns:a16="http://schemas.microsoft.com/office/drawing/2014/main" id="{02A2F74F-7DF7-B5BC-A1EA-1B72B2C4E48D}"/>
+              </a:ext>
+            </a:extLst>
+          </p:cNvPr>
+          <p:cNvCxnSpPr>
+            <a:cxnSpLocks/>
+            <a:stCxn id="22" idx="3"/>
+            <a:endCxn id="24" idx="1"/>
+          </p:cNvCxnSpPr>
+          <p:nvPr/>
+        </p:nvCxnSpPr>
+        <p:spPr>
+          <a:xfrm flipV="1">
+            <a:off x="6235425" y="2762829"/>
+            <a:ext cx="1833011" cy="383848"/>
+          </a:xfrm>
+          <a:prstGeom prst="bentConnector3">
+            <a:avLst>
+              <a:gd name="adj1" fmla="val 50000"/>
+            </a:avLst>
+          </a:prstGeom>
+          <a:ln>
+            <a:tailEnd type="triangle"/>
+          </a:ln>
+        </p:spPr>
+        <p:style>
+          <a:lnRef idx="1">
+            <a:schemeClr val="dk1"/>
+          </a:lnRef>
+          <a:fillRef idx="0">
+            <a:schemeClr val="dk1"/>
+          </a:fillRef>
+          <a:effectRef idx="0">
+            <a:schemeClr val="dk1"/>
+          </a:effectRef>
+          <a:fontRef idx="minor">
+            <a:schemeClr val="tx1"/>
+          </a:fontRef>
+        </p:style>
+      </p:cxnSp>
+      <p:sp>
+        <p:nvSpPr>
+          <p:cNvPr id="66" name="TextBox 65">
+            <a:extLst>
+              <a:ext uri="{FF2B5EF4-FFF2-40B4-BE49-F238E27FC236}">
+                <a16:creationId xmlns:a16="http://schemas.microsoft.com/office/drawing/2014/main" id="{2C642DF2-62F5-95B5-0159-5B409C8670FE}"/>
+              </a:ext>
+            </a:extLst>
+          </p:cNvPr>
+          <p:cNvSpPr txBox="1"/>
+          <p:nvPr/>
+        </p:nvSpPr>
+        <p:spPr>
+          <a:xfrm>
+            <a:off x="9304847" y="2876878"/>
+            <a:ext cx="1352802" cy="261610"/>
+          </a:xfrm>
+          <a:prstGeom prst="rect">
+            <a:avLst/>
+          </a:prstGeom>
+          <a:noFill/>
+        </p:spPr>
+        <p:txBody>
+          <a:bodyPr wrap="square" rtlCol="0">
+            <a:spAutoFit/>
+          </a:bodyPr>
+          <a:lstStyle/>
+          <a:p>
+            <a:r>
+              <a:rPr lang="en-US" sz="1100" b="1" dirty="0">
+                <a:solidFill>
+                  <a:schemeClr val="tx2">
+                    <a:lumMod val="75000"/>
+                    <a:lumOff val="25000"/>
+                  </a:schemeClr>
+                </a:solidFill>
+              </a:rPr>
+              <a:t>2048bits-RSA-key</a:t>
+            </a:r>
+            <a:endParaRPr lang="en-SG" sz="1100" b="1" dirty="0">
+              <a:solidFill>
+                <a:schemeClr val="tx2">
+                  <a:lumMod val="75000"/>
+                  <a:lumOff val="25000"/>
+                </a:schemeClr>
+              </a:solidFill>
+            </a:endParaRPr>
+          </a:p>
+        </p:txBody>
+      </p:sp>
+      <p:sp>
+        <p:nvSpPr>
+          <p:cNvPr id="69" name="TextBox 68">
+            <a:extLst>
+              <a:ext uri="{FF2B5EF4-FFF2-40B4-BE49-F238E27FC236}">
+                <a16:creationId xmlns:a16="http://schemas.microsoft.com/office/drawing/2014/main" id="{362F9E1E-1D3E-9F21-4AC7-F93D8CB6CEA6}"/>
+              </a:ext>
+            </a:extLst>
+          </p:cNvPr>
+          <p:cNvSpPr txBox="1"/>
+          <p:nvPr/>
+        </p:nvSpPr>
+        <p:spPr>
+          <a:xfrm>
+            <a:off x="6640663" y="3754547"/>
+            <a:ext cx="1305762" cy="769441"/>
+          </a:xfrm>
+          <a:prstGeom prst="rect">
+            <a:avLst/>
+          </a:prstGeom>
+          <a:noFill/>
+        </p:spPr>
+        <p:txBody>
+          <a:bodyPr wrap="square" rtlCol="0">
+            <a:spAutoFit/>
+          </a:bodyPr>
+          <a:lstStyle/>
+          <a:p>
+            <a:r>
+              <a:rPr lang="en-US" sz="1100" b="1" dirty="0">
+                <a:solidFill>
+                  <a:schemeClr val="tx2">
+                    <a:lumMod val="75000"/>
+                    <a:lumOff val="25000"/>
+                  </a:schemeClr>
+                </a:solidFill>
+              </a:rPr>
+              <a:t>RSA encrypted firmware attestation request </a:t>
+            </a:r>
+            <a:endParaRPr lang="en-SG" sz="1100" b="1" dirty="0">
+              <a:solidFill>
+                <a:schemeClr val="tx2">
+                  <a:lumMod val="75000"/>
+                  <a:lumOff val="25000"/>
+                </a:schemeClr>
+              </a:solidFill>
+            </a:endParaRPr>
+          </a:p>
+        </p:txBody>
+      </p:sp>
+      <p:sp>
+        <p:nvSpPr>
+          <p:cNvPr id="71" name="TextBox 70">
+            <a:extLst>
+              <a:ext uri="{FF2B5EF4-FFF2-40B4-BE49-F238E27FC236}">
+                <a16:creationId xmlns:a16="http://schemas.microsoft.com/office/drawing/2014/main" id="{7E9EDA90-1008-C766-AB5C-4818FAA93414}"/>
+              </a:ext>
+            </a:extLst>
+          </p:cNvPr>
+          <p:cNvSpPr txBox="1"/>
+          <p:nvPr/>
+        </p:nvSpPr>
+        <p:spPr>
+          <a:xfrm>
+            <a:off x="4570288" y="2695953"/>
+            <a:ext cx="1906004" cy="261610"/>
+          </a:xfrm>
+          <a:prstGeom prst="rect">
+            <a:avLst/>
+          </a:prstGeom>
+          <a:noFill/>
+        </p:spPr>
+        <p:txBody>
+          <a:bodyPr wrap="square" rtlCol="0">
+            <a:spAutoFit/>
+          </a:bodyPr>
+          <a:lstStyle/>
+          <a:p>
+            <a:r>
+              <a:rPr lang="en-US" sz="1100" b="1" dirty="0">
+                <a:solidFill>
+                  <a:schemeClr val="tx2">
+                    <a:lumMod val="75000"/>
+                    <a:lumOff val="25000"/>
+                  </a:schemeClr>
+                </a:solidFill>
+              </a:rPr>
+              <a:t>Forward message to server </a:t>
+            </a:r>
+            <a:endParaRPr lang="en-SG" sz="1100" b="1" dirty="0">
+              <a:solidFill>
+                <a:schemeClr val="tx2">
+                  <a:lumMod val="75000"/>
+                  <a:lumOff val="25000"/>
+                </a:schemeClr>
+              </a:solidFill>
+            </a:endParaRPr>
+          </a:p>
+        </p:txBody>
+      </p:sp>
+      <p:sp>
+        <p:nvSpPr>
+          <p:cNvPr id="72" name="Rectangle 71">
+            <a:extLst>
+              <a:ext uri="{FF2B5EF4-FFF2-40B4-BE49-F238E27FC236}">
+                <a16:creationId xmlns:a16="http://schemas.microsoft.com/office/drawing/2014/main" id="{10ECA9DE-DE9E-3811-21C4-A9C442D27663}"/>
+              </a:ext>
+            </a:extLst>
+          </p:cNvPr>
+          <p:cNvSpPr/>
+          <p:nvPr/>
+        </p:nvSpPr>
+        <p:spPr>
+          <a:xfrm>
+            <a:off x="4414361" y="3749741"/>
+            <a:ext cx="1838308" cy="365629"/>
+          </a:xfrm>
+          <a:prstGeom prst="rect">
+            <a:avLst/>
+          </a:prstGeom>
+          <a:ln w="19050"/>
+        </p:spPr>
+        <p:style>
+          <a:lnRef idx="2">
+            <a:schemeClr val="dk1"/>
+          </a:lnRef>
+          <a:fillRef idx="1">
+            <a:schemeClr val="lt1"/>
+          </a:fillRef>
+          <a:effectRef idx="0">
+            <a:schemeClr val="dk1"/>
+          </a:effectRef>
+          <a:fontRef idx="minor">
+            <a:schemeClr val="dk1"/>
+          </a:fontRef>
+        </p:style>
+        <p:txBody>
+          <a:bodyPr rtlCol="0" anchor="ctr"/>
+          <a:lstStyle/>
+          <a:p>
+            <a:r>
+              <a:rPr lang="en-US" sz="1100" dirty="0"/>
+              <a:t>Communication module</a:t>
+            </a:r>
+            <a:endParaRPr lang="en-SG" sz="1100" dirty="0"/>
+          </a:p>
+        </p:txBody>
+      </p:sp>
+      <p:sp>
+        <p:nvSpPr>
+          <p:cNvPr id="75" name="TextBox 74">
+            <a:extLst>
+              <a:ext uri="{FF2B5EF4-FFF2-40B4-BE49-F238E27FC236}">
+                <a16:creationId xmlns:a16="http://schemas.microsoft.com/office/drawing/2014/main" id="{A61EBD84-887E-512F-7672-54863240F3D1}"/>
+              </a:ext>
+            </a:extLst>
+          </p:cNvPr>
+          <p:cNvSpPr txBox="1"/>
+          <p:nvPr/>
+        </p:nvSpPr>
+        <p:spPr>
+          <a:xfrm>
+            <a:off x="3870805" y="3533058"/>
+            <a:ext cx="1906004" cy="261610"/>
+          </a:xfrm>
+          <a:prstGeom prst="rect">
+            <a:avLst/>
+          </a:prstGeom>
+          <a:noFill/>
+        </p:spPr>
+        <p:txBody>
+          <a:bodyPr wrap="square" rtlCol="0">
+            <a:spAutoFit/>
+          </a:bodyPr>
+          <a:lstStyle/>
+          <a:p>
+            <a:r>
+              <a:rPr lang="en-US" sz="1100" b="1" dirty="0">
+                <a:solidFill>
+                  <a:schemeClr val="tx2">
+                    <a:lumMod val="75000"/>
+                    <a:lumOff val="25000"/>
+                  </a:schemeClr>
+                </a:solidFill>
+              </a:rPr>
+              <a:t>Forward message to TEE</a:t>
+            </a:r>
+            <a:endParaRPr lang="en-SG" sz="1100" b="1" dirty="0">
+              <a:solidFill>
+                <a:schemeClr val="tx2">
+                  <a:lumMod val="75000"/>
+                  <a:lumOff val="25000"/>
+                </a:schemeClr>
+              </a:solidFill>
+            </a:endParaRPr>
+          </a:p>
+        </p:txBody>
+      </p:sp>
+      <p:cxnSp>
+        <p:nvCxnSpPr>
+          <p:cNvPr id="78" name="Elbow Connector 39">
+            <a:extLst>
+              <a:ext uri="{FF2B5EF4-FFF2-40B4-BE49-F238E27FC236}">
+                <a16:creationId xmlns:a16="http://schemas.microsoft.com/office/drawing/2014/main" id="{35E32DD1-9474-CF63-BA30-EFA9F3E30F98}"/>
+              </a:ext>
+            </a:extLst>
+          </p:cNvPr>
+          <p:cNvCxnSpPr>
+            <a:cxnSpLocks/>
+            <a:endCxn id="33" idx="1"/>
+          </p:cNvCxnSpPr>
+          <p:nvPr/>
+        </p:nvCxnSpPr>
+        <p:spPr>
+          <a:xfrm rot="16200000" flipH="1">
+            <a:off x="257575" y="2740365"/>
+            <a:ext cx="1816532" cy="416990"/>
+          </a:xfrm>
+          <a:prstGeom prst="bentConnector2">
+            <a:avLst/>
+          </a:prstGeom>
+          <a:ln>
+            <a:tailEnd type="triangle"/>
+          </a:ln>
+        </p:spPr>
+        <p:style>
+          <a:lnRef idx="1">
+            <a:schemeClr val="dk1"/>
+          </a:lnRef>
+          <a:fillRef idx="0">
+            <a:schemeClr val="dk1"/>
+          </a:fillRef>
+          <a:effectRef idx="0">
+            <a:schemeClr val="dk1"/>
+          </a:effectRef>
+          <a:fontRef idx="minor">
+            <a:schemeClr val="tx1"/>
+          </a:fontRef>
+        </p:style>
+      </p:cxnSp>
+      <p:sp>
+        <p:nvSpPr>
+          <p:cNvPr id="81" name="Rectangle 80">
+            <a:extLst>
+              <a:ext uri="{FF2B5EF4-FFF2-40B4-BE49-F238E27FC236}">
+                <a16:creationId xmlns:a16="http://schemas.microsoft.com/office/drawing/2014/main" id="{FDABD95E-4EC0-830B-2653-5784D22BCB8A}"/>
+              </a:ext>
+            </a:extLst>
+          </p:cNvPr>
+          <p:cNvSpPr/>
+          <p:nvPr/>
+        </p:nvSpPr>
+        <p:spPr>
+          <a:xfrm>
+            <a:off x="862323" y="4218250"/>
+            <a:ext cx="1538919" cy="419072"/>
+          </a:xfrm>
+          <a:prstGeom prst="rect">
+            <a:avLst/>
+          </a:prstGeom>
+          <a:ln w="19050"/>
+        </p:spPr>
+        <p:style>
+          <a:lnRef idx="2">
+            <a:schemeClr val="dk1"/>
+          </a:lnRef>
+          <a:fillRef idx="1">
+            <a:schemeClr val="lt1"/>
+          </a:fillRef>
+          <a:effectRef idx="0">
+            <a:schemeClr val="dk1"/>
+          </a:effectRef>
+          <a:fontRef idx="minor">
+            <a:schemeClr val="dk1"/>
+          </a:fontRef>
+        </p:style>
+        <p:txBody>
+          <a:bodyPr rtlCol="0" anchor="ctr"/>
+          <a:lstStyle/>
+          <a:p>
+            <a:r>
+              <a:rPr lang="en-US" sz="1100" dirty="0"/>
+              <a:t>Verify server response </a:t>
+            </a:r>
+            <a:r>
+              <a:rPr lang="en-US" sz="1100" b="1" dirty="0">
+                <a:solidFill>
+                  <a:schemeClr val="accent1"/>
+                </a:solidFill>
+              </a:rPr>
+              <a:t>Random#1 </a:t>
+            </a:r>
+            <a:r>
+              <a:rPr lang="en-US" sz="1100" dirty="0"/>
+              <a:t>correct </a:t>
+            </a:r>
+            <a:endParaRPr lang="en-SG" sz="1100" dirty="0"/>
+          </a:p>
+        </p:txBody>
+      </p:sp>
+    </p:spTree>
+    <p:extLst>
+      <p:ext uri="{BB962C8B-B14F-4D97-AF65-F5344CB8AC3E}">
+        <p14:creationId xmlns:p14="http://schemas.microsoft.com/office/powerpoint/2010/main" val="3041794836"/>
+      </p:ext>
+    </p:extLst>
+  </p:cSld>
+  <p:clrMapOvr>
+    <a:masterClrMapping/>
+  </p:clrMapOvr>
+</p:sld>
+</file>
+
+<file path=ppt/slides/slide5.xml><?xml version="1.0" encoding="utf-8"?>
+<p:sld xmlns:a="http://schemas.openxmlformats.org/drawingml/2006/main" xmlns:r="http://schemas.openxmlformats.org/officeDocument/2006/relationships" xmlns:p="http://schemas.openxmlformats.org/presentationml/2006/main">
+  <p:cSld>
+    <p:spTree>
+      <p:nvGrpSpPr>
+        <p:cNvPr id="1" name=""/>
+        <p:cNvGrpSpPr/>
+        <p:nvPr/>
+      </p:nvGrpSpPr>
+      <p:grpSpPr>
+        <a:xfrm>
+          <a:off x="0" y="0"/>
+          <a:ext cx="0" cy="0"/>
+          <a:chOff x="0" y="0"/>
+          <a:chExt cx="0" cy="0"/>
+        </a:xfrm>
+      </p:grpSpPr>
+      <p:sp>
+        <p:nvSpPr>
+          <p:cNvPr id="4" name="Rectangle 3">
+            <a:extLst>
+              <a:ext uri="{FF2B5EF4-FFF2-40B4-BE49-F238E27FC236}">
+                <a16:creationId xmlns:a16="http://schemas.microsoft.com/office/drawing/2014/main" id="{7D1E82D9-E891-DDFB-EB5F-E626AC953221}"/>
+              </a:ext>
+            </a:extLst>
+          </p:cNvPr>
+          <p:cNvSpPr/>
+          <p:nvPr/>
+        </p:nvSpPr>
+        <p:spPr>
+          <a:xfrm>
+            <a:off x="3941065" y="935095"/>
+            <a:ext cx="399443" cy="2961796"/>
+          </a:xfrm>
+          <a:prstGeom prst="rect">
+            <a:avLst/>
+          </a:prstGeom>
+          <a:ln>
+            <a:solidFill>
+              <a:schemeClr val="bg1">
+                <a:lumMod val="65000"/>
+              </a:schemeClr>
+            </a:solidFill>
+            <a:prstDash val="dash"/>
+          </a:ln>
+        </p:spPr>
+        <p:style>
+          <a:lnRef idx="2">
+            <a:schemeClr val="dk1"/>
+          </a:lnRef>
+          <a:fillRef idx="1">
+            <a:schemeClr val="lt1"/>
+          </a:fillRef>
+          <a:effectRef idx="0">
+            <a:schemeClr val="dk1"/>
+          </a:effectRef>
+          <a:fontRef idx="minor">
+            <a:schemeClr val="dk1"/>
+          </a:fontRef>
+        </p:style>
+        <p:txBody>
+          <a:bodyPr rtlCol="0" anchor="ctr"/>
+          <a:lstStyle/>
+          <a:p>
+            <a:pPr algn="ctr"/>
+            <a:endParaRPr lang="en-SG"/>
+          </a:p>
+        </p:txBody>
+      </p:sp>
+      <p:sp>
+        <p:nvSpPr>
+          <p:cNvPr id="5" name="Rectangle 4">
+            <a:extLst>
+              <a:ext uri="{FF2B5EF4-FFF2-40B4-BE49-F238E27FC236}">
+                <a16:creationId xmlns:a16="http://schemas.microsoft.com/office/drawing/2014/main" id="{4BAECDD3-4535-FB3F-16DF-59B76A1221E0}"/>
+              </a:ext>
+            </a:extLst>
+          </p:cNvPr>
+          <p:cNvSpPr/>
+          <p:nvPr/>
+        </p:nvSpPr>
+        <p:spPr>
+          <a:xfrm>
+            <a:off x="1034422" y="1318318"/>
+            <a:ext cx="2656381" cy="2726465"/>
+          </a:xfrm>
+          <a:prstGeom prst="rect">
+            <a:avLst/>
+          </a:prstGeom>
+          <a:ln>
+            <a:prstDash val="sysDot"/>
+          </a:ln>
+        </p:spPr>
+        <p:style>
+          <a:lnRef idx="2">
+            <a:schemeClr val="dk1"/>
+          </a:lnRef>
+          <a:fillRef idx="1">
+            <a:schemeClr val="lt1"/>
+          </a:fillRef>
+          <a:effectRef idx="0">
+            <a:schemeClr val="dk1"/>
+          </a:effectRef>
+          <a:fontRef idx="minor">
+            <a:schemeClr val="dk1"/>
+          </a:fontRef>
+        </p:style>
+        <p:txBody>
+          <a:bodyPr rtlCol="0" anchor="ctr"/>
+          <a:lstStyle/>
+          <a:p>
+            <a:pPr algn="ctr"/>
+            <a:endParaRPr lang="en-SG"/>
+          </a:p>
+        </p:txBody>
+      </p:sp>
+      <p:sp>
+        <p:nvSpPr>
+          <p:cNvPr id="6" name="Rectangle 5">
+            <a:extLst>
+              <a:ext uri="{FF2B5EF4-FFF2-40B4-BE49-F238E27FC236}">
+                <a16:creationId xmlns:a16="http://schemas.microsoft.com/office/drawing/2014/main" id="{193A4BAF-AE0B-8121-4D91-855749179F8C}"/>
+              </a:ext>
+            </a:extLst>
+          </p:cNvPr>
+          <p:cNvSpPr/>
+          <p:nvPr/>
+        </p:nvSpPr>
+        <p:spPr>
+          <a:xfrm>
+            <a:off x="4590771" y="1318319"/>
+            <a:ext cx="2077994" cy="2234848"/>
+          </a:xfrm>
+          <a:prstGeom prst="rect">
+            <a:avLst/>
+          </a:prstGeom>
+          <a:ln>
+            <a:prstDash val="sysDot"/>
+          </a:ln>
+        </p:spPr>
+        <p:style>
+          <a:lnRef idx="2">
+            <a:schemeClr val="dk1"/>
+          </a:lnRef>
+          <a:fillRef idx="1">
+            <a:schemeClr val="lt1"/>
+          </a:fillRef>
+          <a:effectRef idx="0">
+            <a:schemeClr val="dk1"/>
+          </a:effectRef>
+          <a:fontRef idx="minor">
+            <a:schemeClr val="dk1"/>
+          </a:fontRef>
+        </p:style>
+        <p:txBody>
+          <a:bodyPr rtlCol="0" anchor="ctr"/>
+          <a:lstStyle/>
+          <a:p>
+            <a:pPr algn="ctr"/>
+            <a:endParaRPr lang="en-SG"/>
+          </a:p>
+        </p:txBody>
+      </p:sp>
+      <p:cxnSp>
+        <p:nvCxnSpPr>
+          <p:cNvPr id="7" name="Straight Connector 6">
+            <a:extLst>
+              <a:ext uri="{FF2B5EF4-FFF2-40B4-BE49-F238E27FC236}">
+                <a16:creationId xmlns:a16="http://schemas.microsoft.com/office/drawing/2014/main" id="{432C3A2D-59A7-7CF8-42F5-A2CA785247A4}"/>
+              </a:ext>
+            </a:extLst>
+          </p:cNvPr>
+          <p:cNvCxnSpPr>
+            <a:cxnSpLocks/>
+          </p:cNvCxnSpPr>
+          <p:nvPr/>
+        </p:nvCxnSpPr>
+        <p:spPr>
+          <a:xfrm>
+            <a:off x="6849203" y="809962"/>
+            <a:ext cx="0" cy="3267754"/>
+          </a:xfrm>
+          <a:prstGeom prst="line">
+            <a:avLst/>
+          </a:prstGeom>
+          <a:ln>
+            <a:prstDash val="dash"/>
+          </a:ln>
+        </p:spPr>
+        <p:style>
+          <a:lnRef idx="1">
+            <a:schemeClr val="dk1"/>
+          </a:lnRef>
+          <a:fillRef idx="0">
+            <a:schemeClr val="dk1"/>
+          </a:fillRef>
+          <a:effectRef idx="0">
+            <a:schemeClr val="dk1"/>
+          </a:effectRef>
+          <a:fontRef idx="minor">
+            <a:schemeClr val="tx1"/>
+          </a:fontRef>
+        </p:style>
+      </p:cxnSp>
+      <p:sp>
+        <p:nvSpPr>
+          <p:cNvPr id="8" name="TextBox 7">
+            <a:extLst>
+              <a:ext uri="{FF2B5EF4-FFF2-40B4-BE49-F238E27FC236}">
+                <a16:creationId xmlns:a16="http://schemas.microsoft.com/office/drawing/2014/main" id="{8CA5A9AE-5015-76B9-DF2E-14BD86ED7547}"/>
+              </a:ext>
+            </a:extLst>
+          </p:cNvPr>
+          <p:cNvSpPr txBox="1"/>
+          <p:nvPr/>
+        </p:nvSpPr>
+        <p:spPr>
+          <a:xfrm>
+            <a:off x="6446301" y="561868"/>
+            <a:ext cx="844189" cy="276999"/>
+          </a:xfrm>
+          <a:prstGeom prst="rect">
+            <a:avLst/>
+          </a:prstGeom>
+          <a:noFill/>
+        </p:spPr>
+        <p:txBody>
+          <a:bodyPr wrap="square" rtlCol="0">
+            <a:spAutoFit/>
+          </a:bodyPr>
+          <a:lstStyle/>
+          <a:p>
+            <a:r>
+              <a:rPr lang="en-US" sz="1200" b="1" dirty="0"/>
+              <a:t>Internet</a:t>
+            </a:r>
+            <a:endParaRPr lang="en-SG" sz="1200" b="1" dirty="0"/>
+          </a:p>
+        </p:txBody>
+      </p:sp>
+      <p:sp>
+        <p:nvSpPr>
+          <p:cNvPr id="9" name="Rectangle 8">
+            <a:extLst>
+              <a:ext uri="{FF2B5EF4-FFF2-40B4-BE49-F238E27FC236}">
+                <a16:creationId xmlns:a16="http://schemas.microsoft.com/office/drawing/2014/main" id="{9E1A5ABD-8ACA-E65A-4560-279406D2954A}"/>
+              </a:ext>
+            </a:extLst>
+          </p:cNvPr>
+          <p:cNvSpPr/>
+          <p:nvPr/>
+        </p:nvSpPr>
+        <p:spPr>
+          <a:xfrm>
+            <a:off x="7103578" y="1318318"/>
+            <a:ext cx="2666828" cy="2759398"/>
+          </a:xfrm>
+          <a:prstGeom prst="rect">
+            <a:avLst/>
+          </a:prstGeom>
+          <a:ln>
+            <a:prstDash val="sysDot"/>
+          </a:ln>
+        </p:spPr>
+        <p:style>
+          <a:lnRef idx="2">
+            <a:schemeClr val="dk1"/>
+          </a:lnRef>
+          <a:fillRef idx="1">
+            <a:schemeClr val="lt1"/>
+          </a:fillRef>
+          <a:effectRef idx="0">
+            <a:schemeClr val="dk1"/>
+          </a:effectRef>
+          <a:fontRef idx="minor">
+            <a:schemeClr val="dk1"/>
+          </a:fontRef>
+        </p:style>
+        <p:txBody>
+          <a:bodyPr rtlCol="0" anchor="ctr"/>
+          <a:lstStyle/>
+          <a:p>
+            <a:pPr algn="ctr"/>
+            <a:endParaRPr lang="en-SG"/>
+          </a:p>
+        </p:txBody>
+      </p:sp>
+      <p:sp>
+        <p:nvSpPr>
+          <p:cNvPr id="10" name="TextBox 9">
+            <a:extLst>
+              <a:ext uri="{FF2B5EF4-FFF2-40B4-BE49-F238E27FC236}">
+                <a16:creationId xmlns:a16="http://schemas.microsoft.com/office/drawing/2014/main" id="{B2C0CE3B-F2A9-95C8-AC86-83B4086A956C}"/>
+              </a:ext>
+            </a:extLst>
+          </p:cNvPr>
+          <p:cNvSpPr txBox="1"/>
+          <p:nvPr/>
+        </p:nvSpPr>
+        <p:spPr>
+          <a:xfrm>
+            <a:off x="921195" y="968256"/>
+            <a:ext cx="2101984" cy="307777"/>
+          </a:xfrm>
+          <a:prstGeom prst="rect">
+            <a:avLst/>
+          </a:prstGeom>
+          <a:noFill/>
+        </p:spPr>
+        <p:txBody>
+          <a:bodyPr wrap="square" rtlCol="0">
+            <a:spAutoFit/>
+          </a:bodyPr>
+          <a:lstStyle/>
+          <a:p>
+            <a:r>
+              <a:rPr lang="en-US" sz="1400" dirty="0"/>
+              <a:t>Trust App [Trust Zone]</a:t>
+            </a:r>
+            <a:endParaRPr lang="en-SG" sz="1400" dirty="0"/>
+          </a:p>
+        </p:txBody>
+      </p:sp>
+      <p:sp>
+        <p:nvSpPr>
+          <p:cNvPr id="11" name="TextBox 10">
+            <a:extLst>
+              <a:ext uri="{FF2B5EF4-FFF2-40B4-BE49-F238E27FC236}">
+                <a16:creationId xmlns:a16="http://schemas.microsoft.com/office/drawing/2014/main" id="{E8F1D68A-5670-0C11-D898-D071A9D7CE25}"/>
+              </a:ext>
+            </a:extLst>
+          </p:cNvPr>
+          <p:cNvSpPr txBox="1"/>
+          <p:nvPr/>
+        </p:nvSpPr>
+        <p:spPr>
+          <a:xfrm>
+            <a:off x="4471719" y="947641"/>
+            <a:ext cx="2505153" cy="307777"/>
+          </a:xfrm>
+          <a:prstGeom prst="rect">
+            <a:avLst/>
+          </a:prstGeom>
+          <a:noFill/>
+        </p:spPr>
+        <p:txBody>
+          <a:bodyPr wrap="square" rtlCol="0">
+            <a:spAutoFit/>
+          </a:bodyPr>
+          <a:lstStyle/>
+          <a:p>
+            <a:r>
+              <a:rPr lang="en-US" sz="1400" dirty="0"/>
+              <a:t>Trust Client [Normal world]</a:t>
+            </a:r>
+            <a:endParaRPr lang="en-SG" sz="1400" dirty="0"/>
+          </a:p>
+        </p:txBody>
+      </p:sp>
+      <p:sp>
+        <p:nvSpPr>
+          <p:cNvPr id="12" name="TextBox 11">
+            <a:extLst>
+              <a:ext uri="{FF2B5EF4-FFF2-40B4-BE49-F238E27FC236}">
+                <a16:creationId xmlns:a16="http://schemas.microsoft.com/office/drawing/2014/main" id="{EE6E20AE-7129-B18E-FDAD-3F85C568FD46}"/>
+              </a:ext>
+            </a:extLst>
+          </p:cNvPr>
+          <p:cNvSpPr txBox="1"/>
+          <p:nvPr/>
+        </p:nvSpPr>
+        <p:spPr>
+          <a:xfrm>
+            <a:off x="7238956" y="1319051"/>
+            <a:ext cx="2157663" cy="307777"/>
+          </a:xfrm>
+          <a:prstGeom prst="rect">
+            <a:avLst/>
+          </a:prstGeom>
+          <a:noFill/>
+        </p:spPr>
+        <p:txBody>
+          <a:bodyPr wrap="square" rtlCol="0">
+            <a:spAutoFit/>
+          </a:bodyPr>
+          <a:lstStyle/>
+          <a:p>
+            <a:r>
+              <a:rPr lang="en-US" sz="1400" dirty="0"/>
+              <a:t>Server program</a:t>
+            </a:r>
+            <a:endParaRPr lang="en-SG" sz="1400" dirty="0"/>
+          </a:p>
+        </p:txBody>
+      </p:sp>
+      <p:sp>
+        <p:nvSpPr>
+          <p:cNvPr id="13" name="TextBox 12">
+            <a:extLst>
+              <a:ext uri="{FF2B5EF4-FFF2-40B4-BE49-F238E27FC236}">
+                <a16:creationId xmlns:a16="http://schemas.microsoft.com/office/drawing/2014/main" id="{F581EBFE-6615-A99D-A80A-97921254B798}"/>
+              </a:ext>
+            </a:extLst>
+          </p:cNvPr>
+          <p:cNvSpPr txBox="1"/>
+          <p:nvPr/>
+        </p:nvSpPr>
+        <p:spPr>
+          <a:xfrm>
+            <a:off x="3427496" y="367169"/>
+            <a:ext cx="1590576" cy="338554"/>
+          </a:xfrm>
+          <a:prstGeom prst="rect">
+            <a:avLst/>
+          </a:prstGeom>
+          <a:noFill/>
+        </p:spPr>
+        <p:txBody>
+          <a:bodyPr wrap="square" rtlCol="0">
+            <a:spAutoFit/>
+          </a:bodyPr>
+          <a:lstStyle/>
+          <a:p>
+            <a:r>
+              <a:rPr lang="en-US" sz="1600" b="1" dirty="0"/>
+              <a:t>Raspberry PI </a:t>
+            </a:r>
+            <a:endParaRPr lang="en-SG" sz="1600" b="1" dirty="0"/>
+          </a:p>
+        </p:txBody>
+      </p:sp>
+      <p:sp>
+        <p:nvSpPr>
+          <p:cNvPr id="14" name="TextBox 13">
+            <a:extLst>
+              <a:ext uri="{FF2B5EF4-FFF2-40B4-BE49-F238E27FC236}">
+                <a16:creationId xmlns:a16="http://schemas.microsoft.com/office/drawing/2014/main" id="{F3BB9285-8200-1604-63B0-54F6C12E846F}"/>
+              </a:ext>
+            </a:extLst>
+          </p:cNvPr>
+          <p:cNvSpPr txBox="1"/>
+          <p:nvPr/>
+        </p:nvSpPr>
+        <p:spPr>
+          <a:xfrm>
+            <a:off x="7350781" y="367169"/>
+            <a:ext cx="2361032" cy="338554"/>
+          </a:xfrm>
+          <a:prstGeom prst="rect">
+            <a:avLst/>
+          </a:prstGeom>
+          <a:noFill/>
+        </p:spPr>
+        <p:txBody>
+          <a:bodyPr wrap="square" rtlCol="0">
+            <a:spAutoFit/>
+          </a:bodyPr>
+          <a:lstStyle/>
+          <a:p>
+            <a:r>
+              <a:rPr lang="en-US" sz="1600" b="1" dirty="0"/>
+              <a:t>Trust Server Computer</a:t>
+            </a:r>
+            <a:endParaRPr lang="en-SG" sz="1600" b="1" dirty="0"/>
+          </a:p>
+        </p:txBody>
+      </p:sp>
+      <p:sp>
+        <p:nvSpPr>
+          <p:cNvPr id="15" name="Rectangle 14">
+            <a:extLst>
+              <a:ext uri="{FF2B5EF4-FFF2-40B4-BE49-F238E27FC236}">
+                <a16:creationId xmlns:a16="http://schemas.microsoft.com/office/drawing/2014/main" id="{09AF65D3-3985-C235-7EF9-3DB053F71731}"/>
+              </a:ext>
+            </a:extLst>
+          </p:cNvPr>
+          <p:cNvSpPr/>
+          <p:nvPr/>
+        </p:nvSpPr>
+        <p:spPr>
+          <a:xfrm>
+            <a:off x="1387914" y="1609672"/>
+            <a:ext cx="2107967" cy="550231"/>
+          </a:xfrm>
+          <a:prstGeom prst="rect">
+            <a:avLst/>
+          </a:prstGeom>
+          <a:ln w="19050"/>
+        </p:spPr>
+        <p:style>
+          <a:lnRef idx="2">
+            <a:schemeClr val="dk1"/>
+          </a:lnRef>
+          <a:fillRef idx="1">
+            <a:schemeClr val="lt1"/>
+          </a:fillRef>
+          <a:effectRef idx="0">
+            <a:schemeClr val="dk1"/>
+          </a:effectRef>
+          <a:fontRef idx="minor">
+            <a:schemeClr val="dk1"/>
+          </a:fontRef>
+        </p:style>
+        <p:txBody>
+          <a:bodyPr rtlCol="0" anchor="ctr"/>
+          <a:lstStyle/>
+          <a:p>
+            <a:r>
+              <a:rPr lang="en-US" sz="1100" dirty="0"/>
+              <a:t>Use the PATT to parameters get the random block/bytes memory address/file position.</a:t>
+            </a:r>
+            <a:endParaRPr lang="en-SG" sz="1100" dirty="0"/>
+          </a:p>
+        </p:txBody>
+      </p:sp>
+      <p:sp>
+        <p:nvSpPr>
+          <p:cNvPr id="17" name="TextBox 16">
+            <a:extLst>
+              <a:ext uri="{FF2B5EF4-FFF2-40B4-BE49-F238E27FC236}">
+                <a16:creationId xmlns:a16="http://schemas.microsoft.com/office/drawing/2014/main" id="{4F4773C9-0E38-B5C7-0922-24F3C668014F}"/>
+              </a:ext>
+            </a:extLst>
+          </p:cNvPr>
+          <p:cNvSpPr txBox="1"/>
+          <p:nvPr/>
+        </p:nvSpPr>
+        <p:spPr>
+          <a:xfrm>
+            <a:off x="3646335" y="3884117"/>
+            <a:ext cx="3222060" cy="276999"/>
+          </a:xfrm>
+          <a:prstGeom prst="rect">
+            <a:avLst/>
+          </a:prstGeom>
+          <a:noFill/>
+        </p:spPr>
+        <p:txBody>
+          <a:bodyPr wrap="square" rtlCol="0">
+            <a:spAutoFit/>
+          </a:bodyPr>
+          <a:lstStyle/>
+          <a:p>
+            <a:r>
+              <a:rPr lang="en-US" sz="1200" b="1" dirty="0">
+                <a:solidFill>
+                  <a:schemeClr val="bg1">
+                    <a:lumMod val="50000"/>
+                  </a:schemeClr>
+                </a:solidFill>
+              </a:rPr>
+              <a:t>OPTEE driver  &lt;=&gt;  Tee-supplicant service </a:t>
+            </a:r>
+          </a:p>
+        </p:txBody>
+      </p:sp>
+      <p:cxnSp>
+        <p:nvCxnSpPr>
+          <p:cNvPr id="18" name="Straight Arrow Connector 17">
+            <a:extLst>
+              <a:ext uri="{FF2B5EF4-FFF2-40B4-BE49-F238E27FC236}">
+                <a16:creationId xmlns:a16="http://schemas.microsoft.com/office/drawing/2014/main" id="{296B0BFE-80EE-903E-CB37-3DFCA1DDE5B8}"/>
+              </a:ext>
+            </a:extLst>
+          </p:cNvPr>
+          <p:cNvCxnSpPr>
+            <a:cxnSpLocks/>
+          </p:cNvCxnSpPr>
+          <p:nvPr/>
+        </p:nvCxnSpPr>
+        <p:spPr>
+          <a:xfrm>
+            <a:off x="3529570" y="1922018"/>
+            <a:ext cx="1393271" cy="0"/>
+          </a:xfrm>
+          <a:prstGeom prst="straightConnector1">
+            <a:avLst/>
+          </a:prstGeom>
+          <a:ln>
+            <a:tailEnd type="triangle"/>
+          </a:ln>
+        </p:spPr>
+        <p:style>
+          <a:lnRef idx="1">
+            <a:schemeClr val="dk1"/>
+          </a:lnRef>
+          <a:fillRef idx="0">
+            <a:schemeClr val="dk1"/>
+          </a:fillRef>
+          <a:effectRef idx="0">
+            <a:schemeClr val="dk1"/>
+          </a:effectRef>
+          <a:fontRef idx="minor">
+            <a:schemeClr val="tx1"/>
+          </a:fontRef>
+        </p:style>
+      </p:cxnSp>
+      <p:sp>
+        <p:nvSpPr>
+          <p:cNvPr id="19" name="TextBox 18">
+            <a:extLst>
+              <a:ext uri="{FF2B5EF4-FFF2-40B4-BE49-F238E27FC236}">
+                <a16:creationId xmlns:a16="http://schemas.microsoft.com/office/drawing/2014/main" id="{D1D78D38-DF67-077A-C411-F69DE13149DF}"/>
+              </a:ext>
+            </a:extLst>
+          </p:cNvPr>
+          <p:cNvSpPr txBox="1"/>
+          <p:nvPr/>
+        </p:nvSpPr>
+        <p:spPr>
+          <a:xfrm>
+            <a:off x="3706563" y="1653133"/>
+            <a:ext cx="1108326" cy="253916"/>
+          </a:xfrm>
+          <a:prstGeom prst="rect">
+            <a:avLst/>
+          </a:prstGeom>
+          <a:noFill/>
+        </p:spPr>
+        <p:txBody>
+          <a:bodyPr wrap="square" rtlCol="0">
+            <a:spAutoFit/>
+          </a:bodyPr>
+          <a:lstStyle/>
+          <a:p>
+            <a:r>
+              <a:rPr lang="en-US" sz="1050" b="1" dirty="0"/>
+              <a:t>Bytes address </a:t>
+            </a:r>
+          </a:p>
+        </p:txBody>
+      </p:sp>
+      <p:sp>
+        <p:nvSpPr>
+          <p:cNvPr id="20" name="Rectangle 19">
+            <a:extLst>
+              <a:ext uri="{FF2B5EF4-FFF2-40B4-BE49-F238E27FC236}">
+                <a16:creationId xmlns:a16="http://schemas.microsoft.com/office/drawing/2014/main" id="{D786EEB6-3A35-882F-F52E-B3E788D88721}"/>
+              </a:ext>
+            </a:extLst>
+          </p:cNvPr>
+          <p:cNvSpPr/>
+          <p:nvPr/>
+        </p:nvSpPr>
+        <p:spPr>
+          <a:xfrm>
+            <a:off x="4956530" y="1756239"/>
+            <a:ext cx="1565665" cy="397187"/>
+          </a:xfrm>
+          <a:prstGeom prst="rect">
+            <a:avLst/>
+          </a:prstGeom>
+          <a:ln w="19050"/>
+        </p:spPr>
+        <p:style>
+          <a:lnRef idx="2">
+            <a:schemeClr val="dk1"/>
+          </a:lnRef>
+          <a:fillRef idx="1">
+            <a:schemeClr val="lt1"/>
+          </a:fillRef>
+          <a:effectRef idx="0">
+            <a:schemeClr val="dk1"/>
+          </a:effectRef>
+          <a:fontRef idx="minor">
+            <a:schemeClr val="dk1"/>
+          </a:fontRef>
+        </p:style>
+        <p:txBody>
+          <a:bodyPr rtlCol="0" anchor="ctr"/>
+          <a:lstStyle/>
+          <a:p>
+            <a:r>
+              <a:rPr lang="en-US" sz="1100" dirty="0"/>
+              <a:t>Fetch related  bytes data from the address </a:t>
+            </a:r>
+            <a:endParaRPr lang="en-SG" sz="1100" dirty="0"/>
+          </a:p>
+        </p:txBody>
+      </p:sp>
+      <p:sp>
+        <p:nvSpPr>
+          <p:cNvPr id="21" name="Rectangle 20">
+            <a:extLst>
+              <a:ext uri="{FF2B5EF4-FFF2-40B4-BE49-F238E27FC236}">
+                <a16:creationId xmlns:a16="http://schemas.microsoft.com/office/drawing/2014/main" id="{C4E3920B-128C-9A1A-0FE3-6FDBDAD21EEC}"/>
+              </a:ext>
+            </a:extLst>
+          </p:cNvPr>
+          <p:cNvSpPr/>
+          <p:nvPr/>
+        </p:nvSpPr>
+        <p:spPr>
+          <a:xfrm>
+            <a:off x="7277457" y="1725991"/>
+            <a:ext cx="1889080" cy="358935"/>
+          </a:xfrm>
+          <a:prstGeom prst="rect">
+            <a:avLst/>
+          </a:prstGeom>
+          <a:ln w="19050"/>
+        </p:spPr>
+        <p:style>
+          <a:lnRef idx="2">
+            <a:schemeClr val="dk1"/>
+          </a:lnRef>
+          <a:fillRef idx="1">
+            <a:schemeClr val="lt1"/>
+          </a:fillRef>
+          <a:effectRef idx="0">
+            <a:schemeClr val="dk1"/>
+          </a:effectRef>
+          <a:fontRef idx="minor">
+            <a:schemeClr val="dk1"/>
+          </a:fontRef>
+        </p:style>
+        <p:txBody>
+          <a:bodyPr rtlCol="0" anchor="ctr"/>
+          <a:lstStyle/>
+          <a:p>
+            <a:r>
+              <a:rPr lang="en-US" sz="1100" dirty="0"/>
+              <a:t>Fetch the pre-saved Firmware from DB</a:t>
+            </a:r>
+            <a:endParaRPr lang="en-SG" sz="1100" dirty="0"/>
+          </a:p>
+        </p:txBody>
+      </p:sp>
+      <p:cxnSp>
+        <p:nvCxnSpPr>
+          <p:cNvPr id="22" name="Straight Arrow Connector 21">
+            <a:extLst>
+              <a:ext uri="{FF2B5EF4-FFF2-40B4-BE49-F238E27FC236}">
+                <a16:creationId xmlns:a16="http://schemas.microsoft.com/office/drawing/2014/main" id="{D0157863-ED35-9CA1-FB6A-1A561A16D8A4}"/>
+              </a:ext>
+            </a:extLst>
+          </p:cNvPr>
+          <p:cNvCxnSpPr/>
+          <p:nvPr/>
+        </p:nvCxnSpPr>
+        <p:spPr>
+          <a:xfrm>
+            <a:off x="8177477" y="2075013"/>
+            <a:ext cx="0" cy="288354"/>
+          </a:xfrm>
+          <a:prstGeom prst="straightConnector1">
+            <a:avLst/>
+          </a:prstGeom>
+          <a:ln>
+            <a:tailEnd type="triangle"/>
+          </a:ln>
+        </p:spPr>
+        <p:style>
+          <a:lnRef idx="1">
+            <a:schemeClr val="dk1"/>
+          </a:lnRef>
+          <a:fillRef idx="0">
+            <a:schemeClr val="dk1"/>
+          </a:fillRef>
+          <a:effectRef idx="0">
+            <a:schemeClr val="dk1"/>
+          </a:effectRef>
+          <a:fontRef idx="minor">
+            <a:schemeClr val="tx1"/>
+          </a:fontRef>
+        </p:style>
+      </p:cxnSp>
+      <p:sp>
+        <p:nvSpPr>
+          <p:cNvPr id="23" name="Rectangle 22">
+            <a:extLst>
+              <a:ext uri="{FF2B5EF4-FFF2-40B4-BE49-F238E27FC236}">
+                <a16:creationId xmlns:a16="http://schemas.microsoft.com/office/drawing/2014/main" id="{BEDEE113-836A-4DDC-4269-8DB382EB77BC}"/>
+              </a:ext>
+            </a:extLst>
+          </p:cNvPr>
+          <p:cNvSpPr/>
+          <p:nvPr/>
+        </p:nvSpPr>
+        <p:spPr>
+          <a:xfrm>
+            <a:off x="1387914" y="3451143"/>
+            <a:ext cx="2074640" cy="410226"/>
+          </a:xfrm>
+          <a:prstGeom prst="rect">
+            <a:avLst/>
+          </a:prstGeom>
+          <a:ln w="19050"/>
+        </p:spPr>
+        <p:style>
+          <a:lnRef idx="2">
+            <a:schemeClr val="dk1"/>
+          </a:lnRef>
+          <a:fillRef idx="1">
+            <a:schemeClr val="lt1"/>
+          </a:fillRef>
+          <a:effectRef idx="0">
+            <a:schemeClr val="dk1"/>
+          </a:effectRef>
+          <a:fontRef idx="minor">
+            <a:schemeClr val="dk1"/>
+          </a:fontRef>
+        </p:style>
+        <p:txBody>
+          <a:bodyPr rtlCol="0" anchor="ctr"/>
+          <a:lstStyle/>
+          <a:p>
+            <a:r>
+              <a:rPr lang="en-US" sz="1100" dirty="0"/>
+              <a:t>Encrypt the PATT result, msg </a:t>
+            </a:r>
+            <a:r>
+              <a:rPr lang="en-US" sz="1100" dirty="0" err="1"/>
+              <a:t>Idx</a:t>
+            </a:r>
+            <a:r>
+              <a:rPr lang="en-US" sz="1100" dirty="0"/>
+              <a:t>, server Random #2</a:t>
+            </a:r>
+            <a:endParaRPr lang="en-SG" sz="1100" dirty="0"/>
+          </a:p>
+        </p:txBody>
+      </p:sp>
+      <p:sp>
+        <p:nvSpPr>
+          <p:cNvPr id="24" name="Rectangle 23">
+            <a:extLst>
+              <a:ext uri="{FF2B5EF4-FFF2-40B4-BE49-F238E27FC236}">
+                <a16:creationId xmlns:a16="http://schemas.microsoft.com/office/drawing/2014/main" id="{E5586E83-F713-2107-4C07-5B634CD0E719}"/>
+              </a:ext>
+            </a:extLst>
+          </p:cNvPr>
+          <p:cNvSpPr/>
+          <p:nvPr/>
+        </p:nvSpPr>
+        <p:spPr>
+          <a:xfrm>
+            <a:off x="1133471" y="2892605"/>
+            <a:ext cx="1567213" cy="454664"/>
+          </a:xfrm>
+          <a:prstGeom prst="rect">
+            <a:avLst/>
+          </a:prstGeom>
+          <a:ln w="19050"/>
+        </p:spPr>
+        <p:style>
+          <a:lnRef idx="2">
+            <a:schemeClr val="dk1"/>
+          </a:lnRef>
+          <a:fillRef idx="1">
+            <a:schemeClr val="lt1"/>
+          </a:fillRef>
+          <a:effectRef idx="0">
+            <a:schemeClr val="dk1"/>
+          </a:effectRef>
+          <a:fontRef idx="minor">
+            <a:schemeClr val="dk1"/>
+          </a:fontRef>
+        </p:style>
+        <p:txBody>
+          <a:bodyPr rtlCol="0" anchor="ctr"/>
+          <a:lstStyle/>
+          <a:p>
+            <a:r>
+              <a:rPr lang="en-US" sz="1100" dirty="0"/>
+              <a:t>Add bytes to SWATT checksum calculation</a:t>
+            </a:r>
+            <a:endParaRPr lang="en-SG" sz="1100" dirty="0"/>
+          </a:p>
+        </p:txBody>
+      </p:sp>
+      <p:sp>
+        <p:nvSpPr>
+          <p:cNvPr id="25" name="Rectangle 24">
+            <a:extLst>
+              <a:ext uri="{FF2B5EF4-FFF2-40B4-BE49-F238E27FC236}">
+                <a16:creationId xmlns:a16="http://schemas.microsoft.com/office/drawing/2014/main" id="{820E100C-655D-44C9-CC35-534AD900A136}"/>
+              </a:ext>
+            </a:extLst>
+          </p:cNvPr>
+          <p:cNvSpPr/>
+          <p:nvPr/>
+        </p:nvSpPr>
+        <p:spPr>
+          <a:xfrm>
+            <a:off x="7291076" y="2383278"/>
+            <a:ext cx="1871375" cy="675518"/>
+          </a:xfrm>
+          <a:prstGeom prst="rect">
+            <a:avLst/>
+          </a:prstGeom>
+          <a:ln w="19050"/>
+        </p:spPr>
+        <p:style>
+          <a:lnRef idx="2">
+            <a:schemeClr val="dk1"/>
+          </a:lnRef>
+          <a:fillRef idx="1">
+            <a:schemeClr val="lt1"/>
+          </a:fillRef>
+          <a:effectRef idx="0">
+            <a:schemeClr val="dk1"/>
+          </a:effectRef>
+          <a:fontRef idx="minor">
+            <a:schemeClr val="dk1"/>
+          </a:fontRef>
+        </p:style>
+        <p:txBody>
+          <a:bodyPr rtlCol="0" anchor="ctr"/>
+          <a:lstStyle/>
+          <a:p>
+            <a:r>
+              <a:rPr lang="en-US" sz="1100" dirty="0"/>
+              <a:t>Run Firmware in IoT emulation  environment and calculate the PATT </a:t>
+            </a:r>
+            <a:endParaRPr lang="en-SG" sz="1100" dirty="0"/>
+          </a:p>
+        </p:txBody>
+      </p:sp>
+      <p:cxnSp>
+        <p:nvCxnSpPr>
+          <p:cNvPr id="26" name="Straight Arrow Connector 25">
+            <a:extLst>
+              <a:ext uri="{FF2B5EF4-FFF2-40B4-BE49-F238E27FC236}">
+                <a16:creationId xmlns:a16="http://schemas.microsoft.com/office/drawing/2014/main" id="{62CCC088-FEF6-A345-8AB1-081E23D5615D}"/>
+              </a:ext>
+            </a:extLst>
+          </p:cNvPr>
+          <p:cNvCxnSpPr/>
+          <p:nvPr/>
+        </p:nvCxnSpPr>
+        <p:spPr>
+          <a:xfrm flipH="1">
+            <a:off x="8219585" y="3082607"/>
+            <a:ext cx="0" cy="203347"/>
+          </a:xfrm>
+          <a:prstGeom prst="straightConnector1">
+            <a:avLst/>
+          </a:prstGeom>
+          <a:ln>
+            <a:tailEnd type="triangle"/>
+          </a:ln>
+        </p:spPr>
+        <p:style>
+          <a:lnRef idx="1">
+            <a:schemeClr val="dk1"/>
+          </a:lnRef>
+          <a:fillRef idx="0">
+            <a:schemeClr val="dk1"/>
+          </a:fillRef>
+          <a:effectRef idx="0">
+            <a:schemeClr val="dk1"/>
+          </a:effectRef>
+          <a:fontRef idx="minor">
+            <a:schemeClr val="tx1"/>
+          </a:fontRef>
+        </p:style>
+      </p:cxnSp>
+      <p:sp>
+        <p:nvSpPr>
+          <p:cNvPr id="27" name="Flowchart: Magnetic Disk 26">
+            <a:extLst>
+              <a:ext uri="{FF2B5EF4-FFF2-40B4-BE49-F238E27FC236}">
+                <a16:creationId xmlns:a16="http://schemas.microsoft.com/office/drawing/2014/main" id="{004E8DAD-0DBA-C831-4AA5-2853B8A5163F}"/>
+              </a:ext>
+            </a:extLst>
+          </p:cNvPr>
+          <p:cNvSpPr/>
+          <p:nvPr/>
+        </p:nvSpPr>
+        <p:spPr>
+          <a:xfrm>
+            <a:off x="9270037" y="2214688"/>
+            <a:ext cx="392782" cy="380759"/>
+          </a:xfrm>
+          <a:prstGeom prst="flowChartMagneticDisk">
+            <a:avLst/>
+          </a:prstGeom>
+        </p:spPr>
+        <p:style>
+          <a:lnRef idx="2">
+            <a:schemeClr val="dk1"/>
+          </a:lnRef>
+          <a:fillRef idx="1">
+            <a:schemeClr val="lt1"/>
+          </a:fillRef>
+          <a:effectRef idx="0">
+            <a:schemeClr val="dk1"/>
+          </a:effectRef>
+          <a:fontRef idx="minor">
+            <a:schemeClr val="dk1"/>
+          </a:fontRef>
+        </p:style>
+        <p:txBody>
+          <a:bodyPr rtlCol="0" anchor="ctr"/>
+          <a:lstStyle/>
+          <a:p>
+            <a:pPr algn="ctr"/>
+            <a:endParaRPr lang="en-SG"/>
+          </a:p>
+        </p:txBody>
+      </p:sp>
+      <p:sp>
+        <p:nvSpPr>
+          <p:cNvPr id="28" name="Rectangle 27">
+            <a:extLst>
+              <a:ext uri="{FF2B5EF4-FFF2-40B4-BE49-F238E27FC236}">
+                <a16:creationId xmlns:a16="http://schemas.microsoft.com/office/drawing/2014/main" id="{776BA917-3BF0-BF8E-31C7-77E958E30E93}"/>
+              </a:ext>
+            </a:extLst>
+          </p:cNvPr>
+          <p:cNvSpPr/>
+          <p:nvPr/>
+        </p:nvSpPr>
+        <p:spPr>
+          <a:xfrm>
+            <a:off x="4952712" y="2861846"/>
+            <a:ext cx="1360480" cy="393900"/>
+          </a:xfrm>
+          <a:prstGeom prst="rect">
+            <a:avLst/>
+          </a:prstGeom>
+          <a:ln w="19050"/>
+        </p:spPr>
+        <p:style>
+          <a:lnRef idx="2">
+            <a:schemeClr val="dk1"/>
+          </a:lnRef>
+          <a:fillRef idx="1">
+            <a:schemeClr val="lt1"/>
+          </a:fillRef>
+          <a:effectRef idx="0">
+            <a:schemeClr val="dk1"/>
+          </a:effectRef>
+          <a:fontRef idx="minor">
+            <a:schemeClr val="dk1"/>
+          </a:fontRef>
+        </p:style>
+        <p:txBody>
+          <a:bodyPr rtlCol="0" anchor="ctr"/>
+          <a:lstStyle/>
+          <a:p>
+            <a:r>
+              <a:rPr lang="en-US" sz="1100" dirty="0"/>
+              <a:t>Communication module</a:t>
+            </a:r>
+            <a:endParaRPr lang="en-SG" sz="1100" dirty="0"/>
+          </a:p>
+        </p:txBody>
+      </p:sp>
+      <p:pic>
+        <p:nvPicPr>
+          <p:cNvPr id="29" name="Picture 28">
+            <a:extLst>
+              <a:ext uri="{FF2B5EF4-FFF2-40B4-BE49-F238E27FC236}">
+                <a16:creationId xmlns:a16="http://schemas.microsoft.com/office/drawing/2014/main" id="{062CA161-3B61-E68C-91AC-1C3EAF5960E0}"/>
+              </a:ext>
+            </a:extLst>
+          </p:cNvPr>
+          <p:cNvPicPr>
+            <a:picLocks noChangeAspect="1"/>
+          </p:cNvPicPr>
+          <p:nvPr/>
+        </p:nvPicPr>
+        <p:blipFill rotWithShape="1">
+          <a:blip r:embed="rId2" cstate="print">
+            <a:extLst>
+              <a:ext uri="{28A0092B-C50C-407E-A947-70E740481C1C}">
+                <a14:useLocalDpi xmlns:a14="http://schemas.microsoft.com/office/drawing/2010/main" val="0"/>
+              </a:ext>
+            </a:extLst>
+          </a:blip>
+          <a:srcRect l="10749" r="11155"/>
+          <a:stretch/>
+        </p:blipFill>
+        <p:spPr>
+          <a:xfrm>
+            <a:off x="5851016" y="2363367"/>
+            <a:ext cx="372103" cy="464160"/>
+          </a:xfrm>
+          <a:prstGeom prst="rect">
+            <a:avLst/>
+          </a:prstGeom>
+        </p:spPr>
+      </p:pic>
+      <p:cxnSp>
+        <p:nvCxnSpPr>
+          <p:cNvPr id="30" name="Straight Arrow Connector 29">
+            <a:extLst>
+              <a:ext uri="{FF2B5EF4-FFF2-40B4-BE49-F238E27FC236}">
+                <a16:creationId xmlns:a16="http://schemas.microsoft.com/office/drawing/2014/main" id="{D811706D-D2A5-CF43-067B-62926ACB9070}"/>
+              </a:ext>
+            </a:extLst>
+          </p:cNvPr>
+          <p:cNvCxnSpPr/>
+          <p:nvPr/>
+        </p:nvCxnSpPr>
+        <p:spPr>
+          <a:xfrm>
+            <a:off x="6036148" y="2165873"/>
+            <a:ext cx="3357" cy="235354"/>
+          </a:xfrm>
+          <a:prstGeom prst="straightConnector1">
+            <a:avLst/>
+          </a:prstGeom>
+          <a:ln>
+            <a:tailEnd type="triangle"/>
+          </a:ln>
+        </p:spPr>
+        <p:style>
+          <a:lnRef idx="1">
+            <a:schemeClr val="dk1"/>
+          </a:lnRef>
+          <a:fillRef idx="0">
+            <a:schemeClr val="dk1"/>
+          </a:fillRef>
+          <a:effectRef idx="0">
+            <a:schemeClr val="dk1"/>
+          </a:effectRef>
+          <a:fontRef idx="minor">
+            <a:schemeClr val="tx1"/>
+          </a:fontRef>
+        </p:style>
+      </p:cxnSp>
+      <p:sp>
+        <p:nvSpPr>
+          <p:cNvPr id="31" name="Diamond 30">
+            <a:extLst>
+              <a:ext uri="{FF2B5EF4-FFF2-40B4-BE49-F238E27FC236}">
+                <a16:creationId xmlns:a16="http://schemas.microsoft.com/office/drawing/2014/main" id="{07299116-BAEF-2BEA-D3CA-D22B0A54B3DB}"/>
+              </a:ext>
+            </a:extLst>
+          </p:cNvPr>
+          <p:cNvSpPr/>
+          <p:nvPr/>
+        </p:nvSpPr>
+        <p:spPr>
+          <a:xfrm>
+            <a:off x="2102025" y="2377298"/>
+            <a:ext cx="1427545" cy="495233"/>
+          </a:xfrm>
+          <a:prstGeom prst="diamond">
+            <a:avLst/>
+          </a:prstGeom>
+        </p:spPr>
+        <p:style>
+          <a:lnRef idx="2">
+            <a:schemeClr val="dk1"/>
+          </a:lnRef>
+          <a:fillRef idx="1">
+            <a:schemeClr val="lt1"/>
+          </a:fillRef>
+          <a:effectRef idx="0">
+            <a:schemeClr val="dk1"/>
+          </a:effectRef>
+          <a:fontRef idx="minor">
+            <a:schemeClr val="dk1"/>
+          </a:fontRef>
+        </p:style>
+        <p:txBody>
+          <a:bodyPr rtlCol="0" anchor="ctr"/>
+          <a:lstStyle/>
+          <a:p>
+            <a:pPr algn="ctr"/>
+            <a:r>
+              <a:rPr lang="en-US" sz="900" dirty="0"/>
+              <a:t>Finished iteration ?</a:t>
+            </a:r>
+            <a:endParaRPr lang="en-SG" sz="900" dirty="0"/>
+          </a:p>
+        </p:txBody>
+      </p:sp>
+      <p:cxnSp>
+        <p:nvCxnSpPr>
+          <p:cNvPr id="32" name="Elbow Connector 17">
+            <a:extLst>
+              <a:ext uri="{FF2B5EF4-FFF2-40B4-BE49-F238E27FC236}">
+                <a16:creationId xmlns:a16="http://schemas.microsoft.com/office/drawing/2014/main" id="{3E1A14C0-FFED-1E7F-1197-77F268CAD505}"/>
+              </a:ext>
+            </a:extLst>
+          </p:cNvPr>
+          <p:cNvCxnSpPr>
+            <a:cxnSpLocks/>
+            <a:stCxn id="20" idx="2"/>
+            <a:endCxn id="31" idx="3"/>
+          </p:cNvCxnSpPr>
+          <p:nvPr/>
+        </p:nvCxnSpPr>
+        <p:spPr>
+          <a:xfrm rot="5400000">
+            <a:off x="4398723" y="1284274"/>
+            <a:ext cx="471489" cy="2209793"/>
+          </a:xfrm>
+          <a:prstGeom prst="bentConnector2">
+            <a:avLst/>
+          </a:prstGeom>
+          <a:ln>
+            <a:tailEnd type="triangle"/>
+          </a:ln>
+        </p:spPr>
+        <p:style>
+          <a:lnRef idx="1">
+            <a:schemeClr val="dk1"/>
+          </a:lnRef>
+          <a:fillRef idx="0">
+            <a:schemeClr val="dk1"/>
+          </a:fillRef>
+          <a:effectRef idx="0">
+            <a:schemeClr val="dk1"/>
+          </a:effectRef>
+          <a:fontRef idx="minor">
+            <a:schemeClr val="tx1"/>
+          </a:fontRef>
+        </p:style>
+      </p:cxnSp>
+      <p:sp>
+        <p:nvSpPr>
+          <p:cNvPr id="33" name="TextBox 32">
+            <a:extLst>
+              <a:ext uri="{FF2B5EF4-FFF2-40B4-BE49-F238E27FC236}">
+                <a16:creationId xmlns:a16="http://schemas.microsoft.com/office/drawing/2014/main" id="{DF201F2B-C95B-D9B7-5E0D-EC397969A270}"/>
+              </a:ext>
+            </a:extLst>
+          </p:cNvPr>
+          <p:cNvSpPr txBox="1"/>
+          <p:nvPr/>
+        </p:nvSpPr>
+        <p:spPr>
+          <a:xfrm>
+            <a:off x="3754645" y="2344775"/>
+            <a:ext cx="1108326" cy="253916"/>
+          </a:xfrm>
+          <a:prstGeom prst="rect">
+            <a:avLst/>
+          </a:prstGeom>
+          <a:noFill/>
+        </p:spPr>
+        <p:txBody>
+          <a:bodyPr wrap="square" rtlCol="0">
+            <a:spAutoFit/>
+          </a:bodyPr>
+          <a:lstStyle/>
+          <a:p>
+            <a:r>
+              <a:rPr lang="en-US" sz="1050" b="1" dirty="0"/>
+              <a:t>Bytes data </a:t>
+            </a:r>
+          </a:p>
+        </p:txBody>
+      </p:sp>
+      <p:cxnSp>
+        <p:nvCxnSpPr>
+          <p:cNvPr id="34" name="Elbow Connector 19">
+            <a:extLst>
+              <a:ext uri="{FF2B5EF4-FFF2-40B4-BE49-F238E27FC236}">
+                <a16:creationId xmlns:a16="http://schemas.microsoft.com/office/drawing/2014/main" id="{9DC92190-102B-2EE8-F215-170A3856E526}"/>
+              </a:ext>
+            </a:extLst>
+          </p:cNvPr>
+          <p:cNvCxnSpPr>
+            <a:cxnSpLocks/>
+            <a:stCxn id="31" idx="1"/>
+            <a:endCxn id="24" idx="0"/>
+          </p:cNvCxnSpPr>
+          <p:nvPr/>
+        </p:nvCxnSpPr>
+        <p:spPr>
+          <a:xfrm rot="10800000" flipV="1">
+            <a:off x="1917079" y="2624915"/>
+            <a:ext cx="184947" cy="267690"/>
+          </a:xfrm>
+          <a:prstGeom prst="bentConnector2">
+            <a:avLst/>
+          </a:prstGeom>
+          <a:ln>
+            <a:tailEnd type="triangle"/>
+          </a:ln>
+        </p:spPr>
+        <p:style>
+          <a:lnRef idx="1">
+            <a:schemeClr val="dk1"/>
+          </a:lnRef>
+          <a:fillRef idx="0">
+            <a:schemeClr val="dk1"/>
+          </a:fillRef>
+          <a:effectRef idx="0">
+            <a:schemeClr val="dk1"/>
+          </a:effectRef>
+          <a:fontRef idx="minor">
+            <a:schemeClr val="tx1"/>
+          </a:fontRef>
+        </p:style>
+      </p:cxnSp>
+      <p:sp>
+        <p:nvSpPr>
+          <p:cNvPr id="35" name="TextBox 34">
+            <a:extLst>
+              <a:ext uri="{FF2B5EF4-FFF2-40B4-BE49-F238E27FC236}">
+                <a16:creationId xmlns:a16="http://schemas.microsoft.com/office/drawing/2014/main" id="{21AA9684-DC99-47B2-DF0B-6D6A0110E7CC}"/>
+              </a:ext>
+            </a:extLst>
+          </p:cNvPr>
+          <p:cNvSpPr txBox="1"/>
+          <p:nvPr/>
+        </p:nvSpPr>
+        <p:spPr>
+          <a:xfrm>
+            <a:off x="1849952" y="2401227"/>
+            <a:ext cx="376608" cy="253916"/>
+          </a:xfrm>
+          <a:prstGeom prst="rect">
+            <a:avLst/>
+          </a:prstGeom>
+          <a:noFill/>
+        </p:spPr>
+        <p:txBody>
+          <a:bodyPr wrap="square" rtlCol="0">
+            <a:spAutoFit/>
+          </a:bodyPr>
+          <a:lstStyle/>
+          <a:p>
+            <a:r>
+              <a:rPr lang="en-US" sz="1050" dirty="0"/>
+              <a:t>No</a:t>
+            </a:r>
+          </a:p>
+        </p:txBody>
+      </p:sp>
+      <p:cxnSp>
+        <p:nvCxnSpPr>
+          <p:cNvPr id="36" name="Straight Arrow Connector 35">
+            <a:extLst>
+              <a:ext uri="{FF2B5EF4-FFF2-40B4-BE49-F238E27FC236}">
+                <a16:creationId xmlns:a16="http://schemas.microsoft.com/office/drawing/2014/main" id="{E51DE28E-2F43-B0BB-E43A-BF74E8458EAD}"/>
+              </a:ext>
+            </a:extLst>
+          </p:cNvPr>
+          <p:cNvCxnSpPr/>
+          <p:nvPr/>
+        </p:nvCxnSpPr>
+        <p:spPr>
+          <a:xfrm flipV="1">
+            <a:off x="1602125" y="2214688"/>
+            <a:ext cx="0" cy="657843"/>
+          </a:xfrm>
+          <a:prstGeom prst="straightConnector1">
+            <a:avLst/>
+          </a:prstGeom>
+          <a:ln>
+            <a:tailEnd type="triangle"/>
+          </a:ln>
+        </p:spPr>
+        <p:style>
+          <a:lnRef idx="1">
+            <a:schemeClr val="dk1"/>
+          </a:lnRef>
+          <a:fillRef idx="0">
+            <a:schemeClr val="dk1"/>
+          </a:fillRef>
+          <a:effectRef idx="0">
+            <a:schemeClr val="dk1"/>
+          </a:effectRef>
+          <a:fontRef idx="minor">
+            <a:schemeClr val="tx1"/>
+          </a:fontRef>
+        </p:style>
+      </p:cxnSp>
+      <p:cxnSp>
+        <p:nvCxnSpPr>
+          <p:cNvPr id="37" name="Straight Arrow Connector 36">
+            <a:extLst>
+              <a:ext uri="{FF2B5EF4-FFF2-40B4-BE49-F238E27FC236}">
+                <a16:creationId xmlns:a16="http://schemas.microsoft.com/office/drawing/2014/main" id="{1C66052B-ACBB-B7F3-B083-9931A88BB74F}"/>
+              </a:ext>
+            </a:extLst>
+          </p:cNvPr>
+          <p:cNvCxnSpPr>
+            <a:stCxn id="31" idx="2"/>
+          </p:cNvCxnSpPr>
+          <p:nvPr/>
+        </p:nvCxnSpPr>
+        <p:spPr>
+          <a:xfrm flipH="1">
+            <a:off x="2808271" y="2872531"/>
+            <a:ext cx="0" cy="558538"/>
+          </a:xfrm>
+          <a:prstGeom prst="straightConnector1">
+            <a:avLst/>
+          </a:prstGeom>
+          <a:ln>
+            <a:tailEnd type="triangle"/>
+          </a:ln>
+        </p:spPr>
+        <p:style>
+          <a:lnRef idx="1">
+            <a:schemeClr val="dk1"/>
+          </a:lnRef>
+          <a:fillRef idx="0">
+            <a:schemeClr val="dk1"/>
+          </a:fillRef>
+          <a:effectRef idx="0">
+            <a:schemeClr val="dk1"/>
+          </a:effectRef>
+          <a:fontRef idx="minor">
+            <a:schemeClr val="tx1"/>
+          </a:fontRef>
+        </p:style>
+      </p:cxnSp>
+      <p:sp>
+        <p:nvSpPr>
+          <p:cNvPr id="38" name="TextBox 37">
+            <a:extLst>
+              <a:ext uri="{FF2B5EF4-FFF2-40B4-BE49-F238E27FC236}">
+                <a16:creationId xmlns:a16="http://schemas.microsoft.com/office/drawing/2014/main" id="{0C03D33B-B0A6-218C-7283-8948DBD2CF6B}"/>
+              </a:ext>
+            </a:extLst>
+          </p:cNvPr>
+          <p:cNvSpPr txBox="1"/>
+          <p:nvPr/>
+        </p:nvSpPr>
+        <p:spPr>
+          <a:xfrm>
+            <a:off x="2799733" y="3093353"/>
+            <a:ext cx="498836" cy="253916"/>
+          </a:xfrm>
+          <a:prstGeom prst="rect">
+            <a:avLst/>
+          </a:prstGeom>
+          <a:noFill/>
+        </p:spPr>
+        <p:txBody>
+          <a:bodyPr wrap="square" rtlCol="0">
+            <a:spAutoFit/>
+          </a:bodyPr>
+          <a:lstStyle/>
+          <a:p>
+            <a:r>
+              <a:rPr lang="en-US" sz="1050" dirty="0"/>
+              <a:t>Yes</a:t>
+            </a:r>
+          </a:p>
+        </p:txBody>
+      </p:sp>
+      <p:cxnSp>
+        <p:nvCxnSpPr>
+          <p:cNvPr id="39" name="Elbow Connector 29">
+            <a:extLst>
+              <a:ext uri="{FF2B5EF4-FFF2-40B4-BE49-F238E27FC236}">
+                <a16:creationId xmlns:a16="http://schemas.microsoft.com/office/drawing/2014/main" id="{AB4F1198-2A3F-187F-7993-62F514596292}"/>
+              </a:ext>
+            </a:extLst>
+          </p:cNvPr>
+          <p:cNvCxnSpPr>
+            <a:cxnSpLocks/>
+            <a:stCxn id="23" idx="3"/>
+            <a:endCxn id="28" idx="1"/>
+          </p:cNvCxnSpPr>
+          <p:nvPr/>
+        </p:nvCxnSpPr>
+        <p:spPr>
+          <a:xfrm flipV="1">
+            <a:off x="3462554" y="3058796"/>
+            <a:ext cx="1490158" cy="597460"/>
+          </a:xfrm>
+          <a:prstGeom prst="bentConnector3">
+            <a:avLst/>
+          </a:prstGeom>
+          <a:ln>
+            <a:tailEnd type="triangle"/>
+          </a:ln>
+        </p:spPr>
+        <p:style>
+          <a:lnRef idx="1">
+            <a:schemeClr val="dk1"/>
+          </a:lnRef>
+          <a:fillRef idx="0">
+            <a:schemeClr val="dk1"/>
+          </a:fillRef>
+          <a:effectRef idx="0">
+            <a:schemeClr val="dk1"/>
+          </a:effectRef>
+          <a:fontRef idx="minor">
+            <a:schemeClr val="tx1"/>
+          </a:fontRef>
+        </p:style>
+      </p:cxnSp>
+      <p:cxnSp>
+        <p:nvCxnSpPr>
+          <p:cNvPr id="40" name="Elbow Connector 60">
+            <a:extLst>
+              <a:ext uri="{FF2B5EF4-FFF2-40B4-BE49-F238E27FC236}">
+                <a16:creationId xmlns:a16="http://schemas.microsoft.com/office/drawing/2014/main" id="{87F47FDB-D986-BB72-0A25-3155B610060F}"/>
+              </a:ext>
+            </a:extLst>
+          </p:cNvPr>
+          <p:cNvCxnSpPr>
+            <a:endCxn id="21" idx="3"/>
+          </p:cNvCxnSpPr>
+          <p:nvPr/>
+        </p:nvCxnSpPr>
+        <p:spPr>
+          <a:xfrm rot="16200000" flipV="1">
+            <a:off x="9161869" y="1910128"/>
+            <a:ext cx="309229" cy="299891"/>
+          </a:xfrm>
+          <a:prstGeom prst="bentConnector2">
+            <a:avLst/>
+          </a:prstGeom>
+          <a:ln>
+            <a:tailEnd type="triangle"/>
+          </a:ln>
+        </p:spPr>
+        <p:style>
+          <a:lnRef idx="1">
+            <a:schemeClr val="dk1"/>
+          </a:lnRef>
+          <a:fillRef idx="0">
+            <a:schemeClr val="dk1"/>
+          </a:fillRef>
+          <a:effectRef idx="0">
+            <a:schemeClr val="dk1"/>
+          </a:effectRef>
+          <a:fontRef idx="minor">
+            <a:schemeClr val="tx1"/>
+          </a:fontRef>
+        </p:style>
+      </p:cxnSp>
+      <p:sp>
+        <p:nvSpPr>
+          <p:cNvPr id="41" name="Rectangle 40">
+            <a:extLst>
+              <a:ext uri="{FF2B5EF4-FFF2-40B4-BE49-F238E27FC236}">
+                <a16:creationId xmlns:a16="http://schemas.microsoft.com/office/drawing/2014/main" id="{1B9145CE-F370-DC0E-FF13-BE0FECBCA080}"/>
+              </a:ext>
+            </a:extLst>
+          </p:cNvPr>
+          <p:cNvSpPr/>
+          <p:nvPr/>
+        </p:nvSpPr>
+        <p:spPr>
+          <a:xfrm>
+            <a:off x="7290490" y="3309765"/>
+            <a:ext cx="2421323" cy="587125"/>
+          </a:xfrm>
+          <a:prstGeom prst="rect">
+            <a:avLst/>
+          </a:prstGeom>
+          <a:ln w="19050"/>
+        </p:spPr>
+        <p:style>
+          <a:lnRef idx="2">
+            <a:schemeClr val="dk1"/>
+          </a:lnRef>
+          <a:fillRef idx="1">
+            <a:schemeClr val="lt1"/>
+          </a:fillRef>
+          <a:effectRef idx="0">
+            <a:schemeClr val="dk1"/>
+          </a:effectRef>
+          <a:fontRef idx="minor">
+            <a:schemeClr val="dk1"/>
+          </a:fontRef>
+        </p:style>
+        <p:txBody>
+          <a:bodyPr rtlCol="0" anchor="ctr"/>
+          <a:lstStyle/>
+          <a:p>
+            <a:r>
+              <a:rPr lang="en-US" sz="1100" dirty="0"/>
+              <a:t>Decrypt the message to get the Random #2 and PATT value then verify whether both value can match.</a:t>
+            </a:r>
+          </a:p>
+        </p:txBody>
+      </p:sp>
+      <p:cxnSp>
+        <p:nvCxnSpPr>
+          <p:cNvPr id="42" name="Elbow Connector 72">
+            <a:extLst>
+              <a:ext uri="{FF2B5EF4-FFF2-40B4-BE49-F238E27FC236}">
+                <a16:creationId xmlns:a16="http://schemas.microsoft.com/office/drawing/2014/main" id="{DC86C33B-22D5-AB26-7578-A8AC4747F7C7}"/>
+              </a:ext>
+            </a:extLst>
+          </p:cNvPr>
+          <p:cNvCxnSpPr>
+            <a:stCxn id="28" idx="3"/>
+            <a:endCxn id="41" idx="1"/>
+          </p:cNvCxnSpPr>
+          <p:nvPr/>
+        </p:nvCxnSpPr>
+        <p:spPr>
+          <a:xfrm>
+            <a:off x="6313192" y="3058796"/>
+            <a:ext cx="977298" cy="544532"/>
+          </a:xfrm>
+          <a:prstGeom prst="bentConnector3">
+            <a:avLst>
+              <a:gd name="adj1" fmla="val 61818"/>
+            </a:avLst>
+          </a:prstGeom>
+          <a:ln>
+            <a:tailEnd type="triangle"/>
+          </a:ln>
+        </p:spPr>
+        <p:style>
+          <a:lnRef idx="1">
+            <a:schemeClr val="dk1"/>
+          </a:lnRef>
+          <a:fillRef idx="0">
+            <a:schemeClr val="dk1"/>
+          </a:fillRef>
+          <a:effectRef idx="0">
+            <a:schemeClr val="dk1"/>
+          </a:effectRef>
+          <a:fontRef idx="minor">
+            <a:schemeClr val="tx1"/>
+          </a:fontRef>
+        </p:style>
+      </p:cxnSp>
+      <p:sp>
+        <p:nvSpPr>
+          <p:cNvPr id="49" name="TextBox 48">
+            <a:extLst>
+              <a:ext uri="{FF2B5EF4-FFF2-40B4-BE49-F238E27FC236}">
+                <a16:creationId xmlns:a16="http://schemas.microsoft.com/office/drawing/2014/main" id="{FC153BAB-585D-F556-AA17-92A5078D9AFB}"/>
+              </a:ext>
+            </a:extLst>
+          </p:cNvPr>
+          <p:cNvSpPr txBox="1"/>
+          <p:nvPr/>
+        </p:nvSpPr>
+        <p:spPr>
+          <a:xfrm>
+            <a:off x="3541317" y="3151800"/>
+            <a:ext cx="1352802" cy="430887"/>
+          </a:xfrm>
+          <a:prstGeom prst="rect">
+            <a:avLst/>
+          </a:prstGeom>
+          <a:noFill/>
+        </p:spPr>
+        <p:txBody>
+          <a:bodyPr wrap="square" rtlCol="0">
+            <a:spAutoFit/>
+          </a:bodyPr>
+          <a:lstStyle/>
+          <a:p>
+            <a:r>
+              <a:rPr lang="en-US" sz="1100" b="1" dirty="0">
+                <a:solidFill>
+                  <a:schemeClr val="tx2">
+                    <a:lumMod val="75000"/>
+                    <a:lumOff val="25000"/>
+                  </a:schemeClr>
+                </a:solidFill>
+              </a:rPr>
+              <a:t>RSA encrypted PATT message </a:t>
+            </a:r>
+            <a:endParaRPr lang="en-SG" sz="1100" b="1" dirty="0">
+              <a:solidFill>
+                <a:schemeClr val="tx2">
+                  <a:lumMod val="75000"/>
+                  <a:lumOff val="25000"/>
+                </a:schemeClr>
+              </a:solidFill>
+            </a:endParaRPr>
+          </a:p>
+        </p:txBody>
+      </p:sp>
+      <p:sp>
+        <p:nvSpPr>
+          <p:cNvPr id="51" name="TextBox 50">
+            <a:extLst>
+              <a:ext uri="{FF2B5EF4-FFF2-40B4-BE49-F238E27FC236}">
+                <a16:creationId xmlns:a16="http://schemas.microsoft.com/office/drawing/2014/main" id="{34A50CE9-DC00-DBEF-E152-19C61660F8D1}"/>
+              </a:ext>
+            </a:extLst>
+          </p:cNvPr>
+          <p:cNvSpPr txBox="1"/>
+          <p:nvPr/>
+        </p:nvSpPr>
+        <p:spPr>
+          <a:xfrm>
+            <a:off x="4786360" y="3289913"/>
+            <a:ext cx="1906004" cy="261610"/>
+          </a:xfrm>
+          <a:prstGeom prst="rect">
+            <a:avLst/>
+          </a:prstGeom>
+          <a:noFill/>
+        </p:spPr>
+        <p:txBody>
+          <a:bodyPr wrap="square" rtlCol="0">
+            <a:spAutoFit/>
+          </a:bodyPr>
+          <a:lstStyle/>
+          <a:p>
+            <a:r>
+              <a:rPr lang="en-US" sz="1100" b="1" dirty="0">
+                <a:solidFill>
+                  <a:schemeClr val="tx2">
+                    <a:lumMod val="75000"/>
+                    <a:lumOff val="25000"/>
+                  </a:schemeClr>
+                </a:solidFill>
+              </a:rPr>
+              <a:t>Forward message to server </a:t>
+            </a:r>
+            <a:endParaRPr lang="en-SG" sz="1100" b="1" dirty="0">
+              <a:solidFill>
+                <a:schemeClr val="tx2">
+                  <a:lumMod val="75000"/>
+                  <a:lumOff val="25000"/>
+                </a:schemeClr>
+              </a:solidFill>
+            </a:endParaRPr>
+          </a:p>
+        </p:txBody>
+      </p:sp>
+    </p:spTree>
+    <p:extLst>
+      <p:ext uri="{BB962C8B-B14F-4D97-AF65-F5344CB8AC3E}">
+        <p14:creationId xmlns:p14="http://schemas.microsoft.com/office/powerpoint/2010/main" val="4219720922"/>
+      </p:ext>
+    </p:extLst>
+  </p:cSld>
+  <p:clrMapOvr>
+    <a:masterClrMapping/>
+  </p:clrMapOvr>
+</p:sld>
+</file>
+
+<file path=ppt/slides/slide6.xml><?xml version="1.0" encoding="utf-8"?>
+<p:sld xmlns:a="http://schemas.openxmlformats.org/drawingml/2006/main" xmlns:r="http://schemas.openxmlformats.org/officeDocument/2006/relationships" xmlns:p="http://schemas.openxmlformats.org/presentationml/2006/main">
+  <p:cSld>
+    <p:spTree>
+      <p:nvGrpSpPr>
+        <p:cNvPr id="1" name=""/>
+        <p:cNvGrpSpPr/>
+        <p:nvPr/>
+      </p:nvGrpSpPr>
+      <p:grpSpPr>
+        <a:xfrm>
+          <a:off x="0" y="0"/>
+          <a:ext cx="0" cy="0"/>
+          <a:chOff x="0" y="0"/>
+          <a:chExt cx="0" cy="0"/>
+        </a:xfrm>
+      </p:grpSpPr>
+      <p:pic>
+        <p:nvPicPr>
+          <p:cNvPr id="4" name="Picture 3">
+            <a:extLst>
+              <a:ext uri="{FF2B5EF4-FFF2-40B4-BE49-F238E27FC236}">
+                <a16:creationId xmlns:a16="http://schemas.microsoft.com/office/drawing/2014/main" id="{003C4262-3A30-6F78-9742-83C48441E1E4}"/>
+              </a:ext>
+            </a:extLst>
+          </p:cNvPr>
+          <p:cNvPicPr>
+            <a:picLocks noChangeAspect="1"/>
+          </p:cNvPicPr>
+          <p:nvPr/>
+        </p:nvPicPr>
+        <p:blipFill>
+          <a:blip r:embed="rId2">
+            <a:extLst>
+              <a:ext uri="{28A0092B-C50C-407E-A947-70E740481C1C}">
+                <a14:useLocalDpi xmlns:a14="http://schemas.microsoft.com/office/drawing/2010/main" val="0"/>
+              </a:ext>
+            </a:extLst>
+          </a:blip>
+          <a:stretch>
+            <a:fillRect/>
+          </a:stretch>
+        </p:blipFill>
+        <p:spPr>
+          <a:xfrm>
+            <a:off x="1044829" y="1489774"/>
+            <a:ext cx="6544691" cy="3676948"/>
+          </a:xfrm>
+          <a:prstGeom prst="rect">
+            <a:avLst/>
+          </a:prstGeom>
+        </p:spPr>
+      </p:pic>
+      <p:sp>
+        <p:nvSpPr>
+          <p:cNvPr id="7" name="TextBox 6">
+            <a:extLst>
+              <a:ext uri="{FF2B5EF4-FFF2-40B4-BE49-F238E27FC236}">
+                <a16:creationId xmlns:a16="http://schemas.microsoft.com/office/drawing/2014/main" id="{E25DD17E-077F-E927-158E-9D617B01A5F3}"/>
+              </a:ext>
+            </a:extLst>
+          </p:cNvPr>
+          <p:cNvSpPr txBox="1"/>
+          <p:nvPr/>
+        </p:nvSpPr>
+        <p:spPr>
+          <a:xfrm>
+            <a:off x="6080129" y="1498634"/>
+            <a:ext cx="1218244" cy="261610"/>
+          </a:xfrm>
+          <a:prstGeom prst="rect">
+            <a:avLst/>
+          </a:prstGeom>
+          <a:noFill/>
+        </p:spPr>
+        <p:txBody>
+          <a:bodyPr wrap="square" rtlCol="0">
+            <a:spAutoFit/>
+          </a:bodyPr>
+          <a:lstStyle/>
+          <a:p>
+            <a:r>
+              <a:rPr lang="en-US" sz="1100" b="1" dirty="0"/>
+              <a:t>IoT sensors</a:t>
+            </a:r>
+            <a:endParaRPr lang="en-SG" sz="1100" b="1" dirty="0"/>
+          </a:p>
+        </p:txBody>
+      </p:sp>
+      <p:sp>
+        <p:nvSpPr>
+          <p:cNvPr id="8" name="Rectangle 7">
+            <a:extLst>
+              <a:ext uri="{FF2B5EF4-FFF2-40B4-BE49-F238E27FC236}">
+                <a16:creationId xmlns:a16="http://schemas.microsoft.com/office/drawing/2014/main" id="{72301B78-BFF2-B1C1-674C-6275A0D5DEE6}"/>
+              </a:ext>
+            </a:extLst>
+          </p:cNvPr>
+          <p:cNvSpPr/>
+          <p:nvPr/>
+        </p:nvSpPr>
+        <p:spPr>
+          <a:xfrm>
+            <a:off x="6501384" y="2386584"/>
+            <a:ext cx="1218244" cy="676656"/>
+          </a:xfrm>
+          <a:prstGeom prst="rect">
+            <a:avLst/>
+          </a:prstGeom>
+          <a:solidFill>
+            <a:schemeClr val="bg1"/>
+          </a:solidFill>
+          <a:ln>
+            <a:noFill/>
+          </a:ln>
+        </p:spPr>
+        <p:style>
+          <a:lnRef idx="2">
+            <a:schemeClr val="accent1">
+              <a:shade val="15000"/>
+            </a:schemeClr>
+          </a:lnRef>
+          <a:fillRef idx="1">
+            <a:schemeClr val="accent1"/>
+          </a:fillRef>
+          <a:effectRef idx="0">
+            <a:schemeClr val="accent1"/>
+          </a:effectRef>
+          <a:fontRef idx="minor">
+            <a:schemeClr val="lt1"/>
+          </a:fontRef>
+        </p:style>
+        <p:txBody>
+          <a:bodyPr rtlCol="0" anchor="ctr"/>
+          <a:lstStyle/>
+          <a:p>
+            <a:pPr algn="ctr"/>
+            <a:endParaRPr lang="en-SG" dirty="0"/>
+          </a:p>
+        </p:txBody>
+      </p:sp>
+      <p:sp>
+        <p:nvSpPr>
+          <p:cNvPr id="9" name="Rectangle 8">
+            <a:extLst>
+              <a:ext uri="{FF2B5EF4-FFF2-40B4-BE49-F238E27FC236}">
+                <a16:creationId xmlns:a16="http://schemas.microsoft.com/office/drawing/2014/main" id="{A2FC393F-2D9D-0793-F7CD-76F56F21F829}"/>
+              </a:ext>
+            </a:extLst>
+          </p:cNvPr>
+          <p:cNvSpPr/>
+          <p:nvPr/>
+        </p:nvSpPr>
+        <p:spPr>
+          <a:xfrm>
+            <a:off x="6904482" y="1709928"/>
+            <a:ext cx="1294160" cy="676656"/>
+          </a:xfrm>
+          <a:prstGeom prst="rect">
+            <a:avLst/>
+          </a:prstGeom>
+          <a:solidFill>
+            <a:schemeClr val="bg1"/>
+          </a:solidFill>
+          <a:ln>
+            <a:noFill/>
+          </a:ln>
+        </p:spPr>
+        <p:style>
+          <a:lnRef idx="2">
+            <a:schemeClr val="accent1">
+              <a:shade val="15000"/>
+            </a:schemeClr>
+          </a:lnRef>
+          <a:fillRef idx="1">
+            <a:schemeClr val="accent1"/>
+          </a:fillRef>
+          <a:effectRef idx="0">
+            <a:schemeClr val="accent1"/>
+          </a:effectRef>
+          <a:fontRef idx="minor">
+            <a:schemeClr val="lt1"/>
+          </a:fontRef>
+        </p:style>
+        <p:txBody>
+          <a:bodyPr rtlCol="0" anchor="ctr"/>
+          <a:lstStyle/>
+          <a:p>
+            <a:pPr algn="ctr"/>
+            <a:endParaRPr lang="en-SG" dirty="0"/>
+          </a:p>
+        </p:txBody>
+      </p:sp>
+      <p:pic>
+        <p:nvPicPr>
+          <p:cNvPr id="6" name="Picture 5">
+            <a:extLst>
+              <a:ext uri="{FF2B5EF4-FFF2-40B4-BE49-F238E27FC236}">
+                <a16:creationId xmlns:a16="http://schemas.microsoft.com/office/drawing/2014/main" id="{826B9FAD-6340-F4D8-B459-60CBDB63F999}"/>
+              </a:ext>
+            </a:extLst>
+          </p:cNvPr>
+          <p:cNvPicPr>
+            <a:picLocks noChangeAspect="1"/>
+          </p:cNvPicPr>
+          <p:nvPr/>
+        </p:nvPicPr>
+        <p:blipFill>
+          <a:blip r:embed="rId3"/>
+          <a:stretch>
+            <a:fillRect/>
+          </a:stretch>
+        </p:blipFill>
+        <p:spPr>
+          <a:xfrm>
+            <a:off x="6203529" y="1705639"/>
+            <a:ext cx="700953" cy="528410"/>
+          </a:xfrm>
+          <a:prstGeom prst="rect">
+            <a:avLst/>
+          </a:prstGeom>
+          <a:ln w="9525">
+            <a:solidFill>
+              <a:schemeClr val="tx1"/>
+            </a:solidFill>
+          </a:ln>
+        </p:spPr>
+      </p:pic>
+      <p:sp>
+        <p:nvSpPr>
+          <p:cNvPr id="12" name="Rectangle 11">
+            <a:extLst>
+              <a:ext uri="{FF2B5EF4-FFF2-40B4-BE49-F238E27FC236}">
+                <a16:creationId xmlns:a16="http://schemas.microsoft.com/office/drawing/2014/main" id="{E06E6B3D-B5E5-0915-A174-85F59F6F6CBF}"/>
+              </a:ext>
+            </a:extLst>
+          </p:cNvPr>
+          <p:cNvSpPr/>
+          <p:nvPr/>
+        </p:nvSpPr>
+        <p:spPr>
+          <a:xfrm>
+            <a:off x="1692686" y="3364992"/>
+            <a:ext cx="1335024" cy="841248"/>
+          </a:xfrm>
+          <a:prstGeom prst="rect">
+            <a:avLst/>
+          </a:prstGeom>
+          <a:noFill/>
+          <a:ln>
+            <a:solidFill>
+              <a:srgbClr val="FF0000"/>
+            </a:solidFill>
+            <a:prstDash val="sysDash"/>
+          </a:ln>
+        </p:spPr>
+        <p:style>
+          <a:lnRef idx="2">
+            <a:schemeClr val="accent1">
+              <a:shade val="15000"/>
+            </a:schemeClr>
+          </a:lnRef>
+          <a:fillRef idx="1">
+            <a:schemeClr val="accent1"/>
+          </a:fillRef>
+          <a:effectRef idx="0">
+            <a:schemeClr val="accent1"/>
+          </a:effectRef>
+          <a:fontRef idx="minor">
+            <a:schemeClr val="lt1"/>
+          </a:fontRef>
+        </p:style>
+        <p:txBody>
+          <a:bodyPr rtlCol="0" anchor="ctr"/>
+          <a:lstStyle/>
+          <a:p>
+            <a:pPr algn="ctr"/>
+            <a:endParaRPr lang="en-SG" dirty="0"/>
+          </a:p>
+        </p:txBody>
+      </p:sp>
+      <p:cxnSp>
+        <p:nvCxnSpPr>
+          <p:cNvPr id="13" name="Elbow Connector 17">
+            <a:extLst>
+              <a:ext uri="{FF2B5EF4-FFF2-40B4-BE49-F238E27FC236}">
+                <a16:creationId xmlns:a16="http://schemas.microsoft.com/office/drawing/2014/main" id="{C827AA27-D8D2-B96B-A6BA-6EC3896260A1}"/>
+              </a:ext>
+            </a:extLst>
+          </p:cNvPr>
+          <p:cNvCxnSpPr>
+            <a:cxnSpLocks/>
+            <a:stCxn id="6" idx="0"/>
+            <a:endCxn id="12" idx="0"/>
+          </p:cNvCxnSpPr>
+          <p:nvPr/>
+        </p:nvCxnSpPr>
+        <p:spPr>
+          <a:xfrm rot="16200000" flipH="1" flipV="1">
+            <a:off x="3627425" y="438411"/>
+            <a:ext cx="1659353" cy="4193808"/>
+          </a:xfrm>
+          <a:prstGeom prst="bentConnector3">
+            <a:avLst>
+              <a:gd name="adj1" fmla="val -25899"/>
+            </a:avLst>
+          </a:prstGeom>
+          <a:ln w="19050">
+            <a:solidFill>
+              <a:srgbClr val="FF0000"/>
+            </a:solidFill>
+            <a:tailEnd type="triangle"/>
+          </a:ln>
+        </p:spPr>
+        <p:style>
+          <a:lnRef idx="1">
+            <a:schemeClr val="dk1"/>
+          </a:lnRef>
+          <a:fillRef idx="0">
+            <a:schemeClr val="dk1"/>
+          </a:fillRef>
+          <a:effectRef idx="0">
+            <a:schemeClr val="dk1"/>
+          </a:effectRef>
+          <a:fontRef idx="minor">
+            <a:schemeClr val="tx1"/>
+          </a:fontRef>
+        </p:style>
+      </p:cxnSp>
+      <p:sp>
+        <p:nvSpPr>
+          <p:cNvPr id="17" name="Rectangle 16">
+            <a:extLst>
+              <a:ext uri="{FF2B5EF4-FFF2-40B4-BE49-F238E27FC236}">
+                <a16:creationId xmlns:a16="http://schemas.microsoft.com/office/drawing/2014/main" id="{6FF57CE2-F111-29F8-D7A7-1AB0B09A0EF1}"/>
+              </a:ext>
+            </a:extLst>
+          </p:cNvPr>
+          <p:cNvSpPr/>
+          <p:nvPr/>
+        </p:nvSpPr>
+        <p:spPr>
+          <a:xfrm>
+            <a:off x="3122076" y="3306912"/>
+            <a:ext cx="2483196" cy="1247230"/>
+          </a:xfrm>
+          <a:prstGeom prst="rect">
+            <a:avLst/>
+          </a:prstGeom>
+          <a:noFill/>
+          <a:ln>
+            <a:solidFill>
+              <a:srgbClr val="FF0000"/>
+            </a:solidFill>
+            <a:prstDash val="sysDash"/>
+          </a:ln>
+        </p:spPr>
+        <p:style>
+          <a:lnRef idx="2">
+            <a:schemeClr val="accent1">
+              <a:shade val="15000"/>
+            </a:schemeClr>
+          </a:lnRef>
+          <a:fillRef idx="1">
+            <a:schemeClr val="accent1"/>
+          </a:fillRef>
+          <a:effectRef idx="0">
+            <a:schemeClr val="accent1"/>
+          </a:effectRef>
+          <a:fontRef idx="minor">
+            <a:schemeClr val="lt1"/>
+          </a:fontRef>
+        </p:style>
+        <p:txBody>
+          <a:bodyPr rtlCol="0" anchor="ctr"/>
+          <a:lstStyle/>
+          <a:p>
+            <a:pPr algn="ctr"/>
+            <a:endParaRPr lang="en-SG" dirty="0"/>
+          </a:p>
+        </p:txBody>
+      </p:sp>
+      <p:sp>
+        <p:nvSpPr>
+          <p:cNvPr id="18" name="TextBox 17">
+            <a:extLst>
+              <a:ext uri="{FF2B5EF4-FFF2-40B4-BE49-F238E27FC236}">
+                <a16:creationId xmlns:a16="http://schemas.microsoft.com/office/drawing/2014/main" id="{AA2DEDC5-701E-95F7-D2A0-45D124714963}"/>
+              </a:ext>
+            </a:extLst>
+          </p:cNvPr>
+          <p:cNvSpPr txBox="1"/>
+          <p:nvPr/>
+        </p:nvSpPr>
+        <p:spPr>
+          <a:xfrm>
+            <a:off x="3587669" y="4554142"/>
+            <a:ext cx="1738864" cy="338554"/>
+          </a:xfrm>
+          <a:prstGeom prst="rect">
+            <a:avLst/>
+          </a:prstGeom>
+          <a:noFill/>
+        </p:spPr>
+        <p:txBody>
+          <a:bodyPr wrap="square" rtlCol="0">
+            <a:spAutoFit/>
+          </a:bodyPr>
+          <a:lstStyle/>
+          <a:p>
+            <a:r>
+              <a:rPr lang="en-US" sz="1600" b="1" dirty="0">
+                <a:solidFill>
+                  <a:srgbClr val="FF0000"/>
+                </a:solidFill>
+              </a:rPr>
+              <a:t>TEE driver ready </a:t>
+            </a:r>
+            <a:endParaRPr lang="en-SG" sz="1600" b="1" dirty="0">
+              <a:solidFill>
+                <a:srgbClr val="FF0000"/>
+              </a:solidFill>
+            </a:endParaRPr>
+          </a:p>
+        </p:txBody>
+      </p:sp>
+    </p:spTree>
+    <p:extLst>
+      <p:ext uri="{BB962C8B-B14F-4D97-AF65-F5344CB8AC3E}">
+        <p14:creationId xmlns:p14="http://schemas.microsoft.com/office/powerpoint/2010/main" val="3773510892"/>
+      </p:ext>
+    </p:extLst>
+  </p:cSld>
+  <p:clrMapOvr>
+    <a:masterClrMapping/>
+  </p:clrMapOvr>
+</p:sld>
+</file>
+
+<file path=ppt/slides/slide7.xml><?xml version="1.0" encoding="utf-8"?>
 <p:sld xmlns:a="http://schemas.openxmlformats.org/drawingml/2006/main" xmlns:r="http://schemas.openxmlformats.org/officeDocument/2006/relationships" xmlns:p="http://schemas.openxmlformats.org/presentationml/2006/main">
   <p:cSld>
     <p:spTree>

</xml_diff>

<commit_message>
Update the program setup section.
</commit_message>
<xml_diff>
--- a/doc/designDoc.pptx
+++ b/doc/designDoc.pptx
@@ -5,7 +5,7 @@
     <p:sldMasterId id="2147483648" r:id="rId1"/>
   </p:sldMasterIdLst>
   <p:notesMasterIdLst>
-    <p:notesMasterId r:id="rId9"/>
+    <p:notesMasterId r:id="rId10"/>
   </p:notesMasterIdLst>
   <p:sldIdLst>
     <p:sldId id="256" r:id="rId2"/>
@@ -15,6 +15,7 @@
     <p:sldId id="265" r:id="rId6"/>
     <p:sldId id="266" r:id="rId7"/>
     <p:sldId id="261" r:id="rId8"/>
+    <p:sldId id="267" r:id="rId9"/>
   </p:sldIdLst>
   <p:sldSz cx="12192000" cy="6858000"/>
   <p:notesSz cx="6858000" cy="9144000"/>
@@ -203,7 +204,7 @@
           <a:p>
             <a:fld id="{33409446-689F-46FF-9FB7-77BF708581DE}" type="datetimeFigureOut">
               <a:rPr lang="en-SG" smtClean="0"/>
-              <a:t>9/3/2024</a:t>
+              <a:t>10/3/2024</a:t>
             </a:fld>
             <a:endParaRPr lang="en-SG"/>
           </a:p>
@@ -872,7 +873,7 @@
           <a:p>
             <a:fld id="{B3F8E07C-796C-4AF5-99C4-45330ADE35B1}" type="datetimeFigureOut">
               <a:rPr lang="en-SG" smtClean="0"/>
-              <a:t>9/3/2024</a:t>
+              <a:t>10/3/2024</a:t>
             </a:fld>
             <a:endParaRPr lang="en-SG"/>
           </a:p>
@@ -1072,7 +1073,7 @@
           <a:p>
             <a:fld id="{B3F8E07C-796C-4AF5-99C4-45330ADE35B1}" type="datetimeFigureOut">
               <a:rPr lang="en-SG" smtClean="0"/>
-              <a:t>9/3/2024</a:t>
+              <a:t>10/3/2024</a:t>
             </a:fld>
             <a:endParaRPr lang="en-SG"/>
           </a:p>
@@ -1282,7 +1283,7 @@
           <a:p>
             <a:fld id="{B3F8E07C-796C-4AF5-99C4-45330ADE35B1}" type="datetimeFigureOut">
               <a:rPr lang="en-SG" smtClean="0"/>
-              <a:t>9/3/2024</a:t>
+              <a:t>10/3/2024</a:t>
             </a:fld>
             <a:endParaRPr lang="en-SG"/>
           </a:p>
@@ -1482,7 +1483,7 @@
           <a:p>
             <a:fld id="{B3F8E07C-796C-4AF5-99C4-45330ADE35B1}" type="datetimeFigureOut">
               <a:rPr lang="en-SG" smtClean="0"/>
-              <a:t>9/3/2024</a:t>
+              <a:t>10/3/2024</a:t>
             </a:fld>
             <a:endParaRPr lang="en-SG"/>
           </a:p>
@@ -1758,7 +1759,7 @@
           <a:p>
             <a:fld id="{B3F8E07C-796C-4AF5-99C4-45330ADE35B1}" type="datetimeFigureOut">
               <a:rPr lang="en-SG" smtClean="0"/>
-              <a:t>9/3/2024</a:t>
+              <a:t>10/3/2024</a:t>
             </a:fld>
             <a:endParaRPr lang="en-SG"/>
           </a:p>
@@ -2026,7 +2027,7 @@
           <a:p>
             <a:fld id="{B3F8E07C-796C-4AF5-99C4-45330ADE35B1}" type="datetimeFigureOut">
               <a:rPr lang="en-SG" smtClean="0"/>
-              <a:t>9/3/2024</a:t>
+              <a:t>10/3/2024</a:t>
             </a:fld>
             <a:endParaRPr lang="en-SG"/>
           </a:p>
@@ -2441,7 +2442,7 @@
           <a:p>
             <a:fld id="{B3F8E07C-796C-4AF5-99C4-45330ADE35B1}" type="datetimeFigureOut">
               <a:rPr lang="en-SG" smtClean="0"/>
-              <a:t>9/3/2024</a:t>
+              <a:t>10/3/2024</a:t>
             </a:fld>
             <a:endParaRPr lang="en-SG"/>
           </a:p>
@@ -2583,7 +2584,7 @@
           <a:p>
             <a:fld id="{B3F8E07C-796C-4AF5-99C4-45330ADE35B1}" type="datetimeFigureOut">
               <a:rPr lang="en-SG" smtClean="0"/>
-              <a:t>9/3/2024</a:t>
+              <a:t>10/3/2024</a:t>
             </a:fld>
             <a:endParaRPr lang="en-SG"/>
           </a:p>
@@ -2696,7 +2697,7 @@
           <a:p>
             <a:fld id="{B3F8E07C-796C-4AF5-99C4-45330ADE35B1}" type="datetimeFigureOut">
               <a:rPr lang="en-SG" smtClean="0"/>
-              <a:t>9/3/2024</a:t>
+              <a:t>10/3/2024</a:t>
             </a:fld>
             <a:endParaRPr lang="en-SG"/>
           </a:p>
@@ -3009,7 +3010,7 @@
           <a:p>
             <a:fld id="{B3F8E07C-796C-4AF5-99C4-45330ADE35B1}" type="datetimeFigureOut">
               <a:rPr lang="en-SG" smtClean="0"/>
-              <a:t>9/3/2024</a:t>
+              <a:t>10/3/2024</a:t>
             </a:fld>
             <a:endParaRPr lang="en-SG"/>
           </a:p>
@@ -3298,7 +3299,7 @@
           <a:p>
             <a:fld id="{B3F8E07C-796C-4AF5-99C4-45330ADE35B1}" type="datetimeFigureOut">
               <a:rPr lang="en-SG" smtClean="0"/>
-              <a:t>9/3/2024</a:t>
+              <a:t>10/3/2024</a:t>
             </a:fld>
             <a:endParaRPr lang="en-SG"/>
           </a:p>
@@ -3541,7 +3542,7 @@
           <a:p>
             <a:fld id="{B3F8E07C-796C-4AF5-99C4-45330ADE35B1}" type="datetimeFigureOut">
               <a:rPr lang="en-SG" smtClean="0"/>
-              <a:t>9/3/2024</a:t>
+              <a:t>10/3/2024</a:t>
             </a:fld>
             <a:endParaRPr lang="en-SG"/>
           </a:p>
@@ -18709,6 +18710,299 @@
     <p:extLst>
       <p:ext uri="{BB962C8B-B14F-4D97-AF65-F5344CB8AC3E}">
         <p14:creationId xmlns:p14="http://schemas.microsoft.com/office/powerpoint/2010/main" val="290118591"/>
+      </p:ext>
+    </p:extLst>
+  </p:cSld>
+  <p:clrMapOvr>
+    <a:masterClrMapping/>
+  </p:clrMapOvr>
+</p:sld>
+</file>
+
+<file path=ppt/slides/slide8.xml><?xml version="1.0" encoding="utf-8"?>
+<p:sld xmlns:a="http://schemas.openxmlformats.org/drawingml/2006/main" xmlns:r="http://schemas.openxmlformats.org/officeDocument/2006/relationships" xmlns:p="http://schemas.openxmlformats.org/presentationml/2006/main">
+  <p:cSld>
+    <p:spTree>
+      <p:nvGrpSpPr>
+        <p:cNvPr id="1" name=""/>
+        <p:cNvGrpSpPr/>
+        <p:nvPr/>
+      </p:nvGrpSpPr>
+      <p:grpSpPr>
+        <a:xfrm>
+          <a:off x="0" y="0"/>
+          <a:ext cx="0" cy="0"/>
+          <a:chOff x="0" y="0"/>
+          <a:chExt cx="0" cy="0"/>
+        </a:xfrm>
+      </p:grpSpPr>
+      <p:pic>
+        <p:nvPicPr>
+          <p:cNvPr id="5" name="Picture 4" descr="A screenshot of a computer&#10;&#10;Description automatically generated">
+            <a:extLst>
+              <a:ext uri="{FF2B5EF4-FFF2-40B4-BE49-F238E27FC236}">
+                <a16:creationId xmlns:a16="http://schemas.microsoft.com/office/drawing/2014/main" id="{892F7CD5-1B83-484A-83D8-7F7553E98430}"/>
+              </a:ext>
+            </a:extLst>
+          </p:cNvPr>
+          <p:cNvPicPr>
+            <a:picLocks noChangeAspect="1"/>
+          </p:cNvPicPr>
+          <p:nvPr/>
+        </p:nvPicPr>
+        <p:blipFill>
+          <a:blip r:embed="rId2">
+            <a:extLst>
+              <a:ext uri="{28A0092B-C50C-407E-A947-70E740481C1C}">
+                <a14:useLocalDpi xmlns:a14="http://schemas.microsoft.com/office/drawing/2010/main" val="0"/>
+              </a:ext>
+            </a:extLst>
+          </a:blip>
+          <a:stretch>
+            <a:fillRect/>
+          </a:stretch>
+        </p:blipFill>
+        <p:spPr>
+          <a:xfrm>
+            <a:off x="2256565" y="1373348"/>
+            <a:ext cx="4533333" cy="3580952"/>
+          </a:xfrm>
+          <a:prstGeom prst="rect">
+            <a:avLst/>
+          </a:prstGeom>
+          <a:ln w="9525">
+            <a:solidFill>
+              <a:schemeClr val="tx1"/>
+            </a:solidFill>
+          </a:ln>
+        </p:spPr>
+      </p:pic>
+      <p:sp>
+        <p:nvSpPr>
+          <p:cNvPr id="6" name="Text Box 3">
+            <a:extLst>
+              <a:ext uri="{FF2B5EF4-FFF2-40B4-BE49-F238E27FC236}">
+                <a16:creationId xmlns:a16="http://schemas.microsoft.com/office/drawing/2014/main" id="{3EEA2741-3CA0-063B-000A-9D87A00ECB59}"/>
+              </a:ext>
+            </a:extLst>
+          </p:cNvPr>
+          <p:cNvSpPr txBox="1"/>
+          <p:nvPr/>
+        </p:nvSpPr>
+        <p:spPr>
+          <a:xfrm>
+            <a:off x="5115686" y="1956816"/>
+            <a:ext cx="4412362" cy="2468880"/>
+          </a:xfrm>
+          <a:prstGeom prst="rect">
+            <a:avLst/>
+          </a:prstGeom>
+          <a:solidFill>
+            <a:schemeClr val="lt1"/>
+          </a:solidFill>
+          <a:ln w="6350">
+            <a:solidFill>
+              <a:prstClr val="black"/>
+            </a:solidFill>
+          </a:ln>
+        </p:spPr>
+        <p:txBody>
+          <a:bodyPr rot="0" spcFirstLastPara="0" vert="horz" wrap="square" lIns="91440" tIns="45720" rIns="91440" bIns="45720" numCol="1" spcCol="0" rtlCol="0" fromWordArt="0" anchor="t" anchorCtr="0" forceAA="0" compatLnSpc="1">
+            <a:prstTxWarp prst="textNoShape">
+              <a:avLst/>
+            </a:prstTxWarp>
+            <a:noAutofit/>
+          </a:bodyPr>
+          <a:lstStyle/>
+          <a:p>
+            <a:pPr algn="l"/>
+            <a:r>
+              <a:rPr lang="en-SG" sz="1200" b="1" kern="0" dirty="0">
+                <a:solidFill>
+                  <a:srgbClr val="000000"/>
+                </a:solidFill>
+                <a:effectLst/>
+                <a:ea typeface="Calibri" panose="020F0502020204030204" pitchFamily="34" charset="0"/>
+                <a:cs typeface="Consolas" panose="020B0609020204030204" pitchFamily="49" charset="0"/>
+              </a:rPr>
+              <a:t>Config.mk: </a:t>
+            </a:r>
+            <a:endParaRPr lang="en-SG" sz="1200" b="1" kern="100" dirty="0">
+              <a:effectLst/>
+              <a:ea typeface="DengXian" panose="02010600030101010101" pitchFamily="2" charset="-122"/>
+              <a:cs typeface="Times New Roman" panose="02020603050405020304" pitchFamily="18" charset="0"/>
+            </a:endParaRPr>
+          </a:p>
+          <a:p>
+            <a:pPr algn="l"/>
+            <a:r>
+              <a:rPr lang="en-SG" sz="1200" b="1" kern="0" dirty="0">
+                <a:solidFill>
+                  <a:srgbClr val="000000"/>
+                </a:solidFill>
+                <a:effectLst/>
+                <a:ea typeface="Calibri" panose="020F0502020204030204" pitchFamily="34" charset="0"/>
+                <a:cs typeface="Consolas" panose="020B0609020204030204" pitchFamily="49" charset="0"/>
+              </a:rPr>
+              <a:t> </a:t>
+            </a:r>
+            <a:endParaRPr lang="en-SG" sz="1200" b="1" kern="100" dirty="0">
+              <a:effectLst/>
+              <a:ea typeface="DengXian" panose="02010600030101010101" pitchFamily="2" charset="-122"/>
+              <a:cs typeface="Times New Roman" panose="02020603050405020304" pitchFamily="18" charset="0"/>
+            </a:endParaRPr>
+          </a:p>
+          <a:p>
+            <a:pPr algn="l"/>
+            <a:r>
+              <a:rPr lang="en-SG" sz="1200" b="1" kern="0" dirty="0">
+                <a:solidFill>
+                  <a:srgbClr val="000000"/>
+                </a:solidFill>
+                <a:effectLst/>
+                <a:ea typeface="Calibri" panose="020F0502020204030204" pitchFamily="34" charset="0"/>
+                <a:cs typeface="Consolas" panose="020B0609020204030204" pitchFamily="49" charset="0"/>
+              </a:rPr>
+              <a:t>export CROSS_COMPILE := /path/to/your/</a:t>
+            </a:r>
+            <a:r>
+              <a:rPr lang="en-SG" sz="1200" b="1" kern="0" dirty="0" err="1">
+                <a:solidFill>
+                  <a:srgbClr val="000000"/>
+                </a:solidFill>
+                <a:effectLst/>
+                <a:ea typeface="Calibri" panose="020F0502020204030204" pitchFamily="34" charset="0"/>
+                <a:cs typeface="Consolas" panose="020B0609020204030204" pitchFamily="49" charset="0"/>
+              </a:rPr>
+              <a:t>linaro</a:t>
+            </a:r>
+            <a:r>
+              <a:rPr lang="en-SG" sz="1200" b="1" kern="0" dirty="0">
+                <a:solidFill>
+                  <a:srgbClr val="000000"/>
+                </a:solidFill>
+                <a:effectLst/>
+                <a:ea typeface="Calibri" panose="020F0502020204030204" pitchFamily="34" charset="0"/>
+                <a:cs typeface="Consolas" panose="020B0609020204030204" pitchFamily="49" charset="0"/>
+              </a:rPr>
+              <a:t>/aarch32/bin/arm-</a:t>
+            </a:r>
+            <a:r>
+              <a:rPr lang="en-SG" sz="1200" b="1" kern="0" dirty="0" err="1">
+                <a:solidFill>
+                  <a:srgbClr val="000000"/>
+                </a:solidFill>
+                <a:effectLst/>
+                <a:ea typeface="Calibri" panose="020F0502020204030204" pitchFamily="34" charset="0"/>
+                <a:cs typeface="Consolas" panose="020B0609020204030204" pitchFamily="49" charset="0"/>
+              </a:rPr>
+              <a:t>linux</a:t>
+            </a:r>
+            <a:r>
+              <a:rPr lang="en-SG" sz="1200" b="1" kern="0" dirty="0">
+                <a:solidFill>
+                  <a:srgbClr val="000000"/>
+                </a:solidFill>
+                <a:effectLst/>
+                <a:ea typeface="Calibri" panose="020F0502020204030204" pitchFamily="34" charset="0"/>
+                <a:cs typeface="Consolas" panose="020B0609020204030204" pitchFamily="49" charset="0"/>
+              </a:rPr>
+              <a:t>-</a:t>
+            </a:r>
+            <a:r>
+              <a:rPr lang="en-SG" sz="1200" b="1" kern="0" dirty="0" err="1">
+                <a:solidFill>
+                  <a:srgbClr val="000000"/>
+                </a:solidFill>
+                <a:effectLst/>
+                <a:ea typeface="Calibri" panose="020F0502020204030204" pitchFamily="34" charset="0"/>
+                <a:cs typeface="Consolas" panose="020B0609020204030204" pitchFamily="49" charset="0"/>
+              </a:rPr>
+              <a:t>gnueabihf</a:t>
+            </a:r>
+            <a:r>
+              <a:rPr lang="en-SG" sz="1200" b="1" kern="0" dirty="0">
+                <a:solidFill>
+                  <a:srgbClr val="000000"/>
+                </a:solidFill>
+                <a:effectLst/>
+                <a:ea typeface="Calibri" panose="020F0502020204030204" pitchFamily="34" charset="0"/>
+                <a:cs typeface="Consolas" panose="020B0609020204030204" pitchFamily="49" charset="0"/>
+              </a:rPr>
+              <a:t>-</a:t>
+            </a:r>
+            <a:endParaRPr lang="en-SG" sz="1200" b="1" kern="100" dirty="0">
+              <a:effectLst/>
+              <a:ea typeface="DengXian" panose="02010600030101010101" pitchFamily="2" charset="-122"/>
+              <a:cs typeface="Times New Roman" panose="02020603050405020304" pitchFamily="18" charset="0"/>
+            </a:endParaRPr>
+          </a:p>
+          <a:p>
+            <a:pPr algn="l"/>
+            <a:r>
+              <a:rPr lang="en-SG" sz="1200" b="1" kern="0" dirty="0">
+                <a:solidFill>
+                  <a:srgbClr val="000000"/>
+                </a:solidFill>
+                <a:effectLst/>
+                <a:ea typeface="Calibri" panose="020F0502020204030204" pitchFamily="34" charset="0"/>
+                <a:cs typeface="Consolas" panose="020B0609020204030204" pitchFamily="49" charset="0"/>
+              </a:rPr>
+              <a:t> </a:t>
+            </a:r>
+            <a:endParaRPr lang="en-SG" sz="1200" b="1" kern="100" dirty="0">
+              <a:effectLst/>
+              <a:ea typeface="DengXian" panose="02010600030101010101" pitchFamily="2" charset="-122"/>
+              <a:cs typeface="Times New Roman" panose="02020603050405020304" pitchFamily="18" charset="0"/>
+            </a:endParaRPr>
+          </a:p>
+          <a:p>
+            <a:pPr algn="l"/>
+            <a:r>
+              <a:rPr lang="en-SG" sz="1200" b="1" kern="0" dirty="0">
+                <a:solidFill>
+                  <a:srgbClr val="000000"/>
+                </a:solidFill>
+                <a:effectLst/>
+                <a:ea typeface="Calibri" panose="020F0502020204030204" pitchFamily="34" charset="0"/>
+                <a:cs typeface="Consolas" panose="020B0609020204030204" pitchFamily="49" charset="0"/>
+              </a:rPr>
+              <a:t>export CROSS_COMPILE_AARCH64 := /path/to/your/</a:t>
+            </a:r>
+            <a:r>
+              <a:rPr lang="en-SG" sz="1200" b="1" kern="0" dirty="0" err="1">
+                <a:solidFill>
+                  <a:srgbClr val="000000"/>
+                </a:solidFill>
+                <a:effectLst/>
+                <a:ea typeface="Calibri" panose="020F0502020204030204" pitchFamily="34" charset="0"/>
+                <a:cs typeface="Consolas" panose="020B0609020204030204" pitchFamily="49" charset="0"/>
+              </a:rPr>
+              <a:t>linaro</a:t>
+            </a:r>
+            <a:r>
+              <a:rPr lang="en-SG" sz="1200" b="1" kern="0" dirty="0">
+                <a:solidFill>
+                  <a:srgbClr val="000000"/>
+                </a:solidFill>
+                <a:effectLst/>
+                <a:ea typeface="Calibri" panose="020F0502020204030204" pitchFamily="34" charset="0"/>
+                <a:cs typeface="Consolas" panose="020B0609020204030204" pitchFamily="49" charset="0"/>
+              </a:rPr>
+              <a:t>/aarch64/bin/aarch64-linux-gnu-</a:t>
+            </a:r>
+            <a:endParaRPr lang="en-SG" sz="1200" b="1" kern="100" dirty="0">
+              <a:effectLst/>
+              <a:ea typeface="DengXian" panose="02010600030101010101" pitchFamily="2" charset="-122"/>
+              <a:cs typeface="Times New Roman" panose="02020603050405020304" pitchFamily="18" charset="0"/>
+            </a:endParaRPr>
+          </a:p>
+        </p:txBody>
+      </p:sp>
+    </p:spTree>
+    <p:extLst>
+      <p:ext uri="{BB962C8B-B14F-4D97-AF65-F5344CB8AC3E}">
+        <p14:creationId xmlns:p14="http://schemas.microsoft.com/office/powerpoint/2010/main" val="3497795128"/>
       </p:ext>
     </p:extLst>
   </p:cSld>

</xml_diff>

<commit_message>
Update the read me document.
</commit_message>
<xml_diff>
--- a/doc/designDoc.pptx
+++ b/doc/designDoc.pptx
@@ -15235,7 +15235,7 @@
         </p:nvSpPr>
         <p:spPr>
           <a:xfrm>
-            <a:off x="1320799" y="327378"/>
+            <a:off x="1117301" y="127058"/>
             <a:ext cx="6470651" cy="369332"/>
           </a:xfrm>
           <a:prstGeom prst="rect">
@@ -15250,10 +15250,10 @@
           <a:lstStyle/>
           <a:p>
             <a:r>
-              <a:rPr lang="en-US" dirty="0"/>
-              <a:t>OPTEE trust application [client &lt;-&gt; server ] design(10/07/2019) </a:t>
-            </a:r>
-            <a:endParaRPr lang="en-SG" dirty="0"/>
+              <a:rPr lang="en-US" b="1" dirty="0"/>
+              <a:t>OPTEE Trust Application [IoT firmware attestation workflow]</a:t>
+            </a:r>
+            <a:endParaRPr lang="en-SG" b="1" dirty="0"/>
           </a:p>
         </p:txBody>
       </p:sp>
@@ -15298,7 +15298,7 @@
         </p:nvSpPr>
         <p:spPr>
           <a:xfrm>
-            <a:off x="101822" y="635793"/>
+            <a:off x="6288445" y="6469418"/>
             <a:ext cx="1772225" cy="276999"/>
           </a:xfrm>
           <a:prstGeom prst="rect">
@@ -15392,7 +15392,7 @@
         <p:spPr>
           <a:xfrm>
             <a:off x="182140" y="1250100"/>
-            <a:ext cx="2999573" cy="3677930"/>
+            <a:ext cx="2999573" cy="3954929"/>
           </a:xfrm>
           <a:prstGeom prst="rect">
             <a:avLst/>
@@ -15430,9 +15430,6 @@
             </a:r>
           </a:p>
           <a:p>
-            <a:endParaRPr lang="en-US" sz="1000" dirty="0"/>
-          </a:p>
-          <a:p>
             <a:r>
               <a:rPr lang="en-US" sz="1000" dirty="0"/>
               <a:t>Pre-stored Value: </a:t>
@@ -15445,7 +15442,7 @@
             </a:pPr>
             <a:r>
               <a:rPr lang="en-US" sz="900" dirty="0"/>
-              <a:t>AES default Key, AES IV</a:t>
+              <a:t>RSA default Key</a:t>
             </a:r>
           </a:p>
           <a:p>
@@ -15455,7 +15452,7 @@
             </a:pPr>
             <a:r>
               <a:rPr lang="en-US" sz="900" dirty="0"/>
-              <a:t>Challenge String length</a:t>
+              <a:t>PATT Challenge String length</a:t>
             </a:r>
           </a:p>
           <a:p>
@@ -15465,7 +15462,7 @@
             </a:pPr>
             <a:r>
               <a:rPr lang="en-US" sz="900" dirty="0"/>
-              <a:t>SWATT calculation Iteration time [m]</a:t>
+              <a:t>PATT calculation Iteration time [m]</a:t>
             </a:r>
           </a:p>
           <a:p>
@@ -15485,6 +15482,16 @@
             </a:pPr>
             <a:r>
               <a:rPr lang="en-US" sz="900" dirty="0"/>
+              <a:t>Raspberry PI Arm Chip UDID</a:t>
+            </a:r>
+          </a:p>
+          <a:p>
+            <a:pPr marL="171450" indent="-171450">
+              <a:buFontTx/>
+              <a:buChar char="-"/>
+            </a:pPr>
+            <a:r>
+              <a:rPr lang="en-US" sz="900" dirty="0"/>
               <a:t>File address block range.</a:t>
             </a:r>
           </a:p>
@@ -15522,23 +15529,7 @@
             </a:pPr>
             <a:r>
               <a:rPr lang="en-US" sz="900" dirty="0"/>
-              <a:t>Load default AES-Key, decrypt </a:t>
-            </a:r>
-            <a:r>
-              <a:rPr lang="en-US" sz="900" dirty="0" err="1"/>
-              <a:t>msg</a:t>
-            </a:r>
-            <a:r>
-              <a:rPr lang="en-US" sz="900" dirty="0"/>
-              <a:t>,  get session key. =&gt; Set AES session key, decrypt </a:t>
-            </a:r>
-            <a:r>
-              <a:rPr lang="en-US" sz="900" dirty="0" err="1"/>
-              <a:t>msg</a:t>
-            </a:r>
-            <a:r>
-              <a:rPr lang="en-US" sz="900" dirty="0"/>
-              <a:t>  and get challenge str. </a:t>
+              <a:t>Load default RSA-Key, decrypt msg,  get session key. =&gt; Set RSA session key, decrypt msg  and get challenge str. </a:t>
             </a:r>
           </a:p>
           <a:p>
@@ -15566,7 +15557,7 @@
             </a:pPr>
             <a:r>
               <a:rPr lang="en-US" sz="900" dirty="0"/>
-              <a:t>Do SWATT calculation for input byte, refresh all the TA(</a:t>
+              <a:t>Do PATT calculation for input byte, refresh all the TA(</a:t>
             </a:r>
             <a:r>
               <a:rPr lang="en-US" sz="900" dirty="0" err="1"/>
@@ -15594,15 +15585,7 @@
             </a:pPr>
             <a:r>
               <a:rPr lang="en-US" sz="900" dirty="0"/>
-              <a:t>Finished all and get the final SWATT </a:t>
-            </a:r>
-            <a:r>
-              <a:rPr lang="en-US" sz="900" dirty="0" err="1"/>
-              <a:t>int</a:t>
-            </a:r>
-            <a:r>
-              <a:rPr lang="en-US" sz="900" dirty="0"/>
-              <a:t>/hex val.</a:t>
+              <a:t>Finished all and get the final PATT int/hex val.</a:t>
             </a:r>
           </a:p>
           <a:p>
@@ -15612,7 +15595,7 @@
             </a:pPr>
             <a:r>
               <a:rPr lang="en-US" sz="900" dirty="0"/>
-              <a:t>Load AES-session Key, encrypt SWATT value. </a:t>
+              <a:t>Load RSA-session Key, encrypt PATT value. </a:t>
             </a:r>
           </a:p>
           <a:p>
@@ -15622,15 +15605,7 @@
             </a:pPr>
             <a:r>
               <a:rPr lang="en-US" sz="900" dirty="0"/>
-              <a:t>Load AES-session -Key, decrypt </a:t>
-            </a:r>
-            <a:r>
-              <a:rPr lang="en-US" sz="900" dirty="0" err="1"/>
-              <a:t>msg</a:t>
-            </a:r>
-            <a:r>
-              <a:rPr lang="en-US" sz="900" dirty="0"/>
-              <a:t>, get server verify result. </a:t>
+              <a:t>Load RSA-session -Key, decrypt msg, get server verify result. </a:t>
             </a:r>
           </a:p>
         </p:txBody>
@@ -15690,8 +15665,8 @@
         </p:blipFill>
         <p:spPr>
           <a:xfrm>
-            <a:off x="730583" y="5737196"/>
-            <a:ext cx="1449443" cy="782490"/>
+            <a:off x="372477" y="5552003"/>
+            <a:ext cx="2018417" cy="1089654"/>
           </a:xfrm>
           <a:prstGeom prst="rect">
             <a:avLst/>
@@ -15741,8 +15716,8 @@
         </p:nvSpPr>
         <p:spPr>
           <a:xfrm>
-            <a:off x="2338925" y="5988199"/>
-            <a:ext cx="1689221" cy="261610"/>
+            <a:off x="2437902" y="5915234"/>
+            <a:ext cx="988073" cy="261610"/>
           </a:xfrm>
           <a:prstGeom prst="rect">
             <a:avLst/>
@@ -15797,7 +15772,7 @@
         </p:nvSpPr>
         <p:spPr>
           <a:xfrm>
-            <a:off x="3324875" y="874815"/>
+            <a:off x="3347444" y="874889"/>
             <a:ext cx="1987456" cy="276999"/>
           </a:xfrm>
           <a:prstGeom prst="rect">
@@ -15813,15 +15788,7 @@
           <a:p>
             <a:r>
               <a:rPr lang="en-US" sz="1200" b="1" dirty="0"/>
-              <a:t>Normal World [</a:t>
-            </a:r>
-            <a:r>
-              <a:rPr lang="en-US" sz="1200" b="1" dirty="0" err="1"/>
-              <a:t>Raspbian</a:t>
-            </a:r>
-            <a:r>
-              <a:rPr lang="en-US" sz="1200" b="1" dirty="0"/>
-              <a:t>]</a:t>
+              <a:t>Normal World </a:t>
             </a:r>
             <a:endParaRPr lang="en-SG" sz="1200" b="1" dirty="0"/>
           </a:p>
@@ -16175,13 +16142,15 @@
       <p:cxnSp>
         <p:nvCxnSpPr>
           <p:cNvPr id="90" name="Straight Arrow Connector 89"/>
-          <p:cNvCxnSpPr/>
+          <p:cNvCxnSpPr>
+            <a:cxnSpLocks/>
+          </p:cNvCxnSpPr>
           <p:nvPr/>
         </p:nvCxnSpPr>
         <p:spPr>
           <a:xfrm flipV="1">
-            <a:off x="6745929" y="1666372"/>
-            <a:ext cx="2975442" cy="28576"/>
+            <a:off x="6745929" y="1691453"/>
+            <a:ext cx="2719742" cy="3495"/>
           </a:xfrm>
           <a:prstGeom prst="straightConnector1">
             <a:avLst/>
@@ -16207,14 +16176,14 @@
       </p:cxnSp>
       <p:sp>
         <p:nvSpPr>
-          <p:cNvPr id="42" name="Rectangle 41"/>
+          <p:cNvPr id="43" name="Rectangle 42"/>
           <p:cNvSpPr/>
           <p:nvPr/>
         </p:nvSpPr>
         <p:spPr>
           <a:xfrm>
-            <a:off x="10456812" y="1870772"/>
-            <a:ext cx="1649156" cy="405544"/>
+            <a:off x="10387387" y="2925560"/>
+            <a:ext cx="1249413" cy="257500"/>
           </a:xfrm>
           <a:prstGeom prst="rect">
             <a:avLst/>
@@ -16242,62 +16211,6 @@
           <a:p>
             <a:r>
               <a:rPr lang="en-US" sz="800" b="1" dirty="0"/>
-              <a:t>2.2 - Load AES256 key + IV </a:t>
-            </a:r>
-          </a:p>
-          <a:p>
-            <a:r>
-              <a:rPr lang="en-US" sz="800" b="1" dirty="0"/>
-              <a:t>=&gt; Create random 32B session key </a:t>
-            </a:r>
-            <a:br>
-              <a:rPr lang="en-US" sz="800" b="1" dirty="0"/>
-            </a:br>
-            <a:r>
-              <a:rPr lang="en-US" sz="800" b="1" dirty="0"/>
-              <a:t>=&gt;  Encrypt session key  </a:t>
-            </a:r>
-            <a:endParaRPr lang="en-SG" sz="800" b="1" dirty="0"/>
-          </a:p>
-        </p:txBody>
-      </p:sp>
-      <p:sp>
-        <p:nvSpPr>
-          <p:cNvPr id="43" name="Rectangle 42"/>
-          <p:cNvSpPr/>
-          <p:nvPr/>
-        </p:nvSpPr>
-        <p:spPr>
-          <a:xfrm>
-            <a:off x="10387387" y="2925560"/>
-            <a:ext cx="1249413" cy="257500"/>
-          </a:xfrm>
-          <a:prstGeom prst="rect">
-            <a:avLst/>
-          </a:prstGeom>
-        </p:spPr>
-        <p:style>
-          <a:lnRef idx="2">
-            <a:schemeClr val="accent1">
-              <a:shade val="50000"/>
-            </a:schemeClr>
-          </a:lnRef>
-          <a:fillRef idx="1">
-            <a:schemeClr val="accent1"/>
-          </a:fillRef>
-          <a:effectRef idx="0">
-            <a:schemeClr val="accent1"/>
-          </a:effectRef>
-          <a:fontRef idx="minor">
-            <a:schemeClr val="lt1"/>
-          </a:fontRef>
-        </p:style>
-        <p:txBody>
-          <a:bodyPr rtlCol="0" anchor="ctr"/>
-          <a:lstStyle/>
-          <a:p>
-            <a:r>
-              <a:rPr lang="en-US" sz="800" b="1" dirty="0"/>
               <a:t>2.3 Fetch Pre-saved program </a:t>
             </a:r>
             <a:endParaRPr lang="en-SG" sz="800" b="1" dirty="0"/>
@@ -16340,13 +16253,15 @@
       <p:cxnSp>
         <p:nvCxnSpPr>
           <p:cNvPr id="23" name="Straight Arrow Connector 22"/>
-          <p:cNvCxnSpPr/>
+          <p:cNvCxnSpPr>
+            <a:cxnSpLocks/>
+          </p:cNvCxnSpPr>
           <p:nvPr/>
         </p:nvCxnSpPr>
         <p:spPr>
           <a:xfrm>
-            <a:off x="2246811" y="6283709"/>
-            <a:ext cx="1290424" cy="0"/>
+            <a:off x="2441448" y="6283709"/>
+            <a:ext cx="1095787" cy="0"/>
           </a:xfrm>
           <a:prstGeom prst="straightConnector1">
             <a:avLst/>
@@ -16408,13 +16323,15 @@
       <p:cxnSp>
         <p:nvCxnSpPr>
           <p:cNvPr id="66" name="Straight Arrow Connector 65"/>
-          <p:cNvCxnSpPr/>
+          <p:cNvCxnSpPr>
+            <a:cxnSpLocks/>
+          </p:cNvCxnSpPr>
           <p:nvPr/>
         </p:nvCxnSpPr>
         <p:spPr>
           <a:xfrm flipH="1">
-            <a:off x="1265163" y="4928030"/>
-            <a:ext cx="0" cy="801298"/>
+            <a:off x="1248026" y="5205029"/>
+            <a:ext cx="5853" cy="326474"/>
           </a:xfrm>
           <a:prstGeom prst="straightConnector1">
             <a:avLst/>
@@ -16447,7 +16364,7 @@
         </p:nvSpPr>
         <p:spPr>
           <a:xfrm>
-            <a:off x="1289651" y="5270565"/>
+            <a:off x="1282227" y="5178675"/>
             <a:ext cx="1689221" cy="261610"/>
           </a:xfrm>
           <a:prstGeom prst="rect">
@@ -16639,8 +16556,8 @@
         </p:nvSpPr>
         <p:spPr>
           <a:xfrm>
-            <a:off x="6746855" y="1460576"/>
-            <a:ext cx="2964519" cy="215444"/>
+            <a:off x="7770605" y="1350550"/>
+            <a:ext cx="1745944" cy="461665"/>
           </a:xfrm>
           <a:prstGeom prst="rect">
             <a:avLst/>
@@ -16655,7 +16572,7 @@
           <a:p>
             <a:r>
               <a:rPr lang="en-US" sz="800" dirty="0"/>
-              <a:t>Login request:  </a:t>
+              <a:t>Login request: </a:t>
             </a:r>
             <a:r>
               <a:rPr lang="en-US" sz="800" dirty="0" err="1"/>
@@ -16677,7 +16594,7 @@
         </p:nvSpPr>
         <p:spPr>
           <a:xfrm>
-            <a:off x="9733616" y="1512326"/>
+            <a:off x="9496517" y="1522315"/>
             <a:ext cx="920833" cy="249531"/>
           </a:xfrm>
           <a:prstGeom prst="rect">
@@ -16759,14 +16676,16 @@
         <p:nvCxnSpPr>
           <p:cNvPr id="51" name="Elbow Connector 50"/>
           <p:cNvCxnSpPr>
+            <a:cxnSpLocks/>
+            <a:stCxn id="87" idx="3"/>
             <a:endCxn id="42" idx="0"/>
           </p:cNvCxnSpPr>
           <p:nvPr/>
         </p:nvCxnSpPr>
         <p:spPr>
           <a:xfrm>
-            <a:off x="10654449" y="1637091"/>
-            <a:ext cx="626941" cy="233681"/>
+            <a:off x="10417350" y="1647081"/>
+            <a:ext cx="864040" cy="114776"/>
           </a:xfrm>
           <a:prstGeom prst="bentConnector2">
             <a:avLst/>
@@ -16893,7 +16812,15 @@
           <a:p>
             <a:r>
               <a:rPr lang="en-US" sz="800" b="1" dirty="0"/>
-              <a:t>2.4 Calculate the file SWATT </a:t>
+              <a:t>2.4 Calculate the </a:t>
+            </a:r>
+            <a:r>
+              <a:rPr lang="en-US" sz="800" b="1" dirty="0" err="1"/>
+              <a:t>filep</a:t>
+            </a:r>
+            <a:r>
+              <a:rPr lang="en-US" sz="800" b="1" dirty="0"/>
+              <a:t> PATT</a:t>
             </a:r>
             <a:endParaRPr lang="en-SG" sz="800" b="1" dirty="0"/>
           </a:p>
@@ -16907,7 +16834,7 @@
         </p:nvSpPr>
         <p:spPr>
           <a:xfrm>
-            <a:off x="11084659" y="327378"/>
+            <a:off x="11111343" y="327378"/>
             <a:ext cx="804154" cy="307756"/>
           </a:xfrm>
           <a:prstGeom prst="flowChartMagneticDisk">
@@ -16983,8 +16910,8 @@
         </p:nvSpPr>
         <p:spPr>
           <a:xfrm>
-            <a:off x="5498454" y="2049872"/>
-            <a:ext cx="2153050" cy="249531"/>
+            <a:off x="5773340" y="1941592"/>
+            <a:ext cx="1868234" cy="376616"/>
           </a:xfrm>
           <a:prstGeom prst="rect">
             <a:avLst/>
@@ -17105,8 +17032,8 @@
         </p:nvSpPr>
         <p:spPr>
           <a:xfrm>
-            <a:off x="3940535" y="2065063"/>
-            <a:ext cx="1448062" cy="249531"/>
+            <a:off x="3940534" y="1968969"/>
+            <a:ext cx="1598987" cy="345626"/>
           </a:xfrm>
           <a:prstGeom prst="rect">
             <a:avLst/>
@@ -17221,7 +17148,15 @@
           <a:p>
             <a:r>
               <a:rPr lang="en-US" sz="800" b="1" dirty="0"/>
-              <a:t>4. Forward new init seed, swat-seed, state[n], file bytes to TA </a:t>
+              <a:t>4. Forward new </a:t>
+            </a:r>
+            <a:r>
+              <a:rPr lang="en-US" sz="800" b="1" dirty="0" err="1"/>
+              <a:t>init</a:t>
+            </a:r>
+            <a:r>
+              <a:rPr lang="en-US" sz="800" b="1" dirty="0"/>
+              <a:t> state, Arm UDID, state[n], file bytes to TA </a:t>
             </a:r>
             <a:endParaRPr lang="en-SG" sz="800" b="1" dirty="0"/>
           </a:p>
@@ -17360,19 +17295,7 @@
           <a:p>
             <a:r>
               <a:rPr lang="en-US" sz="800" b="1" dirty="0"/>
-              <a:t>5. Load the encrypted </a:t>
-            </a:r>
-            <a:r>
-              <a:rPr lang="en-US" sz="800" b="1" dirty="0" err="1"/>
-              <a:t>swatt</a:t>
-            </a:r>
-            <a:r>
-              <a:rPr lang="en-US" sz="800" b="1" dirty="0"/>
-              <a:t> </a:t>
-            </a:r>
-            <a:r>
-              <a:rPr lang="en-US" sz="800" b="1" dirty="0" err="1"/>
-              <a:t>msg</a:t>
+              <a:t>5. Load the encrypted PATT parameters msg</a:t>
             </a:r>
             <a:endParaRPr lang="en-SG" sz="800" b="1" dirty="0"/>
           </a:p>
@@ -17515,8 +17438,8 @@
         </p:nvSpPr>
         <p:spPr>
           <a:xfrm>
-            <a:off x="9118750" y="3289422"/>
-            <a:ext cx="1157767" cy="244238"/>
+            <a:off x="9118750" y="3174540"/>
+            <a:ext cx="1157767" cy="359120"/>
           </a:xfrm>
           <a:prstGeom prst="rect">
             <a:avLst/>
@@ -17544,58 +17467,7 @@
           <a:p>
             <a:r>
               <a:rPr lang="en-US" sz="800" b="1" dirty="0"/>
-              <a:t>5.1 Decrypt the SWATT feed back </a:t>
-            </a:r>
-            <a:r>
-              <a:rPr lang="en-US" sz="800" b="1" dirty="0" err="1"/>
-              <a:t>msg</a:t>
-            </a:r>
-            <a:r>
-              <a:rPr lang="en-US" sz="800" b="1" dirty="0"/>
-              <a:t> </a:t>
-            </a:r>
-            <a:endParaRPr lang="en-SG" sz="800" b="1" dirty="0"/>
-          </a:p>
-        </p:txBody>
-      </p:sp>
-      <p:sp>
-        <p:nvSpPr>
-          <p:cNvPr id="146" name="Rectangle 145"/>
-          <p:cNvSpPr/>
-          <p:nvPr/>
-        </p:nvSpPr>
-        <p:spPr>
-          <a:xfrm>
-            <a:off x="9634941" y="3857486"/>
-            <a:ext cx="2273718" cy="244238"/>
-          </a:xfrm>
-          <a:prstGeom prst="rect">
-            <a:avLst/>
-          </a:prstGeom>
-        </p:spPr>
-        <p:style>
-          <a:lnRef idx="2">
-            <a:schemeClr val="accent1">
-              <a:shade val="50000"/>
-            </a:schemeClr>
-          </a:lnRef>
-          <a:fillRef idx="1">
-            <a:schemeClr val="accent1"/>
-          </a:fillRef>
-          <a:effectRef idx="0">
-            <a:schemeClr val="accent1"/>
-          </a:effectRef>
-          <a:fontRef idx="minor">
-            <a:schemeClr val="lt1"/>
-          </a:fontRef>
-        </p:style>
-        <p:txBody>
-          <a:bodyPr rtlCol="0" anchor="ctr"/>
-          <a:lstStyle/>
-          <a:p>
-            <a:r>
-              <a:rPr lang="en-US" sz="800" b="1" dirty="0"/>
-              <a:t>6.  Verify the SWATT  value and create the report  </a:t>
+              <a:t>5.1 Decrypt the PATT result feed back msg </a:t>
             </a:r>
             <a:endParaRPr lang="en-SG" sz="800" b="1" dirty="0"/>
           </a:p>
@@ -17704,7 +17576,7 @@
           <a:p>
             <a:r>
               <a:rPr lang="en-US" sz="800" b="1" dirty="0"/>
-              <a:t>6.1. AES Encrypt  the SWATT  value + verify result  </a:t>
+              <a:t>6.1. RSA Encrypt  the PATT value + verify result  </a:t>
             </a:r>
             <a:endParaRPr lang="en-SG" sz="800" b="1" dirty="0"/>
           </a:p>
@@ -17784,8 +17656,8 @@
         </p:nvSpPr>
         <p:spPr>
           <a:xfrm>
-            <a:off x="5017844" y="3528670"/>
-            <a:ext cx="1746270" cy="249531"/>
+            <a:off x="5017843" y="3528670"/>
+            <a:ext cx="1976587" cy="249531"/>
           </a:xfrm>
           <a:prstGeom prst="rect">
             <a:avLst/>
@@ -17827,6 +17699,7 @@
         <p:nvCxnSpPr>
           <p:cNvPr id="160" name="Elbow Connector 159"/>
           <p:cNvCxnSpPr>
+            <a:cxnSpLocks/>
             <a:stCxn id="153" idx="1"/>
             <a:endCxn id="158" idx="3"/>
           </p:cNvCxnSpPr>
@@ -17834,8 +17707,8 @@
         </p:nvCxnSpPr>
         <p:spPr>
           <a:xfrm rot="10800000">
-            <a:off x="6764115" y="3653436"/>
-            <a:ext cx="2854693" cy="839654"/>
+            <a:off x="6994431" y="3653436"/>
+            <a:ext cx="2624377" cy="839654"/>
           </a:xfrm>
           <a:prstGeom prst="bentConnector3">
             <a:avLst/>
@@ -17931,7 +17804,7 @@
         <p:spPr>
           <a:xfrm>
             <a:off x="5398891" y="3866269"/>
-            <a:ext cx="1805591" cy="602836"/>
+            <a:ext cx="1805591" cy="712022"/>
           </a:xfrm>
           <a:prstGeom prst="rect">
             <a:avLst/>
@@ -17986,13 +17859,15 @@
       <p:cxnSp>
         <p:nvCxnSpPr>
           <p:cNvPr id="167" name="Straight Arrow Connector 166"/>
-          <p:cNvCxnSpPr/>
+          <p:cNvCxnSpPr>
+            <a:cxnSpLocks/>
+          </p:cNvCxnSpPr>
           <p:nvPr/>
         </p:nvCxnSpPr>
         <p:spPr>
           <a:xfrm flipV="1">
-            <a:off x="5592227" y="4493091"/>
-            <a:ext cx="0" cy="1647509"/>
+            <a:off x="5592227" y="4578291"/>
+            <a:ext cx="0" cy="1562309"/>
           </a:xfrm>
           <a:prstGeom prst="straightConnector1">
             <a:avLst/>
@@ -18055,7 +17930,7 @@
         <p:spPr>
           <a:xfrm>
             <a:off x="7988106" y="329051"/>
-            <a:ext cx="1026563" cy="369332"/>
+            <a:ext cx="1013867" cy="369332"/>
           </a:xfrm>
           <a:prstGeom prst="rect">
             <a:avLst/>
@@ -18068,8 +17943,8 @@
           <a:lstStyle/>
           <a:p>
             <a:r>
-              <a:rPr lang="en-US" dirty="0" err="1"/>
-              <a:t>NetWork</a:t>
+              <a:rPr lang="en-US" dirty="0"/>
+              <a:t>Internet </a:t>
             </a:r>
             <a:endParaRPr lang="en-SG" dirty="0"/>
           </a:p>
@@ -18328,36 +18203,6 @@
       </p:sp>
       <p:sp>
         <p:nvSpPr>
-          <p:cNvPr id="91" name="TextBox 90"/>
-          <p:cNvSpPr txBox="1"/>
-          <p:nvPr/>
-        </p:nvSpPr>
-        <p:spPr>
-          <a:xfrm>
-            <a:off x="9043393" y="2203267"/>
-            <a:ext cx="1303562" cy="215444"/>
-          </a:xfrm>
-          <a:prstGeom prst="rect">
-            <a:avLst/>
-          </a:prstGeom>
-          <a:noFill/>
-        </p:spPr>
-        <p:txBody>
-          <a:bodyPr wrap="square" rtlCol="0">
-            <a:spAutoFit/>
-          </a:bodyPr>
-          <a:lstStyle/>
-          <a:p>
-            <a:r>
-              <a:rPr lang="en-US" sz="800" dirty="0"/>
-              <a:t>Encrypted AES session key</a:t>
-            </a:r>
-            <a:endParaRPr lang="en-SG" sz="800" dirty="0"/>
-          </a:p>
-        </p:txBody>
-      </p:sp>
-      <p:sp>
-        <p:nvSpPr>
           <p:cNvPr id="92" name="Rectangle 91"/>
           <p:cNvSpPr/>
           <p:nvPr/>
@@ -18440,8 +18285,8 @@
         </p:nvSpPr>
         <p:spPr>
           <a:xfrm>
-            <a:off x="9354845" y="2454054"/>
-            <a:ext cx="2097278" cy="249215"/>
+            <a:off x="9354845" y="2389806"/>
+            <a:ext cx="2097278" cy="425442"/>
           </a:xfrm>
           <a:prstGeom prst="rect">
             <a:avLst/>
@@ -18469,15 +18314,7 @@
           <a:p>
             <a:r>
               <a:rPr lang="en-US" sz="800" b="1" dirty="0"/>
-              <a:t>2.3 Create the random </a:t>
-            </a:r>
-            <a:r>
-              <a:rPr lang="en-US" sz="800" b="1" dirty="0" err="1"/>
-              <a:t>Swatt</a:t>
-            </a:r>
-            <a:r>
-              <a:rPr lang="en-US" sz="800" b="1" dirty="0"/>
-              <a:t> Challenge string based on the </a:t>
+              <a:t>2.3 Create the random PATT Challenge string based on the </a:t>
             </a:r>
             <a:r>
               <a:rPr lang="en-US" sz="800" b="1" dirty="0" err="1"/>
@@ -18703,6 +18540,141 @@
               <a:t>2</a:t>
             </a:r>
             <a:endParaRPr lang="en-SG" sz="1050" u="sng" dirty="0"/>
+          </a:p>
+        </p:txBody>
+      </p:sp>
+      <p:sp>
+        <p:nvSpPr>
+          <p:cNvPr id="42" name="Rectangle 41"/>
+          <p:cNvSpPr/>
+          <p:nvPr/>
+        </p:nvSpPr>
+        <p:spPr>
+          <a:xfrm>
+            <a:off x="10456812" y="1761857"/>
+            <a:ext cx="1649156" cy="514459"/>
+          </a:xfrm>
+          <a:prstGeom prst="rect">
+            <a:avLst/>
+          </a:prstGeom>
+        </p:spPr>
+        <p:style>
+          <a:lnRef idx="2">
+            <a:schemeClr val="accent1">
+              <a:shade val="50000"/>
+            </a:schemeClr>
+          </a:lnRef>
+          <a:fillRef idx="1">
+            <a:schemeClr val="accent1"/>
+          </a:fillRef>
+          <a:effectRef idx="0">
+            <a:schemeClr val="accent1"/>
+          </a:effectRef>
+          <a:fontRef idx="minor">
+            <a:schemeClr val="lt1"/>
+          </a:fontRef>
+        </p:style>
+        <p:txBody>
+          <a:bodyPr rtlCol="0" anchor="ctr"/>
+          <a:lstStyle/>
+          <a:p>
+            <a:r>
+              <a:rPr lang="en-US" sz="800" b="1" dirty="0"/>
+              <a:t>2.2 - Load AES256 key + IV </a:t>
+            </a:r>
+          </a:p>
+          <a:p>
+            <a:r>
+              <a:rPr lang="en-US" sz="800" b="1" dirty="0"/>
+              <a:t>=&gt; Create random 32B session key </a:t>
+            </a:r>
+            <a:br>
+              <a:rPr lang="en-US" sz="800" b="1" dirty="0"/>
+            </a:br>
+            <a:r>
+              <a:rPr lang="en-US" sz="800" b="1" dirty="0"/>
+              <a:t>=&gt;  Encrypt session key  </a:t>
+            </a:r>
+            <a:endParaRPr lang="en-SG" sz="800" b="1" dirty="0"/>
+          </a:p>
+        </p:txBody>
+      </p:sp>
+      <p:sp>
+        <p:nvSpPr>
+          <p:cNvPr id="146" name="Rectangle 145"/>
+          <p:cNvSpPr/>
+          <p:nvPr/>
+        </p:nvSpPr>
+        <p:spPr>
+          <a:xfrm>
+            <a:off x="9634941" y="3857486"/>
+            <a:ext cx="2273718" cy="244238"/>
+          </a:xfrm>
+          <a:prstGeom prst="rect">
+            <a:avLst/>
+          </a:prstGeom>
+        </p:spPr>
+        <p:style>
+          <a:lnRef idx="2">
+            <a:schemeClr val="accent1">
+              <a:shade val="50000"/>
+            </a:schemeClr>
+          </a:lnRef>
+          <a:fillRef idx="1">
+            <a:schemeClr val="accent1"/>
+          </a:fillRef>
+          <a:effectRef idx="0">
+            <a:schemeClr val="accent1"/>
+          </a:effectRef>
+          <a:fontRef idx="minor">
+            <a:schemeClr val="lt1"/>
+          </a:fontRef>
+        </p:style>
+        <p:txBody>
+          <a:bodyPr rtlCol="0" anchor="ctr"/>
+          <a:lstStyle/>
+          <a:p>
+            <a:r>
+              <a:rPr lang="en-US" sz="800" b="1" dirty="0"/>
+              <a:t>6.  Verify the PATT value and create the report  </a:t>
+            </a:r>
+            <a:endParaRPr lang="en-SG" sz="800" b="1" dirty="0"/>
+          </a:p>
+        </p:txBody>
+      </p:sp>
+      <p:sp>
+        <p:nvSpPr>
+          <p:cNvPr id="15" name="TextBox 14">
+            <a:extLst>
+              <a:ext uri="{FF2B5EF4-FFF2-40B4-BE49-F238E27FC236}">
+                <a16:creationId xmlns:a16="http://schemas.microsoft.com/office/drawing/2014/main" id="{D60959E1-B7B1-1B6E-7158-71137E1755A5}"/>
+              </a:ext>
+            </a:extLst>
+          </p:cNvPr>
+          <p:cNvSpPr txBox="1"/>
+          <p:nvPr/>
+        </p:nvSpPr>
+        <p:spPr>
+          <a:xfrm>
+            <a:off x="8942988" y="5554122"/>
+            <a:ext cx="1772225" cy="276999"/>
+          </a:xfrm>
+          <a:prstGeom prst="rect">
+            <a:avLst/>
+          </a:prstGeom>
+          <a:noFill/>
+        </p:spPr>
+        <p:txBody>
+          <a:bodyPr wrap="square" rtlCol="0">
+            <a:spAutoFit/>
+          </a:bodyPr>
+          <a:lstStyle/>
+          <a:p>
+            <a:r>
+              <a:rPr lang="en-US" sz="1200" b="1" dirty="0"/>
+              <a:t>Trust Server </a:t>
+            </a:r>
+            <a:endParaRPr lang="en-SG" sz="1200" b="1" dirty="0"/>
           </a:p>
         </p:txBody>
       </p:sp>

</xml_diff>